<commit_message>
cap nhat mo hinh doi tuong Quan ly Phim
</commit_message>
<xml_diff>
--- a/Galaxy_Cinema_Mo_hinh_Doi_tuong.pptx
+++ b/Galaxy_Cinema_Mo_hinh_Doi_tuong.pptx
@@ -5,13 +5,14 @@
     <p:sldMasterId id="2147483648" r:id="rId1"/>
   </p:sldMasterIdLst>
   <p:notesMasterIdLst>
-    <p:notesMasterId r:id="rId6"/>
+    <p:notesMasterId r:id="rId7"/>
   </p:notesMasterIdLst>
   <p:sldIdLst>
     <p:sldId id="293" r:id="rId2"/>
     <p:sldId id="305" r:id="rId3"/>
     <p:sldId id="308" r:id="rId4"/>
     <p:sldId id="309" r:id="rId5"/>
+    <p:sldId id="310" r:id="rId6"/>
   </p:sldIdLst>
   <p:sldSz cx="12192000" cy="6858000"/>
   <p:notesSz cx="6858000" cy="9144000"/>
@@ -200,7 +201,7 @@
           <a:p>
             <a:fld id="{AEB6B815-3999-499D-80CF-2EC02897F6EF}" type="datetimeFigureOut">
               <a:rPr lang="en-US" smtClean="0"/>
-              <a:t>13/03/2018</a:t>
+              <a:t>3/13/2018</a:t>
             </a:fld>
             <a:endParaRPr lang="en-US"/>
           </a:p>
@@ -815,6 +816,98 @@
 </p:notes>
 </file>
 
+<file path=ppt/notesSlides/notesSlide5.xml><?xml version="1.0" encoding="utf-8"?>
+<p:notes xmlns:a="http://schemas.openxmlformats.org/drawingml/2006/main" xmlns:r="http://schemas.openxmlformats.org/officeDocument/2006/relationships" xmlns:p="http://schemas.openxmlformats.org/presentationml/2006/main">
+  <p:cSld>
+    <p:spTree>
+      <p:nvGrpSpPr>
+        <p:cNvPr id="1" name=""/>
+        <p:cNvGrpSpPr/>
+        <p:nvPr/>
+      </p:nvGrpSpPr>
+      <p:grpSpPr>
+        <a:xfrm>
+          <a:off x="0" y="0"/>
+          <a:ext cx="0" cy="0"/>
+          <a:chOff x="0" y="0"/>
+          <a:chExt cx="0" cy="0"/>
+        </a:xfrm>
+      </p:grpSpPr>
+      <p:sp>
+        <p:nvSpPr>
+          <p:cNvPr id="2" name="Slide Image Placeholder 1"/>
+          <p:cNvSpPr>
+            <a:spLocks noGrp="1" noRot="1" noChangeAspect="1"/>
+          </p:cNvSpPr>
+          <p:nvPr>
+            <p:ph type="sldImg"/>
+          </p:nvPr>
+        </p:nvSpPr>
+        <p:spPr/>
+      </p:sp>
+      <p:sp>
+        <p:nvSpPr>
+          <p:cNvPr id="3" name="Notes Placeholder 2"/>
+          <p:cNvSpPr>
+            <a:spLocks noGrp="1"/>
+          </p:cNvSpPr>
+          <p:nvPr>
+            <p:ph type="body" idx="1"/>
+          </p:nvPr>
+        </p:nvSpPr>
+        <p:spPr/>
+        <p:txBody>
+          <a:bodyPr/>
+          <a:lstStyle/>
+          <a:p>
+            <a:endParaRPr lang="en-US"/>
+          </a:p>
+        </p:txBody>
+      </p:sp>
+      <p:sp>
+        <p:nvSpPr>
+          <p:cNvPr id="4" name="Slide Number Placeholder 3"/>
+          <p:cNvSpPr>
+            <a:spLocks noGrp="1"/>
+          </p:cNvSpPr>
+          <p:nvPr>
+            <p:ph type="sldNum" sz="quarter" idx="10"/>
+          </p:nvPr>
+        </p:nvSpPr>
+        <p:spPr/>
+        <p:txBody>
+          <a:bodyPr/>
+          <a:lstStyle/>
+          <a:p>
+            <a:fld id="{1C6F55E1-8FA1-4431-8CCD-46EFB1EBE07A}" type="slidenum">
+              <a:rPr lang="vi-VN" smtClean="0">
+                <a:solidFill>
+                  <a:prstClr val="black"/>
+                </a:solidFill>
+              </a:rPr>
+              <a:t>5</a:t>
+            </a:fld>
+            <a:endParaRPr lang="vi-VN">
+              <a:solidFill>
+                <a:prstClr val="black"/>
+              </a:solidFill>
+            </a:endParaRPr>
+          </a:p>
+        </p:txBody>
+      </p:sp>
+    </p:spTree>
+    <p:extLst>
+      <p:ext uri="{BB962C8B-B14F-4D97-AF65-F5344CB8AC3E}">
+        <p14:creationId xmlns:p14="http://schemas.microsoft.com/office/powerpoint/2010/main" val="4153060650"/>
+      </p:ext>
+    </p:extLst>
+  </p:cSld>
+  <p:clrMapOvr>
+    <a:masterClrMapping/>
+  </p:clrMapOvr>
+</p:notes>
+</file>
+
 <file path=ppt/slideLayouts/slideLayout1.xml><?xml version="1.0" encoding="utf-8"?>
 <p:sldLayout xmlns:a="http://schemas.openxmlformats.org/drawingml/2006/main" xmlns:r="http://schemas.openxmlformats.org/officeDocument/2006/relationships" xmlns:p="http://schemas.openxmlformats.org/presentationml/2006/main" type="title" preserve="1">
   <p:cSld name="Title Slide">
@@ -944,7 +1037,7 @@
           <a:p>
             <a:fld id="{57843E3B-2D41-45B5-8308-A22CC26B131A}" type="datetime1">
               <a:rPr lang="en-US" smtClean="0"/>
-              <a:t>13/03/2018</a:t>
+              <a:t>3/13/2018</a:t>
             </a:fld>
             <a:endParaRPr lang="en-US"/>
           </a:p>
@@ -1110,7 +1203,7 @@
           <a:p>
             <a:fld id="{83644E8E-E1C9-425A-8622-E178101C66C3}" type="datetime1">
               <a:rPr lang="en-US" smtClean="0"/>
-              <a:t>13/03/2018</a:t>
+              <a:t>3/13/2018</a:t>
             </a:fld>
             <a:endParaRPr lang="en-US"/>
           </a:p>
@@ -1286,7 +1379,7 @@
           <a:p>
             <a:fld id="{2733FD58-BFC4-4D8C-8B65-98128402B886}" type="datetime1">
               <a:rPr lang="en-US" smtClean="0"/>
-              <a:t>13/03/2018</a:t>
+              <a:t>3/13/2018</a:t>
             </a:fld>
             <a:endParaRPr lang="en-US"/>
           </a:p>
@@ -1452,7 +1545,7 @@
           <a:p>
             <a:fld id="{4C9D577A-C555-4047-8599-27F8672B5A9B}" type="datetime1">
               <a:rPr lang="en-US" smtClean="0"/>
-              <a:t>13/03/2018</a:t>
+              <a:t>3/13/2018</a:t>
             </a:fld>
             <a:endParaRPr lang="en-US"/>
           </a:p>
@@ -1695,7 +1788,7 @@
           <a:p>
             <a:fld id="{28612BB8-5967-4A73-A6F4-4383ECD464AA}" type="datetime1">
               <a:rPr lang="en-US" smtClean="0"/>
-              <a:t>13/03/2018</a:t>
+              <a:t>3/13/2018</a:t>
             </a:fld>
             <a:endParaRPr lang="en-US"/>
           </a:p>
@@ -1922,7 +2015,7 @@
           <a:p>
             <a:fld id="{F8B2B2ED-5E4D-4394-AE56-A0A91AFA2E75}" type="datetime1">
               <a:rPr lang="en-US" smtClean="0"/>
-              <a:t>13/03/2018</a:t>
+              <a:t>3/13/2018</a:t>
             </a:fld>
             <a:endParaRPr lang="en-US"/>
           </a:p>
@@ -2284,7 +2377,7 @@
           <a:p>
             <a:fld id="{36A732D0-6C61-4355-803A-D77B2B2155DD}" type="datetime1">
               <a:rPr lang="en-US" smtClean="0"/>
-              <a:t>13/03/2018</a:t>
+              <a:t>3/13/2018</a:t>
             </a:fld>
             <a:endParaRPr lang="en-US"/>
           </a:p>
@@ -2399,7 +2492,7 @@
           <a:p>
             <a:fld id="{2887CDC5-5117-42E9-82C7-95D82324F93E}" type="datetime1">
               <a:rPr lang="en-US" smtClean="0"/>
-              <a:t>13/03/2018</a:t>
+              <a:t>3/13/2018</a:t>
             </a:fld>
             <a:endParaRPr lang="en-US"/>
           </a:p>
@@ -2492,7 +2585,7 @@
           <a:p>
             <a:fld id="{0459332C-0CAA-40C4-A1E0-D91EB938B5D9}" type="datetime1">
               <a:rPr lang="en-US" smtClean="0"/>
-              <a:t>13/03/2018</a:t>
+              <a:t>3/13/2018</a:t>
             </a:fld>
             <a:endParaRPr lang="en-US"/>
           </a:p>
@@ -2765,7 +2858,7 @@
           <a:p>
             <a:fld id="{70E76B4D-C069-48F1-B2DD-8A8F89BDA716}" type="datetime1">
               <a:rPr lang="en-US" smtClean="0"/>
-              <a:t>13/03/2018</a:t>
+              <a:t>3/13/2018</a:t>
             </a:fld>
             <a:endParaRPr lang="en-US"/>
           </a:p>
@@ -3015,7 +3108,7 @@
           <a:p>
             <a:fld id="{7A9A29D8-8095-4B56-B282-8FDA4C5DCFFC}" type="datetime1">
               <a:rPr lang="en-US" smtClean="0"/>
-              <a:t>13/03/2018</a:t>
+              <a:t>3/13/2018</a:t>
             </a:fld>
             <a:endParaRPr lang="en-US"/>
           </a:p>
@@ -3224,7 +3317,7 @@
           <a:p>
             <a:fld id="{265B18C2-D0C8-4837-89F4-FB5823145B08}" type="datetime1">
               <a:rPr lang="en-US" smtClean="0"/>
-              <a:t>13/03/2018</a:t>
+              <a:t>3/13/2018</a:t>
             </a:fld>
             <a:endParaRPr lang="en-US"/>
           </a:p>
@@ -3678,6 +3771,16 @@
               </a:rPr>
               <a:t>Ngữ cảnh </a:t>
             </a:r>
+            <a:r>
+              <a:rPr lang="en-US" sz="1400">
+                <a:solidFill>
+                  <a:prstClr val="black"/>
+                </a:solidFill>
+                <a:latin typeface="Arial" panose="020B0604020202020204" pitchFamily="34" charset="0"/>
+                <a:cs typeface="Arial" panose="020B0604020202020204" pitchFamily="34" charset="0"/>
+              </a:rPr>
+              <a:t/>
+            </a:r>
             <a:br>
               <a:rPr lang="en-US" sz="1400">
                 <a:solidFill>
@@ -3936,7 +4039,7 @@
               <a:defRPr/>
             </a:pPr>
             <a:r>
-              <a:rPr lang="en-US" sz="1400">
+              <a:rPr lang="en-US" sz="1400" dirty="0">
                 <a:solidFill>
                   <a:srgbClr val="0000FF"/>
                 </a:solidFill>
@@ -3945,7 +4048,7 @@
               </a:rPr>
               <a:t>Yêu cầu Chức năng </a:t>
             </a:r>
-            <a:endParaRPr lang="en-US" sz="1400">
+            <a:endParaRPr lang="en-US" sz="1400" dirty="0">
               <a:solidFill>
                 <a:prstClr val="black"/>
               </a:solidFill>
@@ -3958,7 +4061,7 @@
               <a:defRPr/>
             </a:pPr>
             <a:r>
-              <a:rPr lang="en-US" sz="1400">
+              <a:rPr lang="en-US" sz="1400" dirty="0">
                 <a:solidFill>
                   <a:prstClr val="black"/>
                 </a:solidFill>
@@ -3968,7 +4071,7 @@
               <a:t> </a:t>
             </a:r>
             <a:r>
-              <a:rPr lang="en-US" sz="1400">
+              <a:rPr lang="en-US" sz="1400" dirty="0">
                 <a:solidFill>
                   <a:schemeClr val="accent2">
                     <a:lumMod val="50000"/>
@@ -3980,7 +4083,7 @@
               <a:t>Khách tham quan </a:t>
             </a:r>
             <a:r>
-              <a:rPr lang="en-US" sz="1400" b="1">
+              <a:rPr lang="en-US" sz="1400" b="1" dirty="0">
                 <a:solidFill>
                   <a:schemeClr val="accent2">
                     <a:lumMod val="50000"/>
@@ -3992,7 +4095,7 @@
               <a:t>: </a:t>
             </a:r>
             <a:r>
-              <a:rPr lang="en-US" sz="1400">
+              <a:rPr lang="en-US" sz="1400" dirty="0">
                 <a:solidFill>
                   <a:srgbClr val="FF0000"/>
                 </a:solidFill>
@@ -4002,7 +4105,7 @@
               <a:t>Xem </a:t>
             </a:r>
             <a:r>
-              <a:rPr lang="en-US" sz="1400">
+              <a:rPr lang="en-US" sz="1400" dirty="0">
                 <a:solidFill>
                   <a:srgbClr val="002060"/>
                 </a:solidFill>
@@ -4012,7 +4115,7 @@
               <a:t>  </a:t>
             </a:r>
             <a:r>
-              <a:rPr lang="en-US" sz="1400" b="1">
+              <a:rPr lang="en-US" sz="1400" b="1" dirty="0">
                 <a:solidFill>
                   <a:srgbClr val="002060"/>
                 </a:solidFill>
@@ -4022,7 +4125,7 @@
               <a:t>Phim(</a:t>
             </a:r>
             <a:r>
-              <a:rPr lang="en-US" sz="1400">
+              <a:rPr lang="en-US" sz="1400" dirty="0">
                 <a:solidFill>
                   <a:srgbClr val="002060"/>
                 </a:solidFill>
@@ -4032,7 +4135,7 @@
               <a:t>Tên, Đơn giá Bán, </a:t>
             </a:r>
             <a:r>
-              <a:rPr lang="en-US" sz="1400">
+              <a:rPr lang="en-US" sz="1400" dirty="0">
                 <a:solidFill>
                   <a:srgbClr val="002060"/>
                 </a:solidFill>
@@ -4050,7 +4153,7 @@
               <a:t>tên phim, đơn giá, tóm tắt nội dung, hình poster, phân loại, thời lượng, quốc gia, diễn viên, đạo diễn, thể loại, năm sản xuất, suất chiếu, các ghế còn trống của suất chiếu</a:t>
             </a:r>
             <a:r>
-              <a:rPr lang="en-US" sz="1400">
+              <a:rPr lang="en-US" sz="1400" dirty="0">
                 <a:solidFill>
                   <a:srgbClr val="002060"/>
                 </a:solidFill>
@@ -4060,7 +4163,7 @@
               <a:t>), </a:t>
             </a:r>
             <a:r>
-              <a:rPr lang="en-US" sz="1400">
+              <a:rPr lang="en-US" sz="1400" dirty="0">
                 <a:solidFill>
                   <a:srgbClr val="FF0000"/>
                 </a:solidFill>
@@ -4070,7 +4173,7 @@
               <a:t>Đặt vé</a:t>
             </a:r>
             <a:r>
-              <a:rPr lang="en-US" sz="1400">
+              <a:rPr lang="en-US" sz="1400" dirty="0">
                 <a:solidFill>
                   <a:srgbClr val="002060"/>
                 </a:solidFill>
@@ -4079,7 +4182,7 @@
               </a:rPr>
               <a:t> theo Phiếu đặt</a:t>
             </a:r>
-            <a:endParaRPr lang="en-US" sz="1400">
+            <a:endParaRPr lang="en-US" sz="1400" dirty="0">
               <a:solidFill>
                 <a:prstClr val="black"/>
               </a:solidFill>
@@ -4092,7 +4195,7 @@
               <a:defRPr/>
             </a:pPr>
             <a:r>
-              <a:rPr lang="en-US" sz="1400" b="1">
+              <a:rPr lang="en-US" sz="1400" b="1" dirty="0">
                 <a:solidFill>
                   <a:prstClr val="black"/>
                 </a:solidFill>
@@ -4102,7 +4205,7 @@
               <a:t> </a:t>
             </a:r>
             <a:r>
-              <a:rPr lang="en-US" sz="1400">
+              <a:rPr lang="en-US" sz="1400" dirty="0">
                 <a:solidFill>
                   <a:srgbClr val="ED7D31">
                     <a:lumMod val="50000"/>
@@ -4114,7 +4217,7 @@
               <a:t>Nhân viên Bán vé </a:t>
             </a:r>
             <a:r>
-              <a:rPr lang="en-US" sz="1400" b="1">
+              <a:rPr lang="en-US" sz="1400" b="1" dirty="0">
                 <a:solidFill>
                   <a:srgbClr val="ED7D31">
                     <a:lumMod val="50000"/>
@@ -4126,7 +4229,7 @@
               <a:t>: </a:t>
             </a:r>
             <a:r>
-              <a:rPr lang="en-US" sz="1400">
+              <a:rPr lang="en-US" sz="1400" dirty="0">
                 <a:solidFill>
                   <a:srgbClr val="FF0000"/>
                 </a:solidFill>
@@ -4136,7 +4239,7 @@
               <a:t>Xem </a:t>
             </a:r>
             <a:r>
-              <a:rPr lang="en-US" sz="1400">
+              <a:rPr lang="en-US" sz="1400" dirty="0">
                 <a:solidFill>
                   <a:srgbClr val="002060"/>
                 </a:solidFill>
@@ -4146,7 +4249,7 @@
               <a:t>  Phim (</a:t>
             </a:r>
             <a:r>
-              <a:rPr lang="en-US" sz="1400">
+              <a:rPr lang="en-US" sz="1400" dirty="0">
                 <a:solidFill>
                   <a:srgbClr val="002060"/>
                 </a:solidFill>
@@ -4157,7 +4260,7 @@
               <a:t>Tên, Đơn giá Bán, </a:t>
             </a:r>
             <a:r>
-              <a:rPr lang="en-US" sz="1400">
+              <a:rPr lang="en-US" sz="1400" dirty="0">
                 <a:solidFill>
                   <a:srgbClr val="002060"/>
                 </a:solidFill>
@@ -4175,7 +4278,7 @@
               <a:t>tên phim, đơn giá, tóm tắt nội dung, hình poster, phân loại, thời lượng, quốc gia, diễn viên, đạo diễn, thể loại, năm sản xuất, suất chiếu, các ghế còn trống của suất chiếu</a:t>
             </a:r>
             <a:r>
-              <a:rPr lang="en-US" sz="1400">
+              <a:rPr lang="en-US" sz="1400" dirty="0">
                 <a:solidFill>
                   <a:srgbClr val="002060"/>
                 </a:solidFill>
@@ -4185,14 +4288,14 @@
               <a:t>)</a:t>
             </a:r>
             <a:r>
-              <a:rPr lang="en-US" sz="1400">
+              <a:rPr lang="en-US" sz="1400" dirty="0">
                 <a:latin typeface="Arial" panose="020B0604020202020204" pitchFamily="34" charset="0"/>
                 <a:cs typeface="Arial" panose="020B0604020202020204" pitchFamily="34" charset="0"/>
               </a:rPr>
               <a:t> </a:t>
             </a:r>
             <a:r>
-              <a:rPr lang="en-US" sz="1400" b="1">
+              <a:rPr lang="en-US" sz="1400" b="1" dirty="0">
                 <a:solidFill>
                   <a:srgbClr val="002060"/>
                 </a:solidFill>
@@ -4202,7 +4305,7 @@
               <a:t> </a:t>
             </a:r>
             <a:br>
-              <a:rPr lang="en-US" sz="1400" b="1">
+              <a:rPr lang="en-US" sz="1400" b="1" dirty="0">
                 <a:solidFill>
                   <a:srgbClr val="002060"/>
                 </a:solidFill>
@@ -4211,7 +4314,7 @@
               </a:rPr>
             </a:br>
             <a:r>
-              <a:rPr lang="en-US" sz="1400" b="1">
+              <a:rPr lang="en-US" sz="1400" b="1" dirty="0">
                 <a:solidFill>
                   <a:srgbClr val="002060"/>
                 </a:solidFill>
@@ -4221,7 +4324,7 @@
               <a:t>                                       </a:t>
             </a:r>
             <a:r>
-              <a:rPr lang="en-US" sz="1400">
+              <a:rPr lang="en-US" sz="1400" dirty="0">
                 <a:solidFill>
                   <a:srgbClr val="FF0000"/>
                 </a:solidFill>
@@ -4231,7 +4334,7 @@
               <a:t>Bán </a:t>
             </a:r>
             <a:r>
-              <a:rPr lang="en-US" sz="1400" b="1">
+              <a:rPr lang="en-US" sz="1400" b="1" dirty="0">
                 <a:solidFill>
                   <a:srgbClr val="002060"/>
                 </a:solidFill>
@@ -4241,27 +4344,27 @@
               <a:t>Vé  </a:t>
             </a:r>
             <a:r>
-              <a:rPr lang="en-US" sz="1400">
+              <a:rPr lang="en-US" sz="1400" dirty="0">
                 <a:latin typeface="Arial" panose="020B0604020202020204" pitchFamily="34" charset="0"/>
                 <a:cs typeface="Arial" panose="020B0604020202020204" pitchFamily="34" charset="0"/>
               </a:rPr>
               <a:t>theo Phiếu Bán</a:t>
             </a:r>
             <a:br>
-              <a:rPr lang="en-US" sz="1400">
+              <a:rPr lang="en-US" sz="1400" dirty="0">
                 <a:latin typeface="Arial" panose="020B0604020202020204" pitchFamily="34" charset="0"/>
                 <a:cs typeface="Arial" panose="020B0604020202020204" pitchFamily="34" charset="0"/>
               </a:rPr>
             </a:br>
             <a:r>
-              <a:rPr lang="en-US" sz="1400">
+              <a:rPr lang="en-US" sz="1400" dirty="0">
                 <a:latin typeface="Arial" panose="020B0604020202020204" pitchFamily="34" charset="0"/>
                 <a:cs typeface="Arial" panose="020B0604020202020204" pitchFamily="34" charset="0"/>
               </a:rPr>
               <a:t> </a:t>
             </a:r>
             <a:r>
-              <a:rPr lang="en-US" sz="1400">
+              <a:rPr lang="en-US" sz="1400" dirty="0">
                 <a:solidFill>
                   <a:srgbClr val="ED7D31">
                     <a:lumMod val="50000"/>
@@ -4273,7 +4376,7 @@
               <a:t>Quản lý  nhân viên </a:t>
             </a:r>
             <a:r>
-              <a:rPr lang="en-US" sz="1400" b="1">
+              <a:rPr lang="en-US" sz="1400" b="1" dirty="0">
                 <a:solidFill>
                   <a:srgbClr val="ED7D31">
                     <a:lumMod val="50000"/>
@@ -4285,7 +4388,7 @@
               <a:t>: </a:t>
             </a:r>
             <a:r>
-              <a:rPr lang="en-US" sz="1400">
+              <a:rPr lang="en-US" sz="1400" dirty="0">
                 <a:solidFill>
                   <a:srgbClr val="FF0000"/>
                 </a:solidFill>
@@ -4295,7 +4398,7 @@
               <a:t>Xem </a:t>
             </a:r>
             <a:r>
-              <a:rPr lang="en-US" sz="1400">
+              <a:rPr lang="en-US" sz="1400" dirty="0">
                 <a:solidFill>
                   <a:srgbClr val="002060"/>
                 </a:solidFill>
@@ -4305,7 +4408,7 @@
               <a:t>  </a:t>
             </a:r>
             <a:r>
-              <a:rPr lang="en-US" sz="1400" b="1">
+              <a:rPr lang="en-US" sz="1400" b="1" dirty="0">
                 <a:solidFill>
                   <a:srgbClr val="002060"/>
                 </a:solidFill>
@@ -4315,7 +4418,7 @@
               <a:t>Thông tin nhân viên</a:t>
             </a:r>
             <a:r>
-              <a:rPr lang="en-US" sz="1400">
+              <a:rPr lang="en-US" sz="1400" dirty="0">
                 <a:solidFill>
                   <a:srgbClr val="002060"/>
                 </a:solidFill>
@@ -4325,14 +4428,24 @@
               <a:t> (Tên,  Mã số, Tên đăng nhập, Mật khẩu)</a:t>
             </a:r>
             <a:r>
-              <a:rPr lang="en-US" sz="1400">
+              <a:rPr lang="en-US" sz="1400" dirty="0">
                 <a:latin typeface="Arial" panose="020B0604020202020204" pitchFamily="34" charset="0"/>
                 <a:cs typeface="Arial" panose="020B0604020202020204" pitchFamily="34" charset="0"/>
               </a:rPr>
               <a:t>  </a:t>
             </a:r>
+            <a:r>
+              <a:rPr lang="en-US" sz="1400" b="1" dirty="0">
+                <a:solidFill>
+                  <a:srgbClr val="002060"/>
+                </a:solidFill>
+                <a:latin typeface="Arial" panose="020B0604020202020204" pitchFamily="34" charset="0"/>
+                <a:cs typeface="Arial" panose="020B0604020202020204" pitchFamily="34" charset="0"/>
+              </a:rPr>
+              <a:t/>
+            </a:r>
             <a:br>
-              <a:rPr lang="en-US" sz="1400" b="1">
+              <a:rPr lang="en-US" sz="1400" b="1" dirty="0">
                 <a:solidFill>
                   <a:srgbClr val="002060"/>
                 </a:solidFill>
@@ -4341,7 +4454,7 @@
               </a:rPr>
             </a:br>
             <a:r>
-              <a:rPr lang="en-US" sz="1400" b="1">
+              <a:rPr lang="en-US" sz="1400" b="1" dirty="0">
                 <a:solidFill>
                   <a:srgbClr val="002060"/>
                 </a:solidFill>
@@ -4351,7 +4464,7 @@
               <a:t>                                  </a:t>
             </a:r>
             <a:r>
-              <a:rPr lang="en-US" sz="1400">
+              <a:rPr lang="en-US" sz="1400" dirty="0">
                 <a:solidFill>
                   <a:srgbClr val="FF0000"/>
                 </a:solidFill>
@@ -4361,7 +4474,7 @@
               <a:t>Cập nhật</a:t>
             </a:r>
             <a:r>
-              <a:rPr lang="en-US" sz="1400">
+              <a:rPr lang="en-US" sz="1400" dirty="0">
                 <a:solidFill>
                   <a:srgbClr val="002060"/>
                 </a:solidFill>
@@ -4371,7 +4484,7 @@
               <a:t>  </a:t>
             </a:r>
             <a:r>
-              <a:rPr lang="en-US" sz="1400" b="1">
+              <a:rPr lang="en-US" sz="1400" b="1" dirty="0">
                 <a:solidFill>
                   <a:srgbClr val="002060"/>
                 </a:solidFill>
@@ -4382,7 +4495,7 @@
               <a:t>Thông tin nhân viên.  </a:t>
             </a:r>
             <a:r>
-              <a:rPr lang="en-US" sz="1400">
+              <a:rPr lang="en-US" sz="1400" dirty="0">
                 <a:solidFill>
                   <a:srgbClr val="FF0000"/>
                 </a:solidFill>
@@ -4393,7 +4506,7 @@
               <a:t>Thêm, Xóa </a:t>
             </a:r>
             <a:r>
-              <a:rPr lang="en-US" sz="1400" b="1">
+              <a:rPr lang="en-US" sz="1400" b="1" dirty="0">
                 <a:solidFill>
                   <a:srgbClr val="002060"/>
                 </a:solidFill>
@@ -4403,8 +4516,18 @@
               </a:rPr>
               <a:t>nhân viên</a:t>
             </a:r>
+            <a:r>
+              <a:rPr lang="en-US" sz="1400" b="1" dirty="0">
+                <a:solidFill>
+                  <a:srgbClr val="002060"/>
+                </a:solidFill>
+                <a:latin typeface="Arial" panose="020B0604020202020204" pitchFamily="34" charset="0"/>
+                <a:cs typeface="Arial" panose="020B0604020202020204" pitchFamily="34" charset="0"/>
+              </a:rPr>
+              <a:t/>
+            </a:r>
             <a:br>
-              <a:rPr lang="en-US" sz="1400" b="1">
+              <a:rPr lang="en-US" sz="1400" b="1" dirty="0">
                 <a:solidFill>
                   <a:srgbClr val="002060"/>
                 </a:solidFill>
@@ -4413,7 +4536,7 @@
               </a:rPr>
             </a:br>
             <a:r>
-              <a:rPr lang="en-US" sz="1400">
+              <a:rPr lang="en-US" sz="1400" dirty="0">
                 <a:solidFill>
                   <a:srgbClr val="FF0000"/>
                 </a:solidFill>
@@ -4423,7 +4546,7 @@
               <a:t> </a:t>
             </a:r>
             <a:r>
-              <a:rPr lang="en-US" sz="1400">
+              <a:rPr lang="en-US" sz="1400" dirty="0">
                 <a:solidFill>
                   <a:srgbClr val="ED7D31">
                     <a:lumMod val="50000"/>
@@ -4435,7 +4558,7 @@
               <a:t>Quản lý Phim </a:t>
             </a:r>
             <a:r>
-              <a:rPr lang="en-US" sz="1400" b="1">
+              <a:rPr lang="en-US" sz="1400" b="1" dirty="0">
                 <a:solidFill>
                   <a:srgbClr val="ED7D31">
                     <a:lumMod val="50000"/>
@@ -4447,7 +4570,7 @@
               <a:t>:  </a:t>
             </a:r>
             <a:r>
-              <a:rPr lang="en-US" sz="1400">
+              <a:rPr lang="en-US" sz="1400" dirty="0">
                 <a:solidFill>
                   <a:srgbClr val="FF0000"/>
                 </a:solidFill>
@@ -4457,7 +4580,7 @@
               <a:t>Xem </a:t>
             </a:r>
             <a:r>
-              <a:rPr lang="en-US" sz="1400">
+              <a:rPr lang="en-US" sz="1400" dirty="0">
                 <a:solidFill>
                   <a:srgbClr val="002060"/>
                 </a:solidFill>
@@ -4467,7 +4590,7 @@
               <a:t> </a:t>
             </a:r>
             <a:r>
-              <a:rPr lang="en-US" sz="1400" b="1">
+              <a:rPr lang="en-US" sz="1400" b="1" dirty="0">
                 <a:solidFill>
                   <a:srgbClr val="002060"/>
                 </a:solidFill>
@@ -4478,7 +4601,7 @@
               <a:t>Phim </a:t>
             </a:r>
             <a:r>
-              <a:rPr lang="en-US" sz="1400">
+              <a:rPr lang="en-US" sz="1400" dirty="0">
                 <a:solidFill>
                   <a:srgbClr val="002060"/>
                 </a:solidFill>
@@ -4488,7 +4611,7 @@
               <a:t>(</a:t>
             </a:r>
             <a:r>
-              <a:rPr lang="en-US" sz="1400">
+              <a:rPr lang="en-US" sz="1400" dirty="0">
                 <a:solidFill>
                   <a:srgbClr val="002060"/>
                 </a:solidFill>
@@ -4499,7 +4622,7 @@
               <a:t>Tên, Đơn giá Bán, </a:t>
             </a:r>
             <a:r>
-              <a:rPr lang="en-US" sz="1400">
+              <a:rPr lang="en-US" sz="1400" dirty="0">
                 <a:solidFill>
                   <a:srgbClr val="002060"/>
                 </a:solidFill>
@@ -4517,7 +4640,7 @@
               <a:t>tên phim, đơn giá, tóm tắt nội dung, hình poster, phân loại, thời lượng, quốc gia, diễn viên, đạo diễn, thể loại, năm sản xuất, suất chiếu, các ghế còn trống của suất chiếu</a:t>
             </a:r>
             <a:r>
-              <a:rPr lang="en-US" sz="1400">
+              <a:rPr lang="en-US" sz="1400" dirty="0">
                 <a:solidFill>
                   <a:srgbClr val="002060"/>
                 </a:solidFill>
@@ -4527,7 +4650,7 @@
               <a:t> ,</a:t>
             </a:r>
             <a:r>
-              <a:rPr lang="en-US" sz="1400" u="sng">
+              <a:rPr lang="en-US" sz="1400" u="sng" dirty="0">
                 <a:solidFill>
                   <a:srgbClr val="002060"/>
                 </a:solidFill>
@@ -4537,7 +4660,7 @@
               <a:t>Doanh thu</a:t>
             </a:r>
             <a:r>
-              <a:rPr lang="en-US" sz="1400">
+              <a:rPr lang="en-US" sz="1400" dirty="0">
                 <a:solidFill>
                   <a:srgbClr val="002060"/>
                 </a:solidFill>
@@ -4547,27 +4670,27 @@
               <a:t>)</a:t>
             </a:r>
             <a:r>
-              <a:rPr lang="en-US" sz="1400">
+              <a:rPr lang="en-US" sz="1400" dirty="0">
                 <a:latin typeface="Arial" panose="020B0604020202020204" pitchFamily="34" charset="0"/>
                 <a:cs typeface="Arial" panose="020B0604020202020204" pitchFamily="34" charset="0"/>
               </a:rPr>
               <a:t> </a:t>
             </a:r>
             <a:br>
-              <a:rPr lang="en-US" sz="1400">
+              <a:rPr lang="en-US" sz="1400" dirty="0">
                 <a:latin typeface="Arial" panose="020B0604020202020204" pitchFamily="34" charset="0"/>
                 <a:cs typeface="Arial" panose="020B0604020202020204" pitchFamily="34" charset="0"/>
               </a:rPr>
             </a:br>
             <a:r>
-              <a:rPr lang="en-US" sz="1400">
+              <a:rPr lang="en-US" sz="1400" dirty="0">
                 <a:latin typeface="Arial" panose="020B0604020202020204" pitchFamily="34" charset="0"/>
                 <a:cs typeface="Arial" panose="020B0604020202020204" pitchFamily="34" charset="0"/>
               </a:rPr>
               <a:t>    </a:t>
             </a:r>
             <a:r>
-              <a:rPr lang="en-US" sz="1400">
+              <a:rPr lang="en-US" sz="1400" dirty="0">
                 <a:solidFill>
                   <a:srgbClr val="002060"/>
                 </a:solidFill>
@@ -4577,7 +4700,7 @@
               <a:t> </a:t>
             </a:r>
             <a:br>
-              <a:rPr lang="en-US" sz="1400">
+              <a:rPr lang="en-US" sz="1400" dirty="0">
                 <a:solidFill>
                   <a:srgbClr val="002060"/>
                 </a:solidFill>
@@ -4586,7 +4709,7 @@
               </a:rPr>
             </a:br>
             <a:r>
-              <a:rPr lang="en-US" sz="1400">
+              <a:rPr lang="en-US" sz="1400" dirty="0">
                 <a:solidFill>
                   <a:srgbClr val="002060"/>
                 </a:solidFill>
@@ -4596,7 +4719,7 @@
               <a:t>                                 </a:t>
             </a:r>
             <a:r>
-              <a:rPr lang="en-US" sz="1400">
+              <a:rPr lang="en-US" sz="1400" dirty="0">
                 <a:solidFill>
                   <a:srgbClr val="FF0000"/>
                 </a:solidFill>
@@ -4606,7 +4729,7 @@
               <a:t>Cập nhật </a:t>
             </a:r>
             <a:r>
-              <a:rPr lang="en-US" sz="1400">
+              <a:rPr lang="en-US" sz="1400" dirty="0">
                 <a:solidFill>
                   <a:srgbClr val="002060"/>
                 </a:solidFill>
@@ -4616,7 +4739,7 @@
               <a:t>Đơn giá Bán, thông tin </a:t>
             </a:r>
             <a:r>
-              <a:rPr lang="en-US" sz="1400" b="1">
+              <a:rPr lang="en-US" sz="1400" b="1" dirty="0">
                 <a:solidFill>
                   <a:srgbClr val="002060"/>
                 </a:solidFill>
@@ -4627,7 +4750,7 @@
               <a:t>Phim , Suất chiếu. </a:t>
             </a:r>
             <a:r>
-              <a:rPr lang="en-US" sz="1400">
+              <a:rPr lang="en-US" sz="1400" dirty="0">
                 <a:solidFill>
                   <a:srgbClr val="FF0000"/>
                 </a:solidFill>
@@ -4638,7 +4761,7 @@
               <a:t>Thêm, Xóa </a:t>
             </a:r>
             <a:r>
-              <a:rPr lang="en-US" sz="1400" b="1">
+              <a:rPr lang="en-US" sz="1400" b="1" dirty="0">
                 <a:solidFill>
                   <a:srgbClr val="002060"/>
                 </a:solidFill>
@@ -4648,7 +4771,7 @@
               </a:rPr>
               <a:t>Phim , Suất chiếu</a:t>
             </a:r>
-            <a:endParaRPr lang="en-US" sz="1400" b="1">
+            <a:endParaRPr lang="en-US" sz="1400" b="1" dirty="0">
               <a:solidFill>
                 <a:srgbClr val="ED7D31">
                   <a:lumMod val="50000"/>
@@ -5540,6 +5663,16 @@
                 </a:rPr>
                 <a:t>Du_lieu</a:t>
               </a:r>
+              <a:r>
+                <a:rPr lang="en-US" sz="1400">
+                  <a:solidFill>
+                    <a:srgbClr val="002060"/>
+                  </a:solidFill>
+                  <a:latin typeface="Arial" panose="020B0604020202020204" pitchFamily="34" charset="0"/>
+                  <a:cs typeface="Arial" panose="020B0604020202020204" pitchFamily="34" charset="0"/>
+                </a:rPr>
+                <a:t/>
+              </a:r>
               <a:br>
                 <a:rPr lang="en-US" sz="1400">
                   <a:solidFill>
@@ -5558,6 +5691,16 @@
                   <a:cs typeface="Arial" panose="020B0604020202020204" pitchFamily="34" charset="0"/>
                 </a:rPr>
                 <a:t> Cong_ty</a:t>
+              </a:r>
+              <a:r>
+                <a:rPr lang="en-US" sz="1400" b="1">
+                  <a:solidFill>
+                    <a:srgbClr val="002060"/>
+                  </a:solidFill>
+                  <a:latin typeface="Arial" panose="020B0604020202020204" pitchFamily="34" charset="0"/>
+                  <a:cs typeface="Arial" panose="020B0604020202020204" pitchFamily="34" charset="0"/>
+                </a:rPr>
+                <a:t/>
               </a:r>
               <a:br>
                 <a:rPr lang="en-US" sz="1400" b="1">
@@ -5998,6 +6141,13 @@
                   <a:cs typeface="Arial" panose="020B0604020202020204" pitchFamily="34" charset="0"/>
                 </a:rPr>
                 <a:t>Ten,Ma_so, Danh_sach_Phong_chieu</a:t>
+              </a:r>
+              <a:r>
+                <a:rPr lang="en-US" sz="1400" i="1">
+                  <a:latin typeface="Arial" panose="020B0604020202020204" pitchFamily="34" charset="0"/>
+                  <a:cs typeface="Arial" panose="020B0604020202020204" pitchFamily="34" charset="0"/>
+                </a:rPr>
+                <a:t/>
               </a:r>
               <a:br>
                 <a:rPr lang="en-US" sz="1400" i="1">
@@ -6244,6 +6394,16 @@
                   <a:cs typeface="Arial" panose="020B0604020202020204" pitchFamily="34" charset="0"/>
                 </a:rPr>
                 <a:t>Ma_so, Bat_dau, Danh_sach_Ghe_trong, Rap, Phong_chieu</a:t>
+              </a:r>
+              <a:r>
+                <a:rPr lang="en-US" sz="1400" i="1">
+                  <a:solidFill>
+                    <a:schemeClr val="tx1"/>
+                  </a:solidFill>
+                  <a:latin typeface="Arial" panose="020B0604020202020204" pitchFamily="34" charset="0"/>
+                  <a:cs typeface="Arial" panose="020B0604020202020204" pitchFamily="34" charset="0"/>
+                </a:rPr>
+                <a:t/>
               </a:r>
               <a:br>
                 <a:rPr lang="en-US" sz="1400" i="1">
@@ -7509,6 +7669,16 @@
               </a:rPr>
               <a:t>Du_lieu</a:t>
             </a:r>
+            <a:r>
+              <a:rPr lang="en-US" sz="1400">
+                <a:solidFill>
+                  <a:srgbClr val="002060"/>
+                </a:solidFill>
+                <a:latin typeface="Arial" panose="020B0604020202020204" pitchFamily="34" charset="0"/>
+                <a:cs typeface="Arial" panose="020B0604020202020204" pitchFamily="34" charset="0"/>
+              </a:rPr>
+              <a:t/>
+            </a:r>
             <a:br>
               <a:rPr lang="en-US" sz="1400">
                 <a:solidFill>
@@ -7527,6 +7697,16 @@
                 <a:cs typeface="Arial" panose="020B0604020202020204" pitchFamily="34" charset="0"/>
               </a:rPr>
               <a:t> Cong_ty</a:t>
+            </a:r>
+            <a:r>
+              <a:rPr lang="en-US" sz="1400" b="1">
+                <a:solidFill>
+                  <a:srgbClr val="002060"/>
+                </a:solidFill>
+                <a:latin typeface="Arial" panose="020B0604020202020204" pitchFamily="34" charset="0"/>
+                <a:cs typeface="Arial" panose="020B0604020202020204" pitchFamily="34" charset="0"/>
+              </a:rPr>
+              <a:t/>
             </a:r>
             <a:br>
               <a:rPr lang="en-US" sz="1400" b="1">
@@ -10816,6 +10996,16 @@
               </a:rPr>
               <a:t>Du_lieu</a:t>
             </a:r>
+            <a:r>
+              <a:rPr lang="en-US" sz="1400" dirty="0">
+                <a:solidFill>
+                  <a:srgbClr val="002060"/>
+                </a:solidFill>
+                <a:latin typeface="Arial" panose="020B0604020202020204" pitchFamily="34" charset="0"/>
+                <a:cs typeface="Arial" panose="020B0604020202020204" pitchFamily="34" charset="0"/>
+              </a:rPr>
+              <a:t/>
+            </a:r>
             <a:br>
               <a:rPr lang="en-US" sz="1400" dirty="0">
                 <a:solidFill>
@@ -10863,6 +11053,16 @@
                 <a:cs typeface="Arial" panose="020B0604020202020204" pitchFamily="34" charset="0"/>
               </a:rPr>
               <a:t>Danh_sach_Nguoi_dung_Noi_bo</a:t>
+            </a:r>
+            <a:r>
+              <a:rPr lang="en-US" sz="1400" b="1" dirty="0">
+                <a:solidFill>
+                  <a:srgbClr val="002060"/>
+                </a:solidFill>
+                <a:latin typeface="Arial" panose="020B0604020202020204" pitchFamily="34" charset="0"/>
+                <a:cs typeface="Arial" panose="020B0604020202020204" pitchFamily="34" charset="0"/>
+              </a:rPr>
+              <a:t/>
             </a:r>
             <a:br>
               <a:rPr lang="en-US" sz="1400" b="1" dirty="0">
@@ -11493,6 +11693,1923 @@
     <p:extLst>
       <p:ext uri="{BB962C8B-B14F-4D97-AF65-F5344CB8AC3E}">
         <p14:creationId xmlns:p14="http://schemas.microsoft.com/office/powerpoint/2010/main" val="3885598075"/>
+      </p:ext>
+    </p:extLst>
+  </p:cSld>
+  <p:clrMapOvr>
+    <a:masterClrMapping/>
+  </p:clrMapOvr>
+</p:sld>
+</file>
+
+<file path=ppt/slides/slide5.xml><?xml version="1.0" encoding="utf-8"?>
+<p:sld xmlns:a="http://schemas.openxmlformats.org/drawingml/2006/main" xmlns:r="http://schemas.openxmlformats.org/officeDocument/2006/relationships" xmlns:p="http://schemas.openxmlformats.org/presentationml/2006/main">
+  <p:cSld>
+    <p:spTree>
+      <p:nvGrpSpPr>
+        <p:cNvPr id="1" name=""/>
+        <p:cNvGrpSpPr/>
+        <p:nvPr/>
+      </p:nvGrpSpPr>
+      <p:grpSpPr>
+        <a:xfrm>
+          <a:off x="0" y="0"/>
+          <a:ext cx="0" cy="0"/>
+          <a:chOff x="0" y="0"/>
+          <a:chExt cx="0" cy="0"/>
+        </a:xfrm>
+      </p:grpSpPr>
+      <p:sp>
+        <p:nvSpPr>
+          <p:cNvPr id="69" name="Rounded Rectangle 68">
+            <a:hlinkClick r:id="rId3" action="ppaction://hlinksldjump"/>
+          </p:cNvPr>
+          <p:cNvSpPr/>
+          <p:nvPr/>
+        </p:nvSpPr>
+        <p:spPr>
+          <a:xfrm>
+            <a:off x="2232941" y="256387"/>
+            <a:ext cx="6074929" cy="754401"/>
+          </a:xfrm>
+          <a:prstGeom prst="roundRect">
+            <a:avLst/>
+          </a:prstGeom>
+          <a:solidFill>
+            <a:srgbClr val="002060"/>
+          </a:solidFill>
+          <a:ln w="38100" cap="rnd">
+            <a:solidFill>
+              <a:schemeClr val="bg1"/>
+            </a:solidFill>
+          </a:ln>
+          <a:effectLst>
+            <a:outerShdw blurRad="482600" dir="5400000" sx="89000" sy="89000" algn="ctr" rotWithShape="0">
+              <a:srgbClr val="000000">
+                <a:alpha val="49000"/>
+              </a:srgbClr>
+            </a:outerShdw>
+          </a:effectLst>
+          <a:scene3d>
+            <a:camera prst="orthographicFront"/>
+            <a:lightRig rig="twoPt" dir="t"/>
+          </a:scene3d>
+          <a:sp3d extrusionH="12700" prstMaterial="translucentPowder">
+            <a:bevelB w="165100" prst="coolSlant"/>
+          </a:sp3d>
+        </p:spPr>
+        <p:style>
+          <a:lnRef idx="2">
+            <a:schemeClr val="accent1">
+              <a:shade val="50000"/>
+            </a:schemeClr>
+          </a:lnRef>
+          <a:fillRef idx="1">
+            <a:schemeClr val="accent1"/>
+          </a:fillRef>
+          <a:effectRef idx="0">
+            <a:schemeClr val="accent1"/>
+          </a:effectRef>
+          <a:fontRef idx="minor">
+            <a:schemeClr val="lt1"/>
+          </a:fontRef>
+        </p:style>
+        <p:txBody>
+          <a:bodyPr rtlCol="0" anchor="ctr"/>
+          <a:lstStyle/>
+          <a:p>
+            <a:pPr algn="ctr"/>
+            <a:r>
+              <a:rPr lang="en-US" sz="1600" b="1" dirty="0" err="1">
+                <a:solidFill>
+                  <a:prstClr val="white"/>
+                </a:solidFill>
+                <a:latin typeface="Arial" panose="020B0604020202020204" pitchFamily="34" charset="0"/>
+                <a:cs typeface="Arial" panose="020B0604020202020204" pitchFamily="34" charset="0"/>
+                <a:sym typeface="+mn-ea"/>
+              </a:rPr>
+              <a:t>Công</a:t>
+            </a:r>
+            <a:r>
+              <a:rPr lang="en-US" sz="1600" b="1" dirty="0">
+                <a:solidFill>
+                  <a:prstClr val="white"/>
+                </a:solidFill>
+                <a:latin typeface="Arial" panose="020B0604020202020204" pitchFamily="34" charset="0"/>
+                <a:cs typeface="Arial" panose="020B0604020202020204" pitchFamily="34" charset="0"/>
+                <a:sym typeface="+mn-ea"/>
+              </a:rPr>
+              <a:t> ty Galaxy Cinema </a:t>
+            </a:r>
+            <a:r>
+              <a:rPr lang="en-US" sz="1600" dirty="0">
+                <a:solidFill>
+                  <a:prstClr val="white"/>
+                </a:solidFill>
+                <a:latin typeface="Arial" panose="020B0604020202020204" pitchFamily="34" charset="0"/>
+                <a:cs typeface="Arial" panose="020B0604020202020204" pitchFamily="34" charset="0"/>
+                <a:sym typeface="+mn-ea"/>
+              </a:rPr>
+              <a:t>( </a:t>
+            </a:r>
+            <a:r>
+              <a:rPr lang="en-US" sz="1600" dirty="0" err="1">
+                <a:solidFill>
+                  <a:prstClr val="white"/>
+                </a:solidFill>
+                <a:latin typeface="Arial" panose="020B0604020202020204" pitchFamily="34" charset="0"/>
+                <a:cs typeface="Arial" panose="020B0604020202020204" pitchFamily="34" charset="0"/>
+                <a:sym typeface="+mn-ea"/>
+              </a:rPr>
+              <a:t>Mã</a:t>
+            </a:r>
+            <a:r>
+              <a:rPr lang="en-US" sz="1600" dirty="0">
+                <a:solidFill>
+                  <a:prstClr val="white"/>
+                </a:solidFill>
+                <a:latin typeface="Arial" panose="020B0604020202020204" pitchFamily="34" charset="0"/>
+                <a:cs typeface="Arial" panose="020B0604020202020204" pitchFamily="34" charset="0"/>
+                <a:sym typeface="+mn-ea"/>
+              </a:rPr>
+              <a:t> </a:t>
+            </a:r>
+            <a:r>
+              <a:rPr lang="en-US" sz="1600" dirty="0" err="1">
+                <a:solidFill>
+                  <a:prstClr val="white"/>
+                </a:solidFill>
+                <a:latin typeface="Arial" panose="020B0604020202020204" pitchFamily="34" charset="0"/>
+                <a:cs typeface="Arial" panose="020B0604020202020204" pitchFamily="34" charset="0"/>
+                <a:sym typeface="+mn-ea"/>
+              </a:rPr>
+              <a:t>số</a:t>
+            </a:r>
+            <a:r>
+              <a:rPr lang="en-US" sz="1600" dirty="0">
+                <a:solidFill>
+                  <a:prstClr val="white"/>
+                </a:solidFill>
+                <a:latin typeface="Arial" panose="020B0604020202020204" pitchFamily="34" charset="0"/>
+                <a:cs typeface="Arial" panose="020B0604020202020204" pitchFamily="34" charset="0"/>
+                <a:sym typeface="+mn-ea"/>
+              </a:rPr>
+              <a:t> : </a:t>
+            </a:r>
+            <a:r>
+              <a:rPr lang="en-US" sz="1600" dirty="0" err="1">
+                <a:solidFill>
+                  <a:schemeClr val="bg1"/>
+                </a:solidFill>
+                <a:latin typeface="Arial" panose="020B0604020202020204" pitchFamily="34" charset="0"/>
+                <a:cs typeface="Arial" panose="020B0604020202020204" pitchFamily="34" charset="0"/>
+                <a:sym typeface="+mn-ea"/>
+              </a:rPr>
+              <a:t>Galaxy_Cinema</a:t>
+            </a:r>
+            <a:r>
+              <a:rPr lang="en-US" sz="1600" dirty="0">
+                <a:solidFill>
+                  <a:prstClr val="white"/>
+                </a:solidFill>
+                <a:latin typeface="Arial" panose="020B0604020202020204" pitchFamily="34" charset="0"/>
+                <a:cs typeface="Arial" panose="020B0604020202020204" pitchFamily="34" charset="0"/>
+                <a:sym typeface="+mn-ea"/>
+              </a:rPr>
+              <a:t>)</a:t>
+            </a:r>
+            <a:endParaRPr lang="en-US" sz="1600" dirty="0">
+              <a:solidFill>
+                <a:prstClr val="white"/>
+              </a:solidFill>
+              <a:latin typeface="Arial" panose="020B0604020202020204" pitchFamily="34" charset="0"/>
+              <a:cs typeface="Arial" panose="020B0604020202020204" pitchFamily="34" charset="0"/>
+            </a:endParaRPr>
+          </a:p>
+          <a:p>
+            <a:pPr algn="ctr"/>
+            <a:r>
+              <a:rPr lang="en-US" sz="1600" b="1" dirty="0">
+                <a:solidFill>
+                  <a:srgbClr val="FFFF00"/>
+                </a:solidFill>
+                <a:latin typeface="Arial" panose="020B0604020202020204" pitchFamily="34" charset="0"/>
+                <a:cs typeface="Arial" panose="020B0604020202020204" pitchFamily="34" charset="0"/>
+                <a:sym typeface="+mn-ea"/>
+              </a:rPr>
+              <a:t>Mô hình Đối tượng xử lý của Phân hệ </a:t>
+            </a:r>
+            <a:r>
+              <a:rPr lang="en-US" sz="1600" b="1" dirty="0" smtClean="0">
+                <a:solidFill>
+                  <a:srgbClr val="FFFF00"/>
+                </a:solidFill>
+                <a:latin typeface="Arial" panose="020B0604020202020204" pitchFamily="34" charset="0"/>
+                <a:cs typeface="Arial" panose="020B0604020202020204" pitchFamily="34" charset="0"/>
+                <a:sym typeface="+mn-ea"/>
+              </a:rPr>
+              <a:t>Quản lý Phim  </a:t>
+            </a:r>
+            <a:endParaRPr lang="vi-VN" sz="1600" dirty="0">
+              <a:solidFill>
+                <a:srgbClr val="FFFF00"/>
+              </a:solidFill>
+              <a:latin typeface="Arial" panose="020B0604020202020204" pitchFamily="34" charset="0"/>
+              <a:cs typeface="Arial" panose="020B0604020202020204" pitchFamily="34" charset="0"/>
+            </a:endParaRPr>
+          </a:p>
+        </p:txBody>
+      </p:sp>
+      <p:sp>
+        <p:nvSpPr>
+          <p:cNvPr id="70" name="Footer Placeholder 2"/>
+          <p:cNvSpPr>
+            <a:spLocks noGrp="1"/>
+          </p:cNvSpPr>
+          <p:nvPr>
+            <p:ph type="ftr" sz="quarter" idx="11"/>
+          </p:nvPr>
+        </p:nvSpPr>
+        <p:spPr>
+          <a:xfrm>
+            <a:off x="6049839" y="5712349"/>
+            <a:ext cx="3273554" cy="365125"/>
+          </a:xfrm>
+        </p:spPr>
+        <p:txBody>
+          <a:bodyPr/>
+          <a:lstStyle/>
+          <a:p>
+            <a:pPr>
+              <a:defRPr/>
+            </a:pPr>
+            <a:r>
+              <a:rPr lang="vi-VN" sz="1600" dirty="0">
+                <a:solidFill>
+                  <a:srgbClr val="002060"/>
+                </a:solidFill>
+                <a:latin typeface="Arial" panose="020B0604020202020204" pitchFamily="34" charset="0"/>
+                <a:cs typeface="Arial" panose="020B0604020202020204" pitchFamily="34" charset="0"/>
+              </a:rPr>
+              <a:t>Nguyễn </a:t>
+            </a:r>
+            <a:r>
+              <a:rPr lang="vi-VN" sz="1600" dirty="0" err="1">
+                <a:solidFill>
+                  <a:srgbClr val="002060"/>
+                </a:solidFill>
+                <a:latin typeface="Arial" panose="020B0604020202020204" pitchFamily="34" charset="0"/>
+                <a:cs typeface="Arial" panose="020B0604020202020204" pitchFamily="34" charset="0"/>
+              </a:rPr>
+              <a:t>tiến</a:t>
+            </a:r>
+            <a:r>
+              <a:rPr lang="vi-VN" sz="1600" dirty="0">
+                <a:solidFill>
+                  <a:srgbClr val="002060"/>
+                </a:solidFill>
+                <a:latin typeface="Arial" panose="020B0604020202020204" pitchFamily="34" charset="0"/>
+                <a:cs typeface="Arial" panose="020B0604020202020204" pitchFamily="34" charset="0"/>
+              </a:rPr>
+              <a:t> Huy   </a:t>
+            </a:r>
+            <a:r>
+              <a:rPr lang="vi-VN" sz="1600" dirty="0" err="1">
+                <a:solidFill>
+                  <a:srgbClr val="002060"/>
+                </a:solidFill>
+                <a:latin typeface="Arial" panose="020B0604020202020204" pitchFamily="34" charset="0"/>
+                <a:cs typeface="Arial" panose="020B0604020202020204" pitchFamily="34" charset="0"/>
+              </a:rPr>
+              <a:t>Tháng</a:t>
+            </a:r>
+            <a:r>
+              <a:rPr lang="vi-VN" sz="1600" dirty="0">
+                <a:solidFill>
+                  <a:srgbClr val="002060"/>
+                </a:solidFill>
+                <a:latin typeface="Arial" panose="020B0604020202020204" pitchFamily="34" charset="0"/>
+                <a:cs typeface="Arial" panose="020B0604020202020204" pitchFamily="34" charset="0"/>
+              </a:rPr>
+              <a:t> </a:t>
+            </a:r>
+            <a:r>
+              <a:rPr lang="en-US" sz="1600" dirty="0">
+                <a:solidFill>
+                  <a:srgbClr val="002060"/>
+                </a:solidFill>
+                <a:latin typeface="Arial" panose="020B0604020202020204" pitchFamily="34" charset="0"/>
+                <a:cs typeface="Arial" panose="020B0604020202020204" pitchFamily="34" charset="0"/>
+              </a:rPr>
+              <a:t>2</a:t>
+            </a:r>
+            <a:r>
+              <a:rPr lang="vi-VN" sz="1600" dirty="0">
+                <a:solidFill>
+                  <a:srgbClr val="002060"/>
+                </a:solidFill>
+                <a:latin typeface="Arial" panose="020B0604020202020204" pitchFamily="34" charset="0"/>
+                <a:cs typeface="Arial" panose="020B0604020202020204" pitchFamily="34" charset="0"/>
+              </a:rPr>
+              <a:t>/201</a:t>
+            </a:r>
+            <a:r>
+              <a:rPr lang="en-US" sz="1600" dirty="0">
+                <a:solidFill>
+                  <a:srgbClr val="002060"/>
+                </a:solidFill>
+                <a:latin typeface="Arial" panose="020B0604020202020204" pitchFamily="34" charset="0"/>
+                <a:cs typeface="Arial" panose="020B0604020202020204" pitchFamily="34" charset="0"/>
+              </a:rPr>
+              <a:t>8</a:t>
+            </a:r>
+            <a:endParaRPr lang="vi-VN" sz="1600" dirty="0">
+              <a:solidFill>
+                <a:srgbClr val="002060"/>
+              </a:solidFill>
+              <a:latin typeface="Arial" panose="020B0604020202020204" pitchFamily="34" charset="0"/>
+              <a:cs typeface="Arial" panose="020B0604020202020204" pitchFamily="34" charset="0"/>
+            </a:endParaRPr>
+          </a:p>
+        </p:txBody>
+      </p:sp>
+      <p:pic>
+        <p:nvPicPr>
+          <p:cNvPr id="71" name="Picture 70">
+            <a:hlinkClick r:id="" action="ppaction://noaction"/>
+          </p:cNvPr>
+          <p:cNvPicPr>
+            <a:picLocks noChangeAspect="1"/>
+          </p:cNvPicPr>
+          <p:nvPr/>
+        </p:nvPicPr>
+        <p:blipFill>
+          <a:blip r:embed="rId4">
+            <a:extLst>
+              <a:ext uri="{28A0092B-C50C-407E-A947-70E740481C1C}">
+                <a14:useLocalDpi xmlns:a14="http://schemas.microsoft.com/office/drawing/2010/main" val="0"/>
+              </a:ext>
+            </a:extLst>
+          </a:blip>
+          <a:stretch>
+            <a:fillRect/>
+          </a:stretch>
+        </p:blipFill>
+        <p:spPr>
+          <a:xfrm>
+            <a:off x="5420103" y="5645562"/>
+            <a:ext cx="562698" cy="453082"/>
+          </a:xfrm>
+          <a:prstGeom prst="rect">
+            <a:avLst/>
+          </a:prstGeom>
+        </p:spPr>
+      </p:pic>
+      <p:sp>
+        <p:nvSpPr>
+          <p:cNvPr id="10" name="Cube 9">
+            <a:hlinkClick r:id="" action="ppaction://noaction"/>
+          </p:cNvPr>
+          <p:cNvSpPr/>
+          <p:nvPr/>
+        </p:nvSpPr>
+        <p:spPr>
+          <a:xfrm>
+            <a:off x="5161897" y="2013059"/>
+            <a:ext cx="4665340" cy="1292616"/>
+          </a:xfrm>
+          <a:prstGeom prst="cube">
+            <a:avLst>
+              <a:gd name="adj" fmla="val 15836"/>
+            </a:avLst>
+          </a:prstGeom>
+          <a:solidFill>
+            <a:schemeClr val="bg1"/>
+          </a:solidFill>
+          <a:ln w="6350">
+            <a:prstDash val="sysDash"/>
+          </a:ln>
+        </p:spPr>
+        <p:style>
+          <a:lnRef idx="2">
+            <a:schemeClr val="accent1">
+              <a:shade val="50000"/>
+            </a:schemeClr>
+          </a:lnRef>
+          <a:fillRef idx="1">
+            <a:schemeClr val="accent1"/>
+          </a:fillRef>
+          <a:effectRef idx="0">
+            <a:schemeClr val="accent1"/>
+          </a:effectRef>
+          <a:fontRef idx="minor">
+            <a:schemeClr val="lt1"/>
+          </a:fontRef>
+        </p:style>
+        <p:txBody>
+          <a:bodyPr rtlCol="0" anchor="ctr"/>
+          <a:lstStyle/>
+          <a:p>
+            <a:pPr algn="ctr"/>
+            <a:endParaRPr lang="vi-VN" sz="3200" b="1">
+              <a:solidFill>
+                <a:prstClr val="white"/>
+              </a:solidFill>
+            </a:endParaRPr>
+          </a:p>
+        </p:txBody>
+      </p:sp>
+      <p:sp>
+        <p:nvSpPr>
+          <p:cNvPr id="11" name="Oval 10"/>
+          <p:cNvSpPr/>
+          <p:nvPr/>
+        </p:nvSpPr>
+        <p:spPr>
+          <a:xfrm>
+            <a:off x="7749054" y="2318725"/>
+            <a:ext cx="1763271" cy="680610"/>
+          </a:xfrm>
+          <a:prstGeom prst="ellipse">
+            <a:avLst/>
+          </a:prstGeom>
+          <a:solidFill>
+            <a:schemeClr val="bg1"/>
+          </a:solidFill>
+        </p:spPr>
+        <p:style>
+          <a:lnRef idx="2">
+            <a:schemeClr val="accent1">
+              <a:shade val="50000"/>
+            </a:schemeClr>
+          </a:lnRef>
+          <a:fillRef idx="1">
+            <a:schemeClr val="accent1"/>
+          </a:fillRef>
+          <a:effectRef idx="0">
+            <a:schemeClr val="accent1"/>
+          </a:effectRef>
+          <a:fontRef idx="minor">
+            <a:schemeClr val="lt1"/>
+          </a:fontRef>
+        </p:style>
+        <p:txBody>
+          <a:bodyPr rtlCol="0" anchor="ctr"/>
+          <a:lstStyle/>
+          <a:p>
+            <a:pPr algn="ctr"/>
+            <a:endParaRPr lang="en-US" sz="1600">
+              <a:solidFill>
+                <a:srgbClr val="FF0000"/>
+              </a:solidFill>
+              <a:latin typeface="Arial" panose="020B0604020202020204" pitchFamily="34" charset="0"/>
+              <a:cs typeface="Arial" panose="020B0604020202020204" pitchFamily="34" charset="0"/>
+            </a:endParaRPr>
+          </a:p>
+          <a:p>
+            <a:pPr algn="ctr"/>
+            <a:r>
+              <a:rPr lang="en-US" sz="1600">
+                <a:solidFill>
+                  <a:srgbClr val="FF0000"/>
+                </a:solidFill>
+                <a:latin typeface="Arial" panose="020B0604020202020204" pitchFamily="34" charset="0"/>
+                <a:cs typeface="Arial" panose="020B0604020202020204" pitchFamily="34" charset="0"/>
+              </a:rPr>
+              <a:t>Lệnh </a:t>
+            </a:r>
+            <a:r>
+              <a:rPr lang="en-US" sz="1600" b="1">
+                <a:solidFill>
+                  <a:srgbClr val="FF0000"/>
+                </a:solidFill>
+                <a:latin typeface="Arial" panose="020B0604020202020204" pitchFamily="34" charset="0"/>
+                <a:cs typeface="Arial" panose="020B0604020202020204" pitchFamily="34" charset="0"/>
+              </a:rPr>
+              <a:t>(3B)</a:t>
+            </a:r>
+            <a:br>
+              <a:rPr lang="en-US" sz="1600" b="1">
+                <a:solidFill>
+                  <a:srgbClr val="FF0000"/>
+                </a:solidFill>
+                <a:latin typeface="Arial" panose="020B0604020202020204" pitchFamily="34" charset="0"/>
+                <a:cs typeface="Arial" panose="020B0604020202020204" pitchFamily="34" charset="0"/>
+              </a:rPr>
+            </a:br>
+            <a:r>
+              <a:rPr lang="en-US" sz="1600" b="1" i="1" u="sng">
+                <a:solidFill>
+                  <a:srgbClr val="FF0000"/>
+                </a:solidFill>
+                <a:latin typeface="Arial" panose="020B0604020202020204" pitchFamily="34" charset="0"/>
+                <a:cs typeface="Arial" panose="020B0604020202020204" pitchFamily="34" charset="0"/>
+              </a:rPr>
+              <a:t> </a:t>
+            </a:r>
+            <a:endParaRPr lang="en-US" sz="1600" b="1">
+              <a:solidFill>
+                <a:srgbClr val="FF0000"/>
+              </a:solidFill>
+              <a:latin typeface="Arial" panose="020B0604020202020204" pitchFamily="34" charset="0"/>
+              <a:cs typeface="Arial" panose="020B0604020202020204" pitchFamily="34" charset="0"/>
+            </a:endParaRPr>
+          </a:p>
+        </p:txBody>
+      </p:sp>
+      <p:grpSp>
+        <p:nvGrpSpPr>
+          <p:cNvPr id="15" name="Group 93"/>
+          <p:cNvGrpSpPr/>
+          <p:nvPr/>
+        </p:nvGrpSpPr>
+        <p:grpSpPr bwMode="auto">
+          <a:xfrm>
+            <a:off x="6275101" y="1190568"/>
+            <a:ext cx="630966" cy="632252"/>
+            <a:chOff x="4628879" y="642920"/>
+            <a:chExt cx="676276" cy="928696"/>
+          </a:xfrm>
+          <a:solidFill>
+            <a:srgbClr val="0070C0"/>
+          </a:solidFill>
+        </p:grpSpPr>
+        <p:sp>
+          <p:nvSpPr>
+            <p:cNvPr id="17" name="Oval 16"/>
+            <p:cNvSpPr/>
+            <p:nvPr/>
+          </p:nvSpPr>
+          <p:spPr>
+            <a:xfrm>
+              <a:off x="4703494" y="642920"/>
+              <a:ext cx="450850" cy="214315"/>
+            </a:xfrm>
+            <a:prstGeom prst="ellipse">
+              <a:avLst/>
+            </a:prstGeom>
+            <a:solidFill>
+              <a:schemeClr val="bg1"/>
+            </a:solidFill>
+            <a:ln w="31750" cmpd="sng">
+              <a:solidFill>
+                <a:schemeClr val="accent2"/>
+              </a:solidFill>
+            </a:ln>
+          </p:spPr>
+          <p:style>
+            <a:lnRef idx="2">
+              <a:schemeClr val="accent1">
+                <a:shade val="50000"/>
+              </a:schemeClr>
+            </a:lnRef>
+            <a:fillRef idx="1">
+              <a:schemeClr val="accent1"/>
+            </a:fillRef>
+            <a:effectRef idx="0">
+              <a:schemeClr val="accent1"/>
+            </a:effectRef>
+            <a:fontRef idx="minor">
+              <a:schemeClr val="lt1"/>
+            </a:fontRef>
+          </p:style>
+          <p:txBody>
+            <a:bodyPr anchor="ctr"/>
+            <a:lstStyle/>
+            <a:p>
+              <a:pPr algn="ctr">
+                <a:defRPr/>
+              </a:pPr>
+              <a:endParaRPr lang="vi-VN">
+                <a:solidFill>
+                  <a:prstClr val="white"/>
+                </a:solidFill>
+              </a:endParaRPr>
+            </a:p>
+          </p:txBody>
+        </p:sp>
+        <p:cxnSp>
+          <p:nvCxnSpPr>
+            <p:cNvPr id="18" name="Straight Arrow Connector 17"/>
+            <p:cNvCxnSpPr>
+              <a:stCxn id="17" idx="4"/>
+            </p:cNvCxnSpPr>
+            <p:nvPr/>
+          </p:nvCxnSpPr>
+          <p:spPr>
+            <a:xfrm rot="5400000">
+              <a:off x="4679679" y="1108062"/>
+              <a:ext cx="500067" cy="1588"/>
+            </a:xfrm>
+            <a:prstGeom prst="straightConnector1">
+              <a:avLst/>
+            </a:prstGeom>
+            <a:grpFill/>
+            <a:ln w="31750" cmpd="sng">
+              <a:solidFill>
+                <a:schemeClr val="accent2"/>
+              </a:solidFill>
+              <a:tailEnd type="none"/>
+            </a:ln>
+          </p:spPr>
+          <p:style>
+            <a:lnRef idx="1">
+              <a:schemeClr val="accent1"/>
+            </a:lnRef>
+            <a:fillRef idx="0">
+              <a:schemeClr val="accent1"/>
+            </a:fillRef>
+            <a:effectRef idx="0">
+              <a:schemeClr val="accent1"/>
+            </a:effectRef>
+            <a:fontRef idx="minor">
+              <a:schemeClr val="tx1"/>
+            </a:fontRef>
+          </p:style>
+        </p:cxnSp>
+        <p:cxnSp>
+          <p:nvCxnSpPr>
+            <p:cNvPr id="19" name="Straight Arrow Connector 18"/>
+            <p:cNvCxnSpPr/>
+            <p:nvPr/>
+          </p:nvCxnSpPr>
+          <p:spPr>
+            <a:xfrm rot="10800000" flipV="1">
+              <a:off x="4628879" y="1000111"/>
+              <a:ext cx="300037" cy="214314"/>
+            </a:xfrm>
+            <a:prstGeom prst="straightConnector1">
+              <a:avLst/>
+            </a:prstGeom>
+            <a:grpFill/>
+            <a:ln w="31750" cmpd="sng">
+              <a:solidFill>
+                <a:schemeClr val="accent2"/>
+              </a:solidFill>
+              <a:tailEnd type="none"/>
+            </a:ln>
+          </p:spPr>
+          <p:style>
+            <a:lnRef idx="1">
+              <a:schemeClr val="accent1"/>
+            </a:lnRef>
+            <a:fillRef idx="0">
+              <a:schemeClr val="accent1"/>
+            </a:fillRef>
+            <a:effectRef idx="0">
+              <a:schemeClr val="accent1"/>
+            </a:effectRef>
+            <a:fontRef idx="minor">
+              <a:schemeClr val="tx1"/>
+            </a:fontRef>
+          </p:style>
+        </p:cxnSp>
+        <p:cxnSp>
+          <p:nvCxnSpPr>
+            <p:cNvPr id="20" name="Straight Arrow Connector 19"/>
+            <p:cNvCxnSpPr/>
+            <p:nvPr/>
+          </p:nvCxnSpPr>
+          <p:spPr>
+            <a:xfrm rot="16200000" flipH="1">
+              <a:off x="4934471" y="1351746"/>
+              <a:ext cx="214315" cy="225426"/>
+            </a:xfrm>
+            <a:prstGeom prst="straightConnector1">
+              <a:avLst/>
+            </a:prstGeom>
+            <a:grpFill/>
+            <a:ln w="31750" cmpd="sng">
+              <a:solidFill>
+                <a:schemeClr val="accent2"/>
+              </a:solidFill>
+              <a:tailEnd type="none"/>
+            </a:ln>
+          </p:spPr>
+          <p:style>
+            <a:lnRef idx="1">
+              <a:schemeClr val="accent1"/>
+            </a:lnRef>
+            <a:fillRef idx="0">
+              <a:schemeClr val="accent1"/>
+            </a:fillRef>
+            <a:effectRef idx="0">
+              <a:schemeClr val="accent1"/>
+            </a:effectRef>
+            <a:fontRef idx="minor">
+              <a:schemeClr val="tx1"/>
+            </a:fontRef>
+          </p:style>
+        </p:cxnSp>
+        <p:cxnSp>
+          <p:nvCxnSpPr>
+            <p:cNvPr id="21" name="Straight Arrow Connector 20"/>
+            <p:cNvCxnSpPr/>
+            <p:nvPr/>
+          </p:nvCxnSpPr>
+          <p:spPr>
+            <a:xfrm rot="5400000">
+              <a:off x="4747145" y="1389846"/>
+              <a:ext cx="214315" cy="149225"/>
+            </a:xfrm>
+            <a:prstGeom prst="straightConnector1">
+              <a:avLst/>
+            </a:prstGeom>
+            <a:grpFill/>
+            <a:ln w="31750" cmpd="sng">
+              <a:solidFill>
+                <a:schemeClr val="accent2"/>
+              </a:solidFill>
+              <a:tailEnd type="none"/>
+            </a:ln>
+          </p:spPr>
+          <p:style>
+            <a:lnRef idx="1">
+              <a:schemeClr val="accent1"/>
+            </a:lnRef>
+            <a:fillRef idx="0">
+              <a:schemeClr val="accent1"/>
+            </a:fillRef>
+            <a:effectRef idx="0">
+              <a:schemeClr val="accent1"/>
+            </a:effectRef>
+            <a:fontRef idx="minor">
+              <a:schemeClr val="tx1"/>
+            </a:fontRef>
+          </p:style>
+        </p:cxnSp>
+        <p:cxnSp>
+          <p:nvCxnSpPr>
+            <p:cNvPr id="22" name="Straight Arrow Connector 21"/>
+            <p:cNvCxnSpPr/>
+            <p:nvPr/>
+          </p:nvCxnSpPr>
+          <p:spPr>
+            <a:xfrm flipV="1">
+              <a:off x="4928917" y="1071547"/>
+              <a:ext cx="376238" cy="71439"/>
+            </a:xfrm>
+            <a:prstGeom prst="straightConnector1">
+              <a:avLst/>
+            </a:prstGeom>
+            <a:grpFill/>
+            <a:ln w="31750" cmpd="sng">
+              <a:solidFill>
+                <a:schemeClr val="accent2"/>
+              </a:solidFill>
+              <a:tailEnd type="none"/>
+            </a:ln>
+          </p:spPr>
+          <p:style>
+            <a:lnRef idx="1">
+              <a:schemeClr val="accent1"/>
+            </a:lnRef>
+            <a:fillRef idx="0">
+              <a:schemeClr val="accent1"/>
+            </a:fillRef>
+            <a:effectRef idx="0">
+              <a:schemeClr val="accent1"/>
+            </a:effectRef>
+            <a:fontRef idx="minor">
+              <a:schemeClr val="tx1"/>
+            </a:fontRef>
+          </p:style>
+        </p:cxnSp>
+        <p:sp>
+          <p:nvSpPr>
+            <p:cNvPr id="23" name="Oval 22"/>
+            <p:cNvSpPr/>
+            <p:nvPr/>
+          </p:nvSpPr>
+          <p:spPr>
+            <a:xfrm>
+              <a:off x="4779699" y="714355"/>
+              <a:ext cx="74614" cy="71437"/>
+            </a:xfrm>
+            <a:prstGeom prst="ellipse">
+              <a:avLst/>
+            </a:prstGeom>
+            <a:grpFill/>
+            <a:ln w="31750" cmpd="sng">
+              <a:solidFill>
+                <a:schemeClr val="bg1"/>
+              </a:solidFill>
+            </a:ln>
+          </p:spPr>
+          <p:style>
+            <a:lnRef idx="2">
+              <a:schemeClr val="accent1">
+                <a:shade val="50000"/>
+              </a:schemeClr>
+            </a:lnRef>
+            <a:fillRef idx="1">
+              <a:schemeClr val="accent1"/>
+            </a:fillRef>
+            <a:effectRef idx="0">
+              <a:schemeClr val="accent1"/>
+            </a:effectRef>
+            <a:fontRef idx="minor">
+              <a:schemeClr val="lt1"/>
+            </a:fontRef>
+          </p:style>
+          <p:txBody>
+            <a:bodyPr anchor="ctr"/>
+            <a:lstStyle/>
+            <a:p>
+              <a:pPr algn="ctr">
+                <a:defRPr/>
+              </a:pPr>
+              <a:endParaRPr lang="vi-VN">
+                <a:solidFill>
+                  <a:prstClr val="white"/>
+                </a:solidFill>
+              </a:endParaRPr>
+            </a:p>
+          </p:txBody>
+        </p:sp>
+        <p:sp>
+          <p:nvSpPr>
+            <p:cNvPr id="24" name="Oval 23"/>
+            <p:cNvSpPr/>
+            <p:nvPr/>
+          </p:nvSpPr>
+          <p:spPr>
+            <a:xfrm>
+              <a:off x="5005149" y="714358"/>
+              <a:ext cx="74614" cy="71437"/>
+            </a:xfrm>
+            <a:prstGeom prst="ellipse">
+              <a:avLst/>
+            </a:prstGeom>
+            <a:grpFill/>
+            <a:ln w="31750" cmpd="sng">
+              <a:solidFill>
+                <a:schemeClr val="bg1"/>
+              </a:solidFill>
+            </a:ln>
+          </p:spPr>
+          <p:style>
+            <a:lnRef idx="2">
+              <a:schemeClr val="accent1">
+                <a:shade val="50000"/>
+              </a:schemeClr>
+            </a:lnRef>
+            <a:fillRef idx="1">
+              <a:schemeClr val="accent1"/>
+            </a:fillRef>
+            <a:effectRef idx="0">
+              <a:schemeClr val="accent1"/>
+            </a:effectRef>
+            <a:fontRef idx="minor">
+              <a:schemeClr val="lt1"/>
+            </a:fontRef>
+          </p:style>
+          <p:txBody>
+            <a:bodyPr anchor="ctr"/>
+            <a:lstStyle/>
+            <a:p>
+              <a:pPr algn="ctr">
+                <a:defRPr/>
+              </a:pPr>
+              <a:endParaRPr lang="vi-VN">
+                <a:solidFill>
+                  <a:prstClr val="white"/>
+                </a:solidFill>
+              </a:endParaRPr>
+            </a:p>
+          </p:txBody>
+        </p:sp>
+      </p:grpSp>
+      <p:sp>
+        <p:nvSpPr>
+          <p:cNvPr id="16" name="TextBox 15">
+            <a:hlinkClick r:id="" action="ppaction://noaction"/>
+          </p:cNvPr>
+          <p:cNvSpPr txBox="1"/>
+          <p:nvPr/>
+        </p:nvSpPr>
+        <p:spPr>
+          <a:xfrm>
+            <a:off x="5781745" y="1703035"/>
+            <a:ext cx="2765467" cy="338554"/>
+          </a:xfrm>
+          <a:prstGeom prst="rect">
+            <a:avLst/>
+          </a:prstGeom>
+          <a:solidFill>
+            <a:schemeClr val="bg1"/>
+          </a:solidFill>
+          <a:ln>
+            <a:solidFill>
+              <a:schemeClr val="accent2">
+                <a:lumMod val="50000"/>
+              </a:schemeClr>
+            </a:solidFill>
+          </a:ln>
+        </p:spPr>
+        <p:txBody>
+          <a:bodyPr wrap="square" rtlCol="0">
+            <a:spAutoFit/>
+          </a:bodyPr>
+          <a:lstStyle/>
+          <a:p>
+            <a:r>
+              <a:rPr lang="en-US" sz="1600" dirty="0" err="1">
+                <a:solidFill>
+                  <a:schemeClr val="accent2">
+                    <a:lumMod val="50000"/>
+                  </a:schemeClr>
+                </a:solidFill>
+                <a:latin typeface="Arial" panose="020B0604020202020204" pitchFamily="34" charset="0"/>
+                <a:cs typeface="Arial" panose="020B0604020202020204" pitchFamily="34" charset="0"/>
+              </a:rPr>
+              <a:t>Màn</a:t>
+            </a:r>
+            <a:r>
+              <a:rPr lang="en-US" sz="1600" dirty="0">
+                <a:solidFill>
+                  <a:schemeClr val="accent2">
+                    <a:lumMod val="50000"/>
+                  </a:schemeClr>
+                </a:solidFill>
+                <a:latin typeface="Arial" panose="020B0604020202020204" pitchFamily="34" charset="0"/>
+                <a:cs typeface="Arial" panose="020B0604020202020204" pitchFamily="34" charset="0"/>
+              </a:rPr>
+              <a:t> </a:t>
+            </a:r>
+            <a:r>
+              <a:rPr lang="en-US" sz="1600" dirty="0" err="1">
+                <a:solidFill>
+                  <a:schemeClr val="accent2">
+                    <a:lumMod val="50000"/>
+                  </a:schemeClr>
+                </a:solidFill>
+                <a:latin typeface="Arial" panose="020B0604020202020204" pitchFamily="34" charset="0"/>
+                <a:cs typeface="Arial" panose="020B0604020202020204" pitchFamily="34" charset="0"/>
+              </a:rPr>
+              <a:t>hình</a:t>
+            </a:r>
+            <a:r>
+              <a:rPr lang="en-US" sz="1600" dirty="0">
+                <a:solidFill>
+                  <a:schemeClr val="accent2">
+                    <a:lumMod val="50000"/>
+                  </a:schemeClr>
+                </a:solidFill>
+                <a:latin typeface="Arial" panose="020B0604020202020204" pitchFamily="34" charset="0"/>
+                <a:cs typeface="Arial" panose="020B0604020202020204" pitchFamily="34" charset="0"/>
+              </a:rPr>
+              <a:t> </a:t>
+            </a:r>
+            <a:r>
+              <a:rPr lang="en-US" sz="1600" dirty="0" err="1">
+                <a:solidFill>
+                  <a:schemeClr val="accent2">
+                    <a:lumMod val="50000"/>
+                  </a:schemeClr>
+                </a:solidFill>
+                <a:latin typeface="Arial" panose="020B0604020202020204" pitchFamily="34" charset="0"/>
+                <a:cs typeface="Arial" panose="020B0604020202020204" pitchFamily="34" charset="0"/>
+              </a:rPr>
+              <a:t>Giao</a:t>
+            </a:r>
+            <a:r>
+              <a:rPr lang="en-US" sz="1600" dirty="0">
+                <a:solidFill>
+                  <a:schemeClr val="accent2">
+                    <a:lumMod val="50000"/>
+                  </a:schemeClr>
+                </a:solidFill>
+                <a:latin typeface="Arial" panose="020B0604020202020204" pitchFamily="34" charset="0"/>
+                <a:cs typeface="Arial" panose="020B0604020202020204" pitchFamily="34" charset="0"/>
+              </a:rPr>
+              <a:t> </a:t>
+            </a:r>
+            <a:r>
+              <a:rPr lang="en-US" sz="1600" dirty="0" err="1">
+                <a:solidFill>
+                  <a:schemeClr val="accent2">
+                    <a:lumMod val="50000"/>
+                  </a:schemeClr>
+                </a:solidFill>
+                <a:latin typeface="Arial" panose="020B0604020202020204" pitchFamily="34" charset="0"/>
+                <a:cs typeface="Arial" panose="020B0604020202020204" pitchFamily="34" charset="0"/>
+              </a:rPr>
+              <a:t>diện</a:t>
+            </a:r>
+            <a:r>
+              <a:rPr lang="en-US" sz="1600" dirty="0">
+                <a:solidFill>
+                  <a:schemeClr val="accent2">
+                    <a:lumMod val="50000"/>
+                  </a:schemeClr>
+                </a:solidFill>
+                <a:latin typeface="Arial" panose="020B0604020202020204" pitchFamily="34" charset="0"/>
+                <a:cs typeface="Arial" panose="020B0604020202020204" pitchFamily="34" charset="0"/>
+              </a:rPr>
+              <a:t> </a:t>
+            </a:r>
+            <a:r>
+              <a:rPr lang="en-US" sz="1600" b="1" dirty="0">
+                <a:solidFill>
+                  <a:schemeClr val="accent2">
+                    <a:lumMod val="50000"/>
+                  </a:schemeClr>
+                </a:solidFill>
+                <a:latin typeface="Arial" panose="020B0604020202020204" pitchFamily="34" charset="0"/>
+                <a:cs typeface="Arial" panose="020B0604020202020204" pitchFamily="34" charset="0"/>
+              </a:rPr>
+              <a:t>(1 )</a:t>
+            </a:r>
+            <a:endParaRPr lang="en-US" sz="1600" b="1" i="1" u="sng" dirty="0">
+              <a:solidFill>
+                <a:schemeClr val="accent2">
+                  <a:lumMod val="50000"/>
+                </a:schemeClr>
+              </a:solidFill>
+            </a:endParaRPr>
+          </a:p>
+        </p:txBody>
+      </p:sp>
+      <p:sp>
+        <p:nvSpPr>
+          <p:cNvPr id="31" name="TextBox 30">
+            <a:hlinkClick r:id="" action="ppaction://noaction"/>
+          </p:cNvPr>
+          <p:cNvSpPr txBox="1"/>
+          <p:nvPr/>
+        </p:nvSpPr>
+        <p:spPr>
+          <a:xfrm>
+            <a:off x="5611780" y="4481689"/>
+            <a:ext cx="2765467" cy="338553"/>
+          </a:xfrm>
+          <a:prstGeom prst="rect">
+            <a:avLst/>
+          </a:prstGeom>
+          <a:solidFill>
+            <a:schemeClr val="bg1"/>
+          </a:solidFill>
+          <a:ln>
+            <a:solidFill>
+              <a:schemeClr val="accent2">
+                <a:lumMod val="50000"/>
+              </a:schemeClr>
+            </a:solidFill>
+          </a:ln>
+        </p:spPr>
+        <p:txBody>
+          <a:bodyPr wrap="square" rtlCol="0">
+            <a:spAutoFit/>
+          </a:bodyPr>
+          <a:lstStyle/>
+          <a:p>
+            <a:r>
+              <a:rPr lang="en-US" sz="1600" dirty="0" err="1">
+                <a:solidFill>
+                  <a:schemeClr val="accent2">
+                    <a:lumMod val="50000"/>
+                  </a:schemeClr>
+                </a:solidFill>
+                <a:latin typeface="Arial" panose="020B0604020202020204" pitchFamily="34" charset="0"/>
+                <a:cs typeface="Arial" panose="020B0604020202020204" pitchFamily="34" charset="0"/>
+              </a:rPr>
+              <a:t>Dịch</a:t>
+            </a:r>
+            <a:r>
+              <a:rPr lang="en-US" sz="1600" dirty="0">
+                <a:solidFill>
+                  <a:schemeClr val="accent2">
+                    <a:lumMod val="50000"/>
+                  </a:schemeClr>
+                </a:solidFill>
+                <a:latin typeface="Arial" panose="020B0604020202020204" pitchFamily="34" charset="0"/>
+                <a:cs typeface="Arial" panose="020B0604020202020204" pitchFamily="34" charset="0"/>
+              </a:rPr>
+              <a:t> </a:t>
+            </a:r>
+            <a:r>
+              <a:rPr lang="en-US" sz="1600" dirty="0" err="1">
+                <a:solidFill>
+                  <a:schemeClr val="accent2">
+                    <a:lumMod val="50000"/>
+                  </a:schemeClr>
+                </a:solidFill>
+                <a:latin typeface="Arial" panose="020B0604020202020204" pitchFamily="34" charset="0"/>
+                <a:cs typeface="Arial" panose="020B0604020202020204" pitchFamily="34" charset="0"/>
+              </a:rPr>
+              <a:t>vụ</a:t>
+            </a:r>
+            <a:r>
+              <a:rPr lang="en-US" sz="1600" dirty="0">
+                <a:solidFill>
+                  <a:schemeClr val="accent2">
+                    <a:lumMod val="50000"/>
+                  </a:schemeClr>
+                </a:solidFill>
+                <a:latin typeface="Arial" panose="020B0604020202020204" pitchFamily="34" charset="0"/>
+                <a:cs typeface="Arial" panose="020B0604020202020204" pitchFamily="34" charset="0"/>
+              </a:rPr>
+              <a:t> </a:t>
+            </a:r>
+            <a:r>
+              <a:rPr lang="en-US" sz="1600" dirty="0" err="1">
+                <a:solidFill>
+                  <a:schemeClr val="accent2">
+                    <a:lumMod val="50000"/>
+                  </a:schemeClr>
+                </a:solidFill>
+                <a:latin typeface="Arial" panose="020B0604020202020204" pitchFamily="34" charset="0"/>
+                <a:cs typeface="Arial" panose="020B0604020202020204" pitchFamily="34" charset="0"/>
+              </a:rPr>
+              <a:t>Giao</a:t>
+            </a:r>
+            <a:r>
+              <a:rPr lang="en-US" sz="1600" dirty="0">
+                <a:solidFill>
+                  <a:schemeClr val="accent2">
+                    <a:lumMod val="50000"/>
+                  </a:schemeClr>
+                </a:solidFill>
+                <a:latin typeface="Arial" panose="020B0604020202020204" pitchFamily="34" charset="0"/>
+                <a:cs typeface="Arial" panose="020B0604020202020204" pitchFamily="34" charset="0"/>
+              </a:rPr>
+              <a:t> </a:t>
+            </a:r>
+            <a:r>
+              <a:rPr lang="en-US" sz="1600" dirty="0" err="1">
+                <a:solidFill>
+                  <a:schemeClr val="accent2">
+                    <a:lumMod val="50000"/>
+                  </a:schemeClr>
+                </a:solidFill>
+                <a:latin typeface="Arial" panose="020B0604020202020204" pitchFamily="34" charset="0"/>
+                <a:cs typeface="Arial" panose="020B0604020202020204" pitchFamily="34" charset="0"/>
+              </a:rPr>
+              <a:t>tiếp</a:t>
+            </a:r>
+            <a:r>
+              <a:rPr lang="en-US" sz="1600" dirty="0">
+                <a:solidFill>
+                  <a:schemeClr val="accent2">
+                    <a:lumMod val="50000"/>
+                  </a:schemeClr>
+                </a:solidFill>
+                <a:latin typeface="Arial" panose="020B0604020202020204" pitchFamily="34" charset="0"/>
+                <a:cs typeface="Arial" panose="020B0604020202020204" pitchFamily="34" charset="0"/>
+              </a:rPr>
+              <a:t> </a:t>
+            </a:r>
+            <a:r>
+              <a:rPr lang="en-US" sz="1600" b="1" dirty="0">
+                <a:solidFill>
+                  <a:schemeClr val="accent2">
+                    <a:lumMod val="50000"/>
+                  </a:schemeClr>
+                </a:solidFill>
+                <a:latin typeface="Arial" panose="020B0604020202020204" pitchFamily="34" charset="0"/>
+                <a:cs typeface="Arial" panose="020B0604020202020204" pitchFamily="34" charset="0"/>
+              </a:rPr>
+              <a:t>(1 )</a:t>
+            </a:r>
+            <a:endParaRPr lang="en-US" sz="1600" b="1" i="1" u="sng" dirty="0">
+              <a:solidFill>
+                <a:schemeClr val="accent2">
+                  <a:lumMod val="50000"/>
+                </a:schemeClr>
+              </a:solidFill>
+            </a:endParaRPr>
+          </a:p>
+        </p:txBody>
+      </p:sp>
+      <p:cxnSp>
+        <p:nvCxnSpPr>
+          <p:cNvPr id="3" name="Straight Arrow Connector 2"/>
+          <p:cNvCxnSpPr/>
+          <p:nvPr/>
+        </p:nvCxnSpPr>
+        <p:spPr>
+          <a:xfrm flipV="1">
+            <a:off x="6448132" y="3312120"/>
+            <a:ext cx="0" cy="1117053"/>
+          </a:xfrm>
+          <a:prstGeom prst="straightConnector1">
+            <a:avLst/>
+          </a:prstGeom>
+          <a:ln w="50800">
+            <a:solidFill>
+              <a:schemeClr val="tx1"/>
+            </a:solidFill>
+            <a:tailEnd type="triangle"/>
+          </a:ln>
+        </p:spPr>
+        <p:style>
+          <a:lnRef idx="1">
+            <a:schemeClr val="accent1"/>
+          </a:lnRef>
+          <a:fillRef idx="0">
+            <a:schemeClr val="accent1"/>
+          </a:fillRef>
+          <a:effectRef idx="0">
+            <a:schemeClr val="accent1"/>
+          </a:effectRef>
+          <a:fontRef idx="minor">
+            <a:schemeClr val="tx1"/>
+          </a:fontRef>
+        </p:style>
+      </p:cxnSp>
+      <p:sp>
+        <p:nvSpPr>
+          <p:cNvPr id="32" name="TextBox 31">
+            <a:hlinkClick r:id="" action="ppaction://noaction"/>
+          </p:cNvPr>
+          <p:cNvSpPr txBox="1"/>
+          <p:nvPr/>
+        </p:nvSpPr>
+        <p:spPr>
+          <a:xfrm>
+            <a:off x="5161897" y="3737888"/>
+            <a:ext cx="1063470" cy="307777"/>
+          </a:xfrm>
+          <a:prstGeom prst="rect">
+            <a:avLst/>
+          </a:prstGeom>
+          <a:solidFill>
+            <a:schemeClr val="bg1"/>
+          </a:solidFill>
+          <a:ln w="41275">
+            <a:solidFill>
+              <a:schemeClr val="tx1"/>
+            </a:solidFill>
+            <a:prstDash val="sysDash"/>
+          </a:ln>
+        </p:spPr>
+        <p:txBody>
+          <a:bodyPr wrap="square" rtlCol="0">
+            <a:spAutoFit/>
+          </a:bodyPr>
+          <a:lstStyle/>
+          <a:p>
+            <a:pPr algn="ctr"/>
+            <a:r>
+              <a:rPr lang="en-US" sz="1400">
+                <a:latin typeface="Arial" panose="020B0604020202020204" pitchFamily="34" charset="0"/>
+                <a:cs typeface="Arial" panose="020B0604020202020204" pitchFamily="34" charset="0"/>
+              </a:rPr>
+              <a:t>Du_lieu</a:t>
+            </a:r>
+          </a:p>
+        </p:txBody>
+      </p:sp>
+      <p:sp>
+        <p:nvSpPr>
+          <p:cNvPr id="33" name="TextBox 32">
+            <a:hlinkClick r:id="" action="ppaction://noaction"/>
+          </p:cNvPr>
+          <p:cNvSpPr txBox="1"/>
+          <p:nvPr/>
+        </p:nvSpPr>
+        <p:spPr>
+          <a:xfrm>
+            <a:off x="7314770" y="873216"/>
+            <a:ext cx="4438510" cy="1015663"/>
+          </a:xfrm>
+          <a:prstGeom prst="rect">
+            <a:avLst/>
+          </a:prstGeom>
+          <a:solidFill>
+            <a:schemeClr val="bg1"/>
+          </a:solidFill>
+          <a:ln>
+            <a:solidFill>
+              <a:schemeClr val="accent1"/>
+            </a:solidFill>
+          </a:ln>
+        </p:spPr>
+        <p:txBody>
+          <a:bodyPr wrap="square" rtlCol="0">
+            <a:spAutoFit/>
+          </a:bodyPr>
+          <a:lstStyle/>
+          <a:p>
+            <a:pPr>
+              <a:defRPr/>
+            </a:pPr>
+            <a:r>
+              <a:rPr lang="en-US" sz="1200" dirty="0">
+                <a:solidFill>
+                  <a:srgbClr val="FF0000"/>
+                </a:solidFill>
+                <a:latin typeface="Arial" panose="020B0604020202020204" pitchFamily="34" charset="0"/>
+                <a:cs typeface="Arial" panose="020B0604020202020204" pitchFamily="34" charset="0"/>
+                <a:sym typeface="+mn-ea"/>
+              </a:rPr>
+              <a:t>Xem </a:t>
+            </a:r>
+            <a:r>
+              <a:rPr lang="en-US" sz="1200" dirty="0">
+                <a:solidFill>
+                  <a:srgbClr val="002060"/>
+                </a:solidFill>
+                <a:latin typeface="Arial" panose="020B0604020202020204" pitchFamily="34" charset="0"/>
+                <a:cs typeface="Arial" panose="020B0604020202020204" pitchFamily="34" charset="0"/>
+                <a:sym typeface="+mn-ea"/>
+              </a:rPr>
+              <a:t>  </a:t>
+            </a:r>
+            <a:r>
+              <a:rPr lang="en-US" sz="1200" b="1" dirty="0" smtClean="0">
+                <a:solidFill>
+                  <a:srgbClr val="002060"/>
+                </a:solidFill>
+                <a:latin typeface="Arial" panose="020B0604020202020204" pitchFamily="34" charset="0"/>
+                <a:cs typeface="Arial" panose="020B0604020202020204" pitchFamily="34" charset="0"/>
+                <a:sym typeface="+mn-ea"/>
+              </a:rPr>
+              <a:t>Phim(</a:t>
+            </a:r>
+            <a:r>
+              <a:rPr lang="en-US" sz="1200" dirty="0">
+                <a:solidFill>
+                  <a:srgbClr val="002060"/>
+                </a:solidFill>
+                <a:latin typeface="Arial" panose="020B0604020202020204" pitchFamily="34" charset="0"/>
+                <a:cs typeface="Arial" panose="020B0604020202020204" pitchFamily="34" charset="0"/>
+                <a:sym typeface="+mn-ea"/>
+              </a:rPr>
+              <a:t>Tên, Đơn giá Bán, </a:t>
+            </a:r>
+            <a:r>
+              <a:rPr lang="en-US" sz="1200" dirty="0">
+                <a:solidFill>
+                  <a:srgbClr val="002060"/>
+                </a:solidFill>
+                <a:effectLst>
+                  <a:outerShdw blurRad="38100" dist="19050" dir="2700000" algn="tl" rotWithShape="0">
+                    <a:schemeClr val="dk1">
+                      <a:alpha val="40000"/>
+                    </a:schemeClr>
+                  </a:outerShdw>
+                </a:effectLst>
+                <a:latin typeface="Arial" panose="020B0604020202020204" pitchFamily="34" charset="0"/>
+                <a:cs typeface="Arial" panose="020B0604020202020204" pitchFamily="34" charset="0"/>
+                <a:sym typeface="+mn-ea"/>
+              </a:rPr>
+              <a:t>tên phim, đơn giá, tóm tắt nội dung, hình poster, phân loại, thời lượng, quốc gia, diễn viên, đạo diễn, thể loại, năm sản xuất, suất chiếu, các ghế còn trống của suất chiếu</a:t>
+            </a:r>
+            <a:r>
+              <a:rPr lang="en-US" sz="1200" dirty="0">
+                <a:solidFill>
+                  <a:srgbClr val="002060"/>
+                </a:solidFill>
+                <a:latin typeface="Arial" panose="020B0604020202020204" pitchFamily="34" charset="0"/>
+                <a:cs typeface="Arial" panose="020B0604020202020204" pitchFamily="34" charset="0"/>
+              </a:rPr>
+              <a:t> ,</a:t>
+            </a:r>
+            <a:r>
+              <a:rPr lang="en-US" sz="1200" u="sng" dirty="0">
+                <a:solidFill>
+                  <a:srgbClr val="002060"/>
+                </a:solidFill>
+                <a:latin typeface="Arial" panose="020B0604020202020204" pitchFamily="34" charset="0"/>
+                <a:cs typeface="Arial" panose="020B0604020202020204" pitchFamily="34" charset="0"/>
+              </a:rPr>
+              <a:t>Doanh thu</a:t>
+            </a:r>
+            <a:r>
+              <a:rPr lang="en-US" sz="1200" dirty="0" smtClean="0">
+                <a:solidFill>
+                  <a:srgbClr val="002060"/>
+                </a:solidFill>
+                <a:latin typeface="Arial" panose="020B0604020202020204" pitchFamily="34" charset="0"/>
+                <a:cs typeface="Arial" panose="020B0604020202020204" pitchFamily="34" charset="0"/>
+                <a:sym typeface="+mn-ea"/>
+              </a:rPr>
+              <a:t>), </a:t>
+            </a:r>
+            <a:r>
+              <a:rPr lang="en-US" sz="1200" dirty="0">
+                <a:solidFill>
+                  <a:srgbClr val="FF0000"/>
+                </a:solidFill>
+                <a:latin typeface="Arial" panose="020B0604020202020204" pitchFamily="34" charset="0"/>
+                <a:cs typeface="Arial" panose="020B0604020202020204" pitchFamily="34" charset="0"/>
+              </a:rPr>
+              <a:t>Cập nhật </a:t>
+            </a:r>
+            <a:r>
+              <a:rPr lang="en-US" sz="1200" dirty="0">
+                <a:solidFill>
+                  <a:srgbClr val="002060"/>
+                </a:solidFill>
+                <a:latin typeface="Arial" panose="020B0604020202020204" pitchFamily="34" charset="0"/>
+                <a:cs typeface="Arial" panose="020B0604020202020204" pitchFamily="34" charset="0"/>
+              </a:rPr>
+              <a:t>Đơn giá Bán, thông tin </a:t>
+            </a:r>
+            <a:r>
+              <a:rPr lang="en-US" sz="1200" b="1" dirty="0">
+                <a:solidFill>
+                  <a:srgbClr val="002060"/>
+                </a:solidFill>
+                <a:latin typeface="Arial" panose="020B0604020202020204" pitchFamily="34" charset="0"/>
+                <a:cs typeface="Arial" panose="020B0604020202020204" pitchFamily="34" charset="0"/>
+                <a:sym typeface="+mn-ea"/>
+              </a:rPr>
+              <a:t>Phim , Suất chiếu. </a:t>
+            </a:r>
+            <a:r>
+              <a:rPr lang="en-US" sz="1200" dirty="0">
+                <a:solidFill>
+                  <a:srgbClr val="FF0000"/>
+                </a:solidFill>
+                <a:latin typeface="Arial" panose="020B0604020202020204" pitchFamily="34" charset="0"/>
+                <a:cs typeface="Arial" panose="020B0604020202020204" pitchFamily="34" charset="0"/>
+                <a:sym typeface="+mn-ea"/>
+              </a:rPr>
+              <a:t>Thêm, Xóa </a:t>
+            </a:r>
+            <a:r>
+              <a:rPr lang="en-US" sz="1200" b="1" dirty="0">
+                <a:solidFill>
+                  <a:srgbClr val="002060"/>
+                </a:solidFill>
+                <a:latin typeface="Arial" panose="020B0604020202020204" pitchFamily="34" charset="0"/>
+                <a:cs typeface="Arial" panose="020B0604020202020204" pitchFamily="34" charset="0"/>
+                <a:sym typeface="+mn-ea"/>
+              </a:rPr>
+              <a:t>Phim , Suất chiếu</a:t>
+            </a:r>
+            <a:endParaRPr lang="en-US" sz="1200" b="1" dirty="0">
+              <a:solidFill>
+                <a:srgbClr val="ED7D31">
+                  <a:lumMod val="50000"/>
+                </a:srgbClr>
+              </a:solidFill>
+              <a:latin typeface="Arial" panose="020B0604020202020204" pitchFamily="34" charset="0"/>
+              <a:cs typeface="Arial" panose="020B0604020202020204" pitchFamily="34" charset="0"/>
+            </a:endParaRPr>
+          </a:p>
+        </p:txBody>
+      </p:sp>
+      <p:sp>
+        <p:nvSpPr>
+          <p:cNvPr id="2" name="TextBox 11">
+            <a:hlinkClick r:id="" action="ppaction://noaction"/>
+          </p:cNvPr>
+          <p:cNvSpPr txBox="1"/>
+          <p:nvPr/>
+        </p:nvSpPr>
+        <p:spPr>
+          <a:xfrm>
+            <a:off x="5290726" y="2272773"/>
+            <a:ext cx="2355453" cy="738664"/>
+          </a:xfrm>
+          <a:prstGeom prst="rect">
+            <a:avLst/>
+          </a:prstGeom>
+          <a:solidFill>
+            <a:schemeClr val="bg1"/>
+          </a:solidFill>
+          <a:ln w="41275">
+            <a:solidFill>
+              <a:srgbClr val="002060"/>
+            </a:solidFill>
+            <a:prstDash val="sysDash"/>
+          </a:ln>
+        </p:spPr>
+        <p:txBody>
+          <a:bodyPr wrap="square" rtlCol="0">
+            <a:spAutoFit/>
+          </a:bodyPr>
+          <a:lstStyle/>
+          <a:p>
+            <a:r>
+              <a:rPr lang="en-US" sz="1400" b="1" dirty="0" err="1">
+                <a:solidFill>
+                  <a:srgbClr val="002060"/>
+                </a:solidFill>
+                <a:latin typeface="Arial" panose="020B0604020202020204" pitchFamily="34" charset="0"/>
+                <a:cs typeface="Arial" panose="020B0604020202020204" pitchFamily="34" charset="0"/>
+              </a:rPr>
+              <a:t>Du_lieu</a:t>
+            </a:r>
+            <a:r>
+              <a:rPr lang="en-US" sz="1400" dirty="0">
+                <a:solidFill>
+                  <a:srgbClr val="002060"/>
+                </a:solidFill>
+                <a:latin typeface="Arial" panose="020B0604020202020204" pitchFamily="34" charset="0"/>
+                <a:cs typeface="Arial" panose="020B0604020202020204" pitchFamily="34" charset="0"/>
+              </a:rPr>
+              <a:t/>
+            </a:r>
+            <a:br>
+              <a:rPr lang="en-US" sz="1400" dirty="0">
+                <a:solidFill>
+                  <a:srgbClr val="002060"/>
+                </a:solidFill>
+                <a:latin typeface="Arial" panose="020B0604020202020204" pitchFamily="34" charset="0"/>
+                <a:cs typeface="Arial" panose="020B0604020202020204" pitchFamily="34" charset="0"/>
+              </a:rPr>
+            </a:br>
+            <a:r>
+              <a:rPr lang="en-US" sz="1400" dirty="0">
+                <a:solidFill>
+                  <a:srgbClr val="002060"/>
+                </a:solidFill>
+                <a:latin typeface="Arial" panose="020B0604020202020204" pitchFamily="34" charset="0"/>
+                <a:cs typeface="Arial" panose="020B0604020202020204" pitchFamily="34" charset="0"/>
+              </a:rPr>
+              <a:t> </a:t>
+            </a:r>
+            <a:r>
+              <a:rPr lang="en-US" sz="1400" dirty="0" err="1">
+                <a:solidFill>
+                  <a:srgbClr val="002060"/>
+                </a:solidFill>
+                <a:latin typeface="Arial" panose="020B0604020202020204" pitchFamily="34" charset="0"/>
+                <a:cs typeface="Arial" panose="020B0604020202020204" pitchFamily="34" charset="0"/>
+              </a:rPr>
+              <a:t>Cong_ty</a:t>
+            </a:r>
+            <a:endParaRPr lang="en-US" sz="1400" dirty="0">
+              <a:solidFill>
+                <a:srgbClr val="002060"/>
+              </a:solidFill>
+              <a:latin typeface="Arial" panose="020B0604020202020204" pitchFamily="34" charset="0"/>
+              <a:cs typeface="Arial" panose="020B0604020202020204" pitchFamily="34" charset="0"/>
+            </a:endParaRPr>
+          </a:p>
+          <a:p>
+            <a:r>
+              <a:rPr lang="en-US" sz="1400" dirty="0" smtClean="0">
+                <a:solidFill>
+                  <a:srgbClr val="002060"/>
+                </a:solidFill>
+                <a:latin typeface="Arial" panose="020B0604020202020204" pitchFamily="34" charset="0"/>
+                <a:cs typeface="Arial" panose="020B0604020202020204" pitchFamily="34" charset="0"/>
+              </a:rPr>
+              <a:t> </a:t>
+            </a:r>
+            <a:r>
+              <a:rPr lang="en-US" sz="1400" dirty="0">
+                <a:solidFill>
+                  <a:srgbClr val="002060"/>
+                </a:solidFill>
+                <a:latin typeface="Arial" panose="020B0604020202020204" pitchFamily="34" charset="0"/>
+                <a:cs typeface="Arial" panose="020B0604020202020204" pitchFamily="34" charset="0"/>
+              </a:rPr>
+              <a:t>Danh_sach_Phim</a:t>
+            </a:r>
+            <a:endParaRPr lang="en-US" sz="1400" b="1" dirty="0">
+              <a:solidFill>
+                <a:srgbClr val="002060"/>
+              </a:solidFill>
+              <a:latin typeface="Arial" panose="020B0604020202020204" pitchFamily="34" charset="0"/>
+              <a:cs typeface="Arial" panose="020B0604020202020204" pitchFamily="34" charset="0"/>
+            </a:endParaRPr>
+          </a:p>
+        </p:txBody>
+      </p:sp>
+      <p:grpSp>
+        <p:nvGrpSpPr>
+          <p:cNvPr id="4" name="Group 3"/>
+          <p:cNvGrpSpPr/>
+          <p:nvPr/>
+        </p:nvGrpSpPr>
+        <p:grpSpPr>
+          <a:xfrm>
+            <a:off x="338408" y="1010735"/>
+            <a:ext cx="4107738" cy="1074519"/>
+            <a:chOff x="903567" y="2937671"/>
+            <a:chExt cx="1767100" cy="1074519"/>
+          </a:xfrm>
+        </p:grpSpPr>
+        <p:sp>
+          <p:nvSpPr>
+            <p:cNvPr id="5" name="TextBox 25"/>
+            <p:cNvSpPr txBox="1"/>
+            <p:nvPr/>
+          </p:nvSpPr>
+          <p:spPr>
+            <a:xfrm>
+              <a:off x="903567" y="2937671"/>
+              <a:ext cx="1767100" cy="337185"/>
+            </a:xfrm>
+            <a:prstGeom prst="rect">
+              <a:avLst/>
+            </a:prstGeom>
+            <a:noFill/>
+            <a:ln>
+              <a:solidFill>
+                <a:schemeClr val="tx1"/>
+              </a:solidFill>
+            </a:ln>
+          </p:spPr>
+          <p:txBody>
+            <a:bodyPr wrap="square" rtlCol="0">
+              <a:spAutoFit/>
+            </a:bodyPr>
+            <a:lstStyle/>
+            <a:p>
+              <a:pPr algn="ctr"/>
+              <a:r>
+                <a:rPr lang="en-US" sz="1600" b="1">
+                  <a:solidFill>
+                    <a:srgbClr val="002060"/>
+                  </a:solidFill>
+                  <a:latin typeface="Arial" panose="020B0604020202020204" pitchFamily="34" charset="0"/>
+                  <a:cs typeface="Arial" panose="020B0604020202020204" pitchFamily="34" charset="0"/>
+                </a:rPr>
+                <a:t>XL_CONG_TY</a:t>
+              </a:r>
+              <a:endParaRPr lang="en-US" sz="1600" b="1">
+                <a:latin typeface="Arial" panose="020B0604020202020204" pitchFamily="34" charset="0"/>
+                <a:cs typeface="Arial" panose="020B0604020202020204" pitchFamily="34" charset="0"/>
+              </a:endParaRPr>
+            </a:p>
+          </p:txBody>
+        </p:sp>
+        <p:sp>
+          <p:nvSpPr>
+            <p:cNvPr id="6" name="TextBox 26"/>
+            <p:cNvSpPr txBox="1"/>
+            <p:nvPr/>
+          </p:nvSpPr>
+          <p:spPr>
+            <a:xfrm>
+              <a:off x="903567" y="3274955"/>
+              <a:ext cx="1767100" cy="737235"/>
+            </a:xfrm>
+            <a:prstGeom prst="rect">
+              <a:avLst/>
+            </a:prstGeom>
+            <a:noFill/>
+            <a:ln>
+              <a:solidFill>
+                <a:schemeClr val="tx1"/>
+              </a:solidFill>
+            </a:ln>
+          </p:spPr>
+          <p:txBody>
+            <a:bodyPr wrap="square" rtlCol="0">
+              <a:spAutoFit/>
+            </a:bodyPr>
+            <a:lstStyle/>
+            <a:p>
+              <a:r>
+                <a:rPr lang="en-US" sz="1400" dirty="0" err="1">
+                  <a:latin typeface="Arial" panose="020B0604020202020204" pitchFamily="34" charset="0"/>
+                  <a:cs typeface="Arial" panose="020B0604020202020204" pitchFamily="34" charset="0"/>
+                </a:rPr>
+                <a:t>Ten,Ma_so,Dien_thoai,Dia_chi</a:t>
+              </a:r>
+              <a:endParaRPr lang="en-US" sz="1400" dirty="0">
+                <a:latin typeface="Arial" panose="020B0604020202020204" pitchFamily="34" charset="0"/>
+                <a:cs typeface="Arial" panose="020B0604020202020204" pitchFamily="34" charset="0"/>
+              </a:endParaRPr>
+            </a:p>
+            <a:p>
+              <a:r>
+                <a:rPr lang="en-US" sz="1400" dirty="0" err="1">
+                  <a:solidFill>
+                    <a:schemeClr val="accent2">
+                      <a:lumMod val="50000"/>
+                    </a:schemeClr>
+                  </a:solidFill>
+                  <a:latin typeface="Arial" panose="020B0604020202020204" pitchFamily="34" charset="0"/>
+                  <a:cs typeface="Arial" panose="020B0604020202020204" pitchFamily="34" charset="0"/>
+                </a:rPr>
+                <a:t>Danh_sach_Rap</a:t>
+              </a:r>
+              <a:r>
+                <a:rPr lang="en-US" sz="1400" i="1" dirty="0">
+                  <a:latin typeface="Arial" panose="020B0604020202020204" pitchFamily="34" charset="0"/>
+                  <a:cs typeface="Arial" panose="020B0604020202020204" pitchFamily="34" charset="0"/>
+                </a:rPr>
+                <a:t> : </a:t>
+              </a:r>
+              <a:r>
+                <a:rPr lang="en-US" sz="1400" dirty="0" err="1">
+                  <a:latin typeface="Arial" panose="020B0604020202020204" pitchFamily="34" charset="0"/>
+                  <a:cs typeface="Arial" panose="020B0604020202020204" pitchFamily="34" charset="0"/>
+                </a:rPr>
+                <a:t>Ten,Ma_so</a:t>
+              </a:r>
+              <a:r>
+                <a:rPr lang="en-US" sz="1400" dirty="0">
+                  <a:latin typeface="Arial" panose="020B0604020202020204" pitchFamily="34" charset="0"/>
+                  <a:cs typeface="Arial" panose="020B0604020202020204" pitchFamily="34" charset="0"/>
+                </a:rPr>
+                <a:t>, </a:t>
+              </a:r>
+              <a:r>
+                <a:rPr lang="en-US" sz="1400" dirty="0" err="1">
+                  <a:latin typeface="Arial" panose="020B0604020202020204" pitchFamily="34" charset="0"/>
+                  <a:cs typeface="Arial" panose="020B0604020202020204" pitchFamily="34" charset="0"/>
+                </a:rPr>
+                <a:t>Danh_sach_Phong_chieu</a:t>
+              </a:r>
+              <a:endParaRPr lang="en-US" sz="1400" dirty="0">
+                <a:latin typeface="Arial" panose="020B0604020202020204" pitchFamily="34" charset="0"/>
+                <a:cs typeface="Arial" panose="020B0604020202020204" pitchFamily="34" charset="0"/>
+              </a:endParaRPr>
+            </a:p>
+          </p:txBody>
+        </p:sp>
+      </p:grpSp>
+      <p:grpSp>
+        <p:nvGrpSpPr>
+          <p:cNvPr id="7" name="Group 6"/>
+          <p:cNvGrpSpPr/>
+          <p:nvPr/>
+        </p:nvGrpSpPr>
+        <p:grpSpPr>
+          <a:xfrm>
+            <a:off x="-11662" y="2205997"/>
+            <a:ext cx="5173080" cy="1723549"/>
+            <a:chOff x="903567" y="2937671"/>
+            <a:chExt cx="1767100" cy="1723549"/>
+          </a:xfrm>
+        </p:grpSpPr>
+        <p:sp>
+          <p:nvSpPr>
+            <p:cNvPr id="8" name="TextBox 28"/>
+            <p:cNvSpPr txBox="1"/>
+            <p:nvPr/>
+          </p:nvSpPr>
+          <p:spPr>
+            <a:xfrm>
+              <a:off x="903567" y="2937671"/>
+              <a:ext cx="1767100" cy="337185"/>
+            </a:xfrm>
+            <a:prstGeom prst="rect">
+              <a:avLst/>
+            </a:prstGeom>
+            <a:noFill/>
+            <a:ln>
+              <a:solidFill>
+                <a:schemeClr val="tx1"/>
+              </a:solidFill>
+            </a:ln>
+          </p:spPr>
+          <p:txBody>
+            <a:bodyPr wrap="square" rtlCol="0">
+              <a:spAutoFit/>
+            </a:bodyPr>
+            <a:lstStyle/>
+            <a:p>
+              <a:pPr algn="ctr"/>
+              <a:r>
+                <a:rPr lang="en-US" sz="1600" b="1" dirty="0">
+                  <a:solidFill>
+                    <a:srgbClr val="002060"/>
+                  </a:solidFill>
+                  <a:latin typeface="Arial" panose="020B0604020202020204" pitchFamily="34" charset="0"/>
+                  <a:cs typeface="Arial" panose="020B0604020202020204" pitchFamily="34" charset="0"/>
+                </a:rPr>
+                <a:t>XL_PHIM  </a:t>
+              </a:r>
+              <a:endParaRPr lang="en-US" sz="1600" b="1" dirty="0">
+                <a:latin typeface="Arial" panose="020B0604020202020204" pitchFamily="34" charset="0"/>
+                <a:cs typeface="Arial" panose="020B0604020202020204" pitchFamily="34" charset="0"/>
+              </a:endParaRPr>
+            </a:p>
+          </p:txBody>
+        </p:sp>
+        <p:sp>
+          <p:nvSpPr>
+            <p:cNvPr id="9" name="TextBox 29"/>
+            <p:cNvSpPr txBox="1"/>
+            <p:nvPr/>
+          </p:nvSpPr>
+          <p:spPr>
+            <a:xfrm>
+              <a:off x="903567" y="3276225"/>
+              <a:ext cx="1767100" cy="1384995"/>
+            </a:xfrm>
+            <a:prstGeom prst="rect">
+              <a:avLst/>
+            </a:prstGeom>
+            <a:noFill/>
+            <a:ln>
+              <a:solidFill>
+                <a:schemeClr val="tx1"/>
+              </a:solidFill>
+            </a:ln>
+          </p:spPr>
+          <p:txBody>
+            <a:bodyPr wrap="square" rtlCol="0">
+              <a:spAutoFit/>
+            </a:bodyPr>
+            <a:lstStyle/>
+            <a:p>
+              <a:r>
+                <a:rPr lang="en-US" sz="1400" dirty="0">
+                  <a:latin typeface="Arial" panose="020B0604020202020204" pitchFamily="34" charset="0"/>
+                  <a:cs typeface="Arial" panose="020B0604020202020204" pitchFamily="34" charset="0"/>
+                </a:rPr>
+                <a:t>Ten,Ma_so,Ten_tieng_Anh,Don_gia,Trang_thai,Thoi_luong,Rating,Phan_loai,Quoc_gia,Dao_dien,Nha_san_xuat,The_loai,Dien_vien,Khoi_chieu,Noi_dung,Dich_thuat,</a:t>
+              </a:r>
+            </a:p>
+            <a:p>
+              <a:r>
+                <a:rPr lang="en-US" sz="1400" dirty="0">
+                  <a:solidFill>
+                    <a:schemeClr val="accent2">
+                      <a:lumMod val="50000"/>
+                    </a:schemeClr>
+                  </a:solidFill>
+                  <a:latin typeface="Arial" panose="020B0604020202020204" pitchFamily="34" charset="0"/>
+                  <a:cs typeface="Arial" panose="020B0604020202020204" pitchFamily="34" charset="0"/>
+                </a:rPr>
+                <a:t>Danh_sach_Suat_chieu</a:t>
+              </a:r>
+              <a:r>
+                <a:rPr lang="en-US" sz="1400" dirty="0">
+                  <a:solidFill>
+                    <a:srgbClr val="FF0000"/>
+                  </a:solidFill>
+                  <a:latin typeface="Arial" panose="020B0604020202020204" pitchFamily="34" charset="0"/>
+                  <a:cs typeface="Arial" panose="020B0604020202020204" pitchFamily="34" charset="0"/>
+                </a:rPr>
+                <a:t>: </a:t>
+              </a:r>
+              <a:r>
+                <a:rPr lang="en-US" sz="1400" dirty="0">
+                  <a:solidFill>
+                    <a:schemeClr val="tx1"/>
+                  </a:solidFill>
+                  <a:latin typeface="Arial" panose="020B0604020202020204" pitchFamily="34" charset="0"/>
+                  <a:cs typeface="Arial" panose="020B0604020202020204" pitchFamily="34" charset="0"/>
+                </a:rPr>
+                <a:t>Ma_so, Bat_dau, </a:t>
+              </a:r>
+              <a:r>
+                <a:rPr lang="en-US" sz="1400" dirty="0" smtClean="0">
+                  <a:solidFill>
+                    <a:schemeClr val="tx1"/>
+                  </a:solidFill>
+                  <a:latin typeface="Arial" panose="020B0604020202020204" pitchFamily="34" charset="0"/>
+                  <a:cs typeface="Arial" panose="020B0604020202020204" pitchFamily="34" charset="0"/>
+                </a:rPr>
+                <a:t>      Danh_sach_Ghe_trong</a:t>
+              </a:r>
+              <a:r>
+                <a:rPr lang="en-US" sz="1400" dirty="0">
+                  <a:solidFill>
+                    <a:schemeClr val="tx1"/>
+                  </a:solidFill>
+                  <a:latin typeface="Arial" panose="020B0604020202020204" pitchFamily="34" charset="0"/>
+                  <a:cs typeface="Arial" panose="020B0604020202020204" pitchFamily="34" charset="0"/>
+                </a:rPr>
+                <a:t>, </a:t>
+              </a:r>
+              <a:r>
+                <a:rPr lang="en-US" sz="1400" dirty="0" smtClean="0">
+                  <a:solidFill>
+                    <a:schemeClr val="tx1"/>
+                  </a:solidFill>
+                  <a:latin typeface="Arial" panose="020B0604020202020204" pitchFamily="34" charset="0"/>
+                  <a:cs typeface="Arial" panose="020B0604020202020204" pitchFamily="34" charset="0"/>
+                </a:rPr>
+                <a:t>Rap</a:t>
+              </a:r>
+              <a:endParaRPr lang="en-US" sz="1400" dirty="0">
+                <a:solidFill>
+                  <a:schemeClr val="accent2">
+                    <a:lumMod val="50000"/>
+                  </a:schemeClr>
+                </a:solidFill>
+                <a:latin typeface="Arial" panose="020B0604020202020204" pitchFamily="34" charset="0"/>
+                <a:cs typeface="Arial" panose="020B0604020202020204" pitchFamily="34" charset="0"/>
+                <a:sym typeface="+mn-ea"/>
+              </a:endParaRPr>
+            </a:p>
+            <a:p>
+              <a:r>
+                <a:rPr lang="en-US" sz="1400" dirty="0" err="1">
+                  <a:latin typeface="Arial" panose="020B0604020202020204" pitchFamily="34" charset="0"/>
+                  <a:cs typeface="Arial" panose="020B0604020202020204" pitchFamily="34" charset="0"/>
+                  <a:sym typeface="+mn-ea"/>
+                </a:rPr>
+                <a:t>Doanh_thu</a:t>
+              </a:r>
+              <a:endParaRPr lang="en-US" sz="1400" dirty="0">
+                <a:latin typeface="Arial" panose="020B0604020202020204" pitchFamily="34" charset="0"/>
+                <a:cs typeface="Arial" panose="020B0604020202020204" pitchFamily="34" charset="0"/>
+                <a:sym typeface="+mn-ea"/>
+              </a:endParaRPr>
+            </a:p>
+          </p:txBody>
+        </p:sp>
+      </p:grpSp>
+    </p:spTree>
+    <p:extLst>
+      <p:ext uri="{BB962C8B-B14F-4D97-AF65-F5344CB8AC3E}">
+        <p14:creationId xmlns:p14="http://schemas.microsoft.com/office/powerpoint/2010/main" val="352141057"/>
       </p:ext>
     </p:extLst>
   </p:cSld>

</xml_diff>

<commit_message>
Bổ sung mô hình phân hệ Quản lý nhân viên
</commit_message>
<xml_diff>
--- a/Galaxy_Cinema_Mo_hinh_Doi_tuong.pptx
+++ b/Galaxy_Cinema_Mo_hinh_Doi_tuong.pptx
@@ -5,14 +5,15 @@
     <p:sldMasterId id="2147483648" r:id="rId1"/>
   </p:sldMasterIdLst>
   <p:notesMasterIdLst>
-    <p:notesMasterId r:id="rId7"/>
+    <p:notesMasterId r:id="rId4"/>
   </p:notesMasterIdLst>
   <p:sldIdLst>
-    <p:sldId id="293" r:id="rId2"/>
-    <p:sldId id="305" r:id="rId3"/>
-    <p:sldId id="308" r:id="rId4"/>
-    <p:sldId id="309" r:id="rId5"/>
-    <p:sldId id="310" r:id="rId6"/>
+    <p:sldId id="293" r:id="rId3"/>
+    <p:sldId id="305" r:id="rId5"/>
+    <p:sldId id="308" r:id="rId6"/>
+    <p:sldId id="309" r:id="rId7"/>
+    <p:sldId id="310" r:id="rId8"/>
+    <p:sldId id="311" r:id="rId9"/>
   </p:sldIdLst>
   <p:sldSz cx="12192000" cy="6858000"/>
   <p:notesSz cx="6858000" cy="9144000"/>
@@ -111,11 +112,6 @@
       </a:defRPr>
     </a:lvl9pPr>
   </p:defaultTextStyle>
-  <p:extLst>
-    <p:ext uri="{EFAFB233-063F-42B5-8137-9DF3F51BA10A}">
-      <p15:sldGuideLst xmlns:p15="http://schemas.microsoft.com/office/powerpoint/2012/main"/>
-    </p:ext>
-  </p:extLst>
 </p:presentation>
 </file>
 
@@ -201,7 +197,6 @@
           <a:p>
             <a:fld id="{AEB6B815-3999-499D-80CF-2EC02897F6EF}" type="datetimeFigureOut">
               <a:rPr lang="en-US" smtClean="0"/>
-              <a:t>3/13/2018</a:t>
             </a:fld>
             <a:endParaRPr lang="en-US"/>
           </a:p>
@@ -268,6 +263,7 @@
               <a:rPr lang="en-US"/>
               <a:t>Click to edit Master text styles</a:t>
             </a:r>
+            <a:endParaRPr lang="en-US"/>
           </a:p>
           <a:p>
             <a:pPr lvl="1"/>
@@ -275,6 +271,7 @@
               <a:rPr lang="en-US"/>
               <a:t>Second level</a:t>
             </a:r>
+            <a:endParaRPr lang="en-US"/>
           </a:p>
           <a:p>
             <a:pPr lvl="2"/>
@@ -282,6 +279,7 @@
               <a:rPr lang="en-US"/>
               <a:t>Third level</a:t>
             </a:r>
+            <a:endParaRPr lang="en-US"/>
           </a:p>
           <a:p>
             <a:pPr lvl="3"/>
@@ -289,6 +287,7 @@
               <a:rPr lang="en-US"/>
               <a:t>Fourth level</a:t>
             </a:r>
+            <a:endParaRPr lang="en-US"/>
           </a:p>
           <a:p>
             <a:pPr lvl="4"/>
@@ -296,6 +295,7 @@
               <a:rPr lang="en-US"/>
               <a:t>Fifth level</a:t>
             </a:r>
+            <a:endParaRPr lang="en-US"/>
           </a:p>
         </p:txBody>
       </p:sp>
@@ -359,7 +359,6 @@
           <a:p>
             <a:fld id="{04E23E14-C304-42FB-937A-51A7CC2C63E6}" type="slidenum">
               <a:rPr lang="en-US" smtClean="0"/>
-              <a:t>‹#›</a:t>
             </a:fld>
             <a:endParaRPr lang="en-US"/>
           </a:p>
@@ -532,7 +531,6 @@
                   <a:prstClr val="black"/>
                 </a:solidFill>
               </a:rPr>
-              <a:t>1</a:t>
             </a:fld>
             <a:endParaRPr lang="vi-VN">
               <a:solidFill>
@@ -619,7 +617,6 @@
                   <a:prstClr val="black"/>
                 </a:solidFill>
               </a:rPr>
-              <a:t>2</a:t>
             </a:fld>
             <a:endParaRPr lang="vi-VN">
               <a:solidFill>
@@ -706,7 +703,6 @@
                   <a:prstClr val="black"/>
                 </a:solidFill>
               </a:rPr>
-              <a:t>3</a:t>
             </a:fld>
             <a:endParaRPr lang="vi-VN">
               <a:solidFill>
@@ -793,7 +789,6 @@
                   <a:prstClr val="black"/>
                 </a:solidFill>
               </a:rPr>
-              <a:t>4</a:t>
             </a:fld>
             <a:endParaRPr lang="vi-VN">
               <a:solidFill>
@@ -804,11 +799,6 @@
         </p:txBody>
       </p:sp>
     </p:spTree>
-    <p:extLst>
-      <p:ext uri="{BB962C8B-B14F-4D97-AF65-F5344CB8AC3E}">
-        <p14:creationId xmlns:p14="http://schemas.microsoft.com/office/powerpoint/2010/main" val="905533365"/>
-      </p:ext>
-    </p:extLst>
   </p:cSld>
   <p:clrMapOvr>
     <a:masterClrMapping/>
@@ -885,7 +875,6 @@
                   <a:prstClr val="black"/>
                 </a:solidFill>
               </a:rPr>
-              <a:t>5</a:t>
             </a:fld>
             <a:endParaRPr lang="vi-VN">
               <a:solidFill>
@@ -896,11 +885,92 @@
         </p:txBody>
       </p:sp>
     </p:spTree>
-    <p:extLst>
-      <p:ext uri="{BB962C8B-B14F-4D97-AF65-F5344CB8AC3E}">
-        <p14:creationId xmlns:p14="http://schemas.microsoft.com/office/powerpoint/2010/main" val="4153060650"/>
-      </p:ext>
-    </p:extLst>
+  </p:cSld>
+  <p:clrMapOvr>
+    <a:masterClrMapping/>
+  </p:clrMapOvr>
+</p:notes>
+</file>
+
+<file path=ppt/notesSlides/notesSlide6.xml><?xml version="1.0" encoding="utf-8"?>
+<p:notes xmlns:a="http://schemas.openxmlformats.org/drawingml/2006/main" xmlns:r="http://schemas.openxmlformats.org/officeDocument/2006/relationships" xmlns:p="http://schemas.openxmlformats.org/presentationml/2006/main">
+  <p:cSld>
+    <p:spTree>
+      <p:nvGrpSpPr>
+        <p:cNvPr id="1" name=""/>
+        <p:cNvGrpSpPr/>
+        <p:nvPr/>
+      </p:nvGrpSpPr>
+      <p:grpSpPr>
+        <a:xfrm>
+          <a:off x="0" y="0"/>
+          <a:ext cx="0" cy="0"/>
+          <a:chOff x="0" y="0"/>
+          <a:chExt cx="0" cy="0"/>
+        </a:xfrm>
+      </p:grpSpPr>
+      <p:sp>
+        <p:nvSpPr>
+          <p:cNvPr id="2" name="Slide Image Placeholder 1"/>
+          <p:cNvSpPr>
+            <a:spLocks noGrp="1" noRot="1" noChangeAspect="1"/>
+          </p:cNvSpPr>
+          <p:nvPr>
+            <p:ph type="sldImg"/>
+          </p:nvPr>
+        </p:nvSpPr>
+        <p:spPr/>
+      </p:sp>
+      <p:sp>
+        <p:nvSpPr>
+          <p:cNvPr id="3" name="Notes Placeholder 2"/>
+          <p:cNvSpPr>
+            <a:spLocks noGrp="1"/>
+          </p:cNvSpPr>
+          <p:nvPr>
+            <p:ph type="body" idx="1"/>
+          </p:nvPr>
+        </p:nvSpPr>
+        <p:spPr/>
+        <p:txBody>
+          <a:bodyPr/>
+          <a:lstStyle/>
+          <a:p>
+            <a:endParaRPr lang="en-US"/>
+          </a:p>
+        </p:txBody>
+      </p:sp>
+      <p:sp>
+        <p:nvSpPr>
+          <p:cNvPr id="4" name="Slide Number Placeholder 3"/>
+          <p:cNvSpPr>
+            <a:spLocks noGrp="1"/>
+          </p:cNvSpPr>
+          <p:nvPr>
+            <p:ph type="sldNum" sz="quarter" idx="10"/>
+          </p:nvPr>
+        </p:nvSpPr>
+        <p:spPr/>
+        <p:txBody>
+          <a:bodyPr/>
+          <a:lstStyle/>
+          <a:p>
+            <a:fld id="{1C6F55E1-8FA1-4431-8CCD-46EFB1EBE07A}" type="slidenum">
+              <a:rPr lang="vi-VN" smtClean="0">
+                <a:solidFill>
+                  <a:prstClr val="black"/>
+                </a:solidFill>
+              </a:rPr>
+            </a:fld>
+            <a:endParaRPr lang="vi-VN">
+              <a:solidFill>
+                <a:prstClr val="black"/>
+              </a:solidFill>
+            </a:endParaRPr>
+          </a:p>
+        </p:txBody>
+      </p:sp>
+    </p:spTree>
   </p:cSld>
   <p:clrMapOvr>
     <a:masterClrMapping/>
@@ -953,6 +1023,7 @@
               <a:rPr lang="en-US"/>
               <a:t>Click to edit Master title style</a:t>
             </a:r>
+            <a:endParaRPr lang="en-US"/>
           </a:p>
         </p:txBody>
       </p:sp>
@@ -1017,6 +1088,7 @@
               <a:rPr lang="en-US"/>
               <a:t>Click to edit Master subtitle style</a:t>
             </a:r>
+            <a:endParaRPr lang="en-US"/>
           </a:p>
         </p:txBody>
       </p:sp>
@@ -1037,7 +1109,6 @@
           <a:p>
             <a:fld id="{57843E3B-2D41-45B5-8308-A22CC26B131A}" type="datetime1">
               <a:rPr lang="en-US" smtClean="0"/>
-              <a:t>3/13/2018</a:t>
             </a:fld>
             <a:endParaRPr lang="en-US"/>
           </a:p>
@@ -1062,6 +1133,7 @@
               <a:rPr lang="en-US"/>
               <a:t>Nguyễn tiến Huy   Tháng 10/2017</a:t>
             </a:r>
+            <a:endParaRPr lang="en-US"/>
           </a:p>
         </p:txBody>
       </p:sp>
@@ -1082,7 +1154,6 @@
           <a:p>
             <a:fld id="{441BF3E4-0CA8-4285-94DC-B5457A2A1DF6}" type="slidenum">
               <a:rPr lang="en-US" smtClean="0"/>
-              <a:t>‹#›</a:t>
             </a:fld>
             <a:endParaRPr lang="en-US"/>
           </a:p>
@@ -1132,6 +1203,7 @@
               <a:rPr lang="en-US"/>
               <a:t>Click to edit Master title style</a:t>
             </a:r>
+            <a:endParaRPr lang="en-US"/>
           </a:p>
         </p:txBody>
       </p:sp>
@@ -1155,6 +1227,7 @@
               <a:rPr lang="en-US"/>
               <a:t>Click to edit Master text styles</a:t>
             </a:r>
+            <a:endParaRPr lang="en-US"/>
           </a:p>
           <a:p>
             <a:pPr lvl="1"/>
@@ -1162,6 +1235,7 @@
               <a:rPr lang="en-US"/>
               <a:t>Second level</a:t>
             </a:r>
+            <a:endParaRPr lang="en-US"/>
           </a:p>
           <a:p>
             <a:pPr lvl="2"/>
@@ -1169,6 +1243,7 @@
               <a:rPr lang="en-US"/>
               <a:t>Third level</a:t>
             </a:r>
+            <a:endParaRPr lang="en-US"/>
           </a:p>
           <a:p>
             <a:pPr lvl="3"/>
@@ -1176,6 +1251,7 @@
               <a:rPr lang="en-US"/>
               <a:t>Fourth level</a:t>
             </a:r>
+            <a:endParaRPr lang="en-US"/>
           </a:p>
           <a:p>
             <a:pPr lvl="4"/>
@@ -1183,6 +1259,7 @@
               <a:rPr lang="en-US"/>
               <a:t>Fifth level</a:t>
             </a:r>
+            <a:endParaRPr lang="en-US"/>
           </a:p>
         </p:txBody>
       </p:sp>
@@ -1203,7 +1280,6 @@
           <a:p>
             <a:fld id="{83644E8E-E1C9-425A-8622-E178101C66C3}" type="datetime1">
               <a:rPr lang="en-US" smtClean="0"/>
-              <a:t>3/13/2018</a:t>
             </a:fld>
             <a:endParaRPr lang="en-US"/>
           </a:p>
@@ -1228,6 +1304,7 @@
               <a:rPr lang="en-US"/>
               <a:t>Nguyễn tiến Huy   Tháng 10/2017</a:t>
             </a:r>
+            <a:endParaRPr lang="en-US"/>
           </a:p>
         </p:txBody>
       </p:sp>
@@ -1248,7 +1325,6 @@
           <a:p>
             <a:fld id="{441BF3E4-0CA8-4285-94DC-B5457A2A1DF6}" type="slidenum">
               <a:rPr lang="en-US" smtClean="0"/>
-              <a:t>‹#›</a:t>
             </a:fld>
             <a:endParaRPr lang="en-US"/>
           </a:p>
@@ -1303,6 +1379,7 @@
               <a:rPr lang="en-US"/>
               <a:t>Click to edit Master title style</a:t>
             </a:r>
+            <a:endParaRPr lang="en-US"/>
           </a:p>
         </p:txBody>
       </p:sp>
@@ -1331,6 +1408,7 @@
               <a:rPr lang="en-US"/>
               <a:t>Click to edit Master text styles</a:t>
             </a:r>
+            <a:endParaRPr lang="en-US"/>
           </a:p>
           <a:p>
             <a:pPr lvl="1"/>
@@ -1338,6 +1416,7 @@
               <a:rPr lang="en-US"/>
               <a:t>Second level</a:t>
             </a:r>
+            <a:endParaRPr lang="en-US"/>
           </a:p>
           <a:p>
             <a:pPr lvl="2"/>
@@ -1345,6 +1424,7 @@
               <a:rPr lang="en-US"/>
               <a:t>Third level</a:t>
             </a:r>
+            <a:endParaRPr lang="en-US"/>
           </a:p>
           <a:p>
             <a:pPr lvl="3"/>
@@ -1352,6 +1432,7 @@
               <a:rPr lang="en-US"/>
               <a:t>Fourth level</a:t>
             </a:r>
+            <a:endParaRPr lang="en-US"/>
           </a:p>
           <a:p>
             <a:pPr lvl="4"/>
@@ -1359,6 +1440,7 @@
               <a:rPr lang="en-US"/>
               <a:t>Fifth level</a:t>
             </a:r>
+            <a:endParaRPr lang="en-US"/>
           </a:p>
         </p:txBody>
       </p:sp>
@@ -1379,7 +1461,6 @@
           <a:p>
             <a:fld id="{2733FD58-BFC4-4D8C-8B65-98128402B886}" type="datetime1">
               <a:rPr lang="en-US" smtClean="0"/>
-              <a:t>3/13/2018</a:t>
             </a:fld>
             <a:endParaRPr lang="en-US"/>
           </a:p>
@@ -1404,6 +1485,7 @@
               <a:rPr lang="en-US"/>
               <a:t>Nguyễn tiến Huy   Tháng 10/2017</a:t>
             </a:r>
+            <a:endParaRPr lang="en-US"/>
           </a:p>
         </p:txBody>
       </p:sp>
@@ -1424,7 +1506,6 @@
           <a:p>
             <a:fld id="{441BF3E4-0CA8-4285-94DC-B5457A2A1DF6}" type="slidenum">
               <a:rPr lang="en-US" smtClean="0"/>
-              <a:t>‹#›</a:t>
             </a:fld>
             <a:endParaRPr lang="en-US"/>
           </a:p>
@@ -1474,6 +1555,7 @@
               <a:rPr lang="en-US"/>
               <a:t>Click to edit Master title style</a:t>
             </a:r>
+            <a:endParaRPr lang="en-US"/>
           </a:p>
         </p:txBody>
       </p:sp>
@@ -1497,6 +1579,7 @@
               <a:rPr lang="en-US"/>
               <a:t>Click to edit Master text styles</a:t>
             </a:r>
+            <a:endParaRPr lang="en-US"/>
           </a:p>
           <a:p>
             <a:pPr lvl="1"/>
@@ -1504,6 +1587,7 @@
               <a:rPr lang="en-US"/>
               <a:t>Second level</a:t>
             </a:r>
+            <a:endParaRPr lang="en-US"/>
           </a:p>
           <a:p>
             <a:pPr lvl="2"/>
@@ -1511,6 +1595,7 @@
               <a:rPr lang="en-US"/>
               <a:t>Third level</a:t>
             </a:r>
+            <a:endParaRPr lang="en-US"/>
           </a:p>
           <a:p>
             <a:pPr lvl="3"/>
@@ -1518,6 +1603,7 @@
               <a:rPr lang="en-US"/>
               <a:t>Fourth level</a:t>
             </a:r>
+            <a:endParaRPr lang="en-US"/>
           </a:p>
           <a:p>
             <a:pPr lvl="4"/>
@@ -1525,6 +1611,7 @@
               <a:rPr lang="en-US"/>
               <a:t>Fifth level</a:t>
             </a:r>
+            <a:endParaRPr lang="en-US"/>
           </a:p>
         </p:txBody>
       </p:sp>
@@ -1545,7 +1632,6 @@
           <a:p>
             <a:fld id="{4C9D577A-C555-4047-8599-27F8672B5A9B}" type="datetime1">
               <a:rPr lang="en-US" smtClean="0"/>
-              <a:t>3/13/2018</a:t>
             </a:fld>
             <a:endParaRPr lang="en-US"/>
           </a:p>
@@ -1570,6 +1656,7 @@
               <a:rPr lang="en-US"/>
               <a:t>Nguyễn tiến Huy   Tháng 10/2017</a:t>
             </a:r>
+            <a:endParaRPr lang="en-US"/>
           </a:p>
         </p:txBody>
       </p:sp>
@@ -1590,7 +1677,6 @@
           <a:p>
             <a:fld id="{441BF3E4-0CA8-4285-94DC-B5457A2A1DF6}" type="slidenum">
               <a:rPr lang="en-US" smtClean="0"/>
-              <a:t>‹#›</a:t>
             </a:fld>
             <a:endParaRPr lang="en-US"/>
           </a:p>
@@ -1649,6 +1735,7 @@
               <a:rPr lang="en-US"/>
               <a:t>Click to edit Master title style</a:t>
             </a:r>
+            <a:endParaRPr lang="en-US"/>
           </a:p>
         </p:txBody>
       </p:sp>
@@ -1768,6 +1855,7 @@
               <a:rPr lang="en-US"/>
               <a:t>Click to edit Master text styles</a:t>
             </a:r>
+            <a:endParaRPr lang="en-US"/>
           </a:p>
         </p:txBody>
       </p:sp>
@@ -1788,7 +1876,6 @@
           <a:p>
             <a:fld id="{28612BB8-5967-4A73-A6F4-4383ECD464AA}" type="datetime1">
               <a:rPr lang="en-US" smtClean="0"/>
-              <a:t>3/13/2018</a:t>
             </a:fld>
             <a:endParaRPr lang="en-US"/>
           </a:p>
@@ -1813,6 +1900,7 @@
               <a:rPr lang="en-US"/>
               <a:t>Nguyễn tiến Huy   Tháng 10/2017</a:t>
             </a:r>
+            <a:endParaRPr lang="en-US"/>
           </a:p>
         </p:txBody>
       </p:sp>
@@ -1833,7 +1921,6 @@
           <a:p>
             <a:fld id="{441BF3E4-0CA8-4285-94DC-B5457A2A1DF6}" type="slidenum">
               <a:rPr lang="en-US" smtClean="0"/>
-              <a:t>‹#›</a:t>
             </a:fld>
             <a:endParaRPr lang="en-US"/>
           </a:p>
@@ -1883,6 +1970,7 @@
               <a:rPr lang="en-US"/>
               <a:t>Click to edit Master title style</a:t>
             </a:r>
+            <a:endParaRPr lang="en-US"/>
           </a:p>
         </p:txBody>
       </p:sp>
@@ -1911,6 +1999,7 @@
               <a:rPr lang="en-US"/>
               <a:t>Click to edit Master text styles</a:t>
             </a:r>
+            <a:endParaRPr lang="en-US"/>
           </a:p>
           <a:p>
             <a:pPr lvl="1"/>
@@ -1918,6 +2007,7 @@
               <a:rPr lang="en-US"/>
               <a:t>Second level</a:t>
             </a:r>
+            <a:endParaRPr lang="en-US"/>
           </a:p>
           <a:p>
             <a:pPr lvl="2"/>
@@ -1925,6 +2015,7 @@
               <a:rPr lang="en-US"/>
               <a:t>Third level</a:t>
             </a:r>
+            <a:endParaRPr lang="en-US"/>
           </a:p>
           <a:p>
             <a:pPr lvl="3"/>
@@ -1932,6 +2023,7 @@
               <a:rPr lang="en-US"/>
               <a:t>Fourth level</a:t>
             </a:r>
+            <a:endParaRPr lang="en-US"/>
           </a:p>
           <a:p>
             <a:pPr lvl="4"/>
@@ -1939,6 +2031,7 @@
               <a:rPr lang="en-US"/>
               <a:t>Fifth level</a:t>
             </a:r>
+            <a:endParaRPr lang="en-US"/>
           </a:p>
         </p:txBody>
       </p:sp>
@@ -1967,6 +2060,7 @@
               <a:rPr lang="en-US"/>
               <a:t>Click to edit Master text styles</a:t>
             </a:r>
+            <a:endParaRPr lang="en-US"/>
           </a:p>
           <a:p>
             <a:pPr lvl="1"/>
@@ -1974,6 +2068,7 @@
               <a:rPr lang="en-US"/>
               <a:t>Second level</a:t>
             </a:r>
+            <a:endParaRPr lang="en-US"/>
           </a:p>
           <a:p>
             <a:pPr lvl="2"/>
@@ -1981,6 +2076,7 @@
               <a:rPr lang="en-US"/>
               <a:t>Third level</a:t>
             </a:r>
+            <a:endParaRPr lang="en-US"/>
           </a:p>
           <a:p>
             <a:pPr lvl="3"/>
@@ -1988,6 +2084,7 @@
               <a:rPr lang="en-US"/>
               <a:t>Fourth level</a:t>
             </a:r>
+            <a:endParaRPr lang="en-US"/>
           </a:p>
           <a:p>
             <a:pPr lvl="4"/>
@@ -1995,6 +2092,7 @@
               <a:rPr lang="en-US"/>
               <a:t>Fifth level</a:t>
             </a:r>
+            <a:endParaRPr lang="en-US"/>
           </a:p>
         </p:txBody>
       </p:sp>
@@ -2015,7 +2113,6 @@
           <a:p>
             <a:fld id="{F8B2B2ED-5E4D-4394-AE56-A0A91AFA2E75}" type="datetime1">
               <a:rPr lang="en-US" smtClean="0"/>
-              <a:t>3/13/2018</a:t>
             </a:fld>
             <a:endParaRPr lang="en-US"/>
           </a:p>
@@ -2040,6 +2137,7 @@
               <a:rPr lang="en-US"/>
               <a:t>Nguyễn tiến Huy   Tháng 10/2017</a:t>
             </a:r>
+            <a:endParaRPr lang="en-US"/>
           </a:p>
         </p:txBody>
       </p:sp>
@@ -2060,7 +2158,6 @@
           <a:p>
             <a:fld id="{441BF3E4-0CA8-4285-94DC-B5457A2A1DF6}" type="slidenum">
               <a:rPr lang="en-US" smtClean="0"/>
-              <a:t>‹#›</a:t>
             </a:fld>
             <a:endParaRPr lang="en-US"/>
           </a:p>
@@ -2115,6 +2212,7 @@
               <a:rPr lang="en-US"/>
               <a:t>Click to edit Master title style</a:t>
             </a:r>
+            <a:endParaRPr lang="en-US"/>
           </a:p>
         </p:txBody>
       </p:sp>
@@ -2180,6 +2278,7 @@
               <a:rPr lang="en-US"/>
               <a:t>Click to edit Master text styles</a:t>
             </a:r>
+            <a:endParaRPr lang="en-US"/>
           </a:p>
         </p:txBody>
       </p:sp>
@@ -2208,6 +2307,7 @@
               <a:rPr lang="en-US"/>
               <a:t>Click to edit Master text styles</a:t>
             </a:r>
+            <a:endParaRPr lang="en-US"/>
           </a:p>
           <a:p>
             <a:pPr lvl="1"/>
@@ -2215,6 +2315,7 @@
               <a:rPr lang="en-US"/>
               <a:t>Second level</a:t>
             </a:r>
+            <a:endParaRPr lang="en-US"/>
           </a:p>
           <a:p>
             <a:pPr lvl="2"/>
@@ -2222,6 +2323,7 @@
               <a:rPr lang="en-US"/>
               <a:t>Third level</a:t>
             </a:r>
+            <a:endParaRPr lang="en-US"/>
           </a:p>
           <a:p>
             <a:pPr lvl="3"/>
@@ -2229,6 +2331,7 @@
               <a:rPr lang="en-US"/>
               <a:t>Fourth level</a:t>
             </a:r>
+            <a:endParaRPr lang="en-US"/>
           </a:p>
           <a:p>
             <a:pPr lvl="4"/>
@@ -2236,6 +2339,7 @@
               <a:rPr lang="en-US"/>
               <a:t>Fifth level</a:t>
             </a:r>
+            <a:endParaRPr lang="en-US"/>
           </a:p>
         </p:txBody>
       </p:sp>
@@ -2301,6 +2405,7 @@
               <a:rPr lang="en-US"/>
               <a:t>Click to edit Master text styles</a:t>
             </a:r>
+            <a:endParaRPr lang="en-US"/>
           </a:p>
         </p:txBody>
       </p:sp>
@@ -2329,6 +2434,7 @@
               <a:rPr lang="en-US"/>
               <a:t>Click to edit Master text styles</a:t>
             </a:r>
+            <a:endParaRPr lang="en-US"/>
           </a:p>
           <a:p>
             <a:pPr lvl="1"/>
@@ -2336,6 +2442,7 @@
               <a:rPr lang="en-US"/>
               <a:t>Second level</a:t>
             </a:r>
+            <a:endParaRPr lang="en-US"/>
           </a:p>
           <a:p>
             <a:pPr lvl="2"/>
@@ -2343,6 +2450,7 @@
               <a:rPr lang="en-US"/>
               <a:t>Third level</a:t>
             </a:r>
+            <a:endParaRPr lang="en-US"/>
           </a:p>
           <a:p>
             <a:pPr lvl="3"/>
@@ -2350,6 +2458,7 @@
               <a:rPr lang="en-US"/>
               <a:t>Fourth level</a:t>
             </a:r>
+            <a:endParaRPr lang="en-US"/>
           </a:p>
           <a:p>
             <a:pPr lvl="4"/>
@@ -2357,6 +2466,7 @@
               <a:rPr lang="en-US"/>
               <a:t>Fifth level</a:t>
             </a:r>
+            <a:endParaRPr lang="en-US"/>
           </a:p>
         </p:txBody>
       </p:sp>
@@ -2377,7 +2487,6 @@
           <a:p>
             <a:fld id="{36A732D0-6C61-4355-803A-D77B2B2155DD}" type="datetime1">
               <a:rPr lang="en-US" smtClean="0"/>
-              <a:t>3/13/2018</a:t>
             </a:fld>
             <a:endParaRPr lang="en-US"/>
           </a:p>
@@ -2402,6 +2511,7 @@
               <a:rPr lang="en-US"/>
               <a:t>Nguyễn tiến Huy   Tháng 10/2017</a:t>
             </a:r>
+            <a:endParaRPr lang="en-US"/>
           </a:p>
         </p:txBody>
       </p:sp>
@@ -2422,7 +2532,6 @@
           <a:p>
             <a:fld id="{441BF3E4-0CA8-4285-94DC-B5457A2A1DF6}" type="slidenum">
               <a:rPr lang="en-US" smtClean="0"/>
-              <a:t>‹#›</a:t>
             </a:fld>
             <a:endParaRPr lang="en-US"/>
           </a:p>
@@ -2472,6 +2581,7 @@
               <a:rPr lang="en-US"/>
               <a:t>Click to edit Master title style</a:t>
             </a:r>
+            <a:endParaRPr lang="en-US"/>
           </a:p>
         </p:txBody>
       </p:sp>
@@ -2492,7 +2602,6 @@
           <a:p>
             <a:fld id="{2887CDC5-5117-42E9-82C7-95D82324F93E}" type="datetime1">
               <a:rPr lang="en-US" smtClean="0"/>
-              <a:t>3/13/2018</a:t>
             </a:fld>
             <a:endParaRPr lang="en-US"/>
           </a:p>
@@ -2517,6 +2626,7 @@
               <a:rPr lang="en-US"/>
               <a:t>Nguyễn tiến Huy   Tháng 10/2017</a:t>
             </a:r>
+            <a:endParaRPr lang="en-US"/>
           </a:p>
         </p:txBody>
       </p:sp>
@@ -2537,7 +2647,6 @@
           <a:p>
             <a:fld id="{441BF3E4-0CA8-4285-94DC-B5457A2A1DF6}" type="slidenum">
               <a:rPr lang="en-US" smtClean="0"/>
-              <a:t>‹#›</a:t>
             </a:fld>
             <a:endParaRPr lang="en-US"/>
           </a:p>
@@ -2585,7 +2694,6 @@
           <a:p>
             <a:fld id="{0459332C-0CAA-40C4-A1E0-D91EB938B5D9}" type="datetime1">
               <a:rPr lang="en-US" smtClean="0"/>
-              <a:t>3/13/2018</a:t>
             </a:fld>
             <a:endParaRPr lang="en-US"/>
           </a:p>
@@ -2610,6 +2718,7 @@
               <a:rPr lang="en-US"/>
               <a:t>Nguyễn tiến Huy   Tháng 10/2017</a:t>
             </a:r>
+            <a:endParaRPr lang="en-US"/>
           </a:p>
         </p:txBody>
       </p:sp>
@@ -2630,7 +2739,6 @@
           <a:p>
             <a:fld id="{441BF3E4-0CA8-4285-94DC-B5457A2A1DF6}" type="slidenum">
               <a:rPr lang="en-US" smtClean="0"/>
-              <a:t>‹#›</a:t>
             </a:fld>
             <a:endParaRPr lang="en-US"/>
           </a:p>
@@ -2689,6 +2797,7 @@
               <a:rPr lang="en-US"/>
               <a:t>Click to edit Master title style</a:t>
             </a:r>
+            <a:endParaRPr lang="en-US"/>
           </a:p>
         </p:txBody>
       </p:sp>
@@ -2745,6 +2854,7 @@
               <a:rPr lang="en-US"/>
               <a:t>Click to edit Master text styles</a:t>
             </a:r>
+            <a:endParaRPr lang="en-US"/>
           </a:p>
           <a:p>
             <a:pPr lvl="1"/>
@@ -2752,6 +2862,7 @@
               <a:rPr lang="en-US"/>
               <a:t>Second level</a:t>
             </a:r>
+            <a:endParaRPr lang="en-US"/>
           </a:p>
           <a:p>
             <a:pPr lvl="2"/>
@@ -2759,6 +2870,7 @@
               <a:rPr lang="en-US"/>
               <a:t>Third level</a:t>
             </a:r>
+            <a:endParaRPr lang="en-US"/>
           </a:p>
           <a:p>
             <a:pPr lvl="3"/>
@@ -2766,6 +2878,7 @@
               <a:rPr lang="en-US"/>
               <a:t>Fourth level</a:t>
             </a:r>
+            <a:endParaRPr lang="en-US"/>
           </a:p>
           <a:p>
             <a:pPr lvl="4"/>
@@ -2773,6 +2886,7 @@
               <a:rPr lang="en-US"/>
               <a:t>Fifth level</a:t>
             </a:r>
+            <a:endParaRPr lang="en-US"/>
           </a:p>
         </p:txBody>
       </p:sp>
@@ -2838,6 +2952,7 @@
               <a:rPr lang="en-US"/>
               <a:t>Click to edit Master text styles</a:t>
             </a:r>
+            <a:endParaRPr lang="en-US"/>
           </a:p>
         </p:txBody>
       </p:sp>
@@ -2858,7 +2973,6 @@
           <a:p>
             <a:fld id="{70E76B4D-C069-48F1-B2DD-8A8F89BDA716}" type="datetime1">
               <a:rPr lang="en-US" smtClean="0"/>
-              <a:t>3/13/2018</a:t>
             </a:fld>
             <a:endParaRPr lang="en-US"/>
           </a:p>
@@ -2883,6 +2997,7 @@
               <a:rPr lang="en-US"/>
               <a:t>Nguyễn tiến Huy   Tháng 10/2017</a:t>
             </a:r>
+            <a:endParaRPr lang="en-US"/>
           </a:p>
         </p:txBody>
       </p:sp>
@@ -2903,7 +3018,6 @@
           <a:p>
             <a:fld id="{441BF3E4-0CA8-4285-94DC-B5457A2A1DF6}" type="slidenum">
               <a:rPr lang="en-US" smtClean="0"/>
-              <a:t>‹#›</a:t>
             </a:fld>
             <a:endParaRPr lang="en-US"/>
           </a:p>
@@ -2962,6 +3076,7 @@
               <a:rPr lang="en-US"/>
               <a:t>Click to edit Master title style</a:t>
             </a:r>
+            <a:endParaRPr lang="en-US"/>
           </a:p>
         </p:txBody>
       </p:sp>
@@ -3088,6 +3203,7 @@
               <a:rPr lang="en-US"/>
               <a:t>Click to edit Master text styles</a:t>
             </a:r>
+            <a:endParaRPr lang="en-US"/>
           </a:p>
         </p:txBody>
       </p:sp>
@@ -3108,7 +3224,6 @@
           <a:p>
             <a:fld id="{7A9A29D8-8095-4B56-B282-8FDA4C5DCFFC}" type="datetime1">
               <a:rPr lang="en-US" smtClean="0"/>
-              <a:t>3/13/2018</a:t>
             </a:fld>
             <a:endParaRPr lang="en-US"/>
           </a:p>
@@ -3133,6 +3248,7 @@
               <a:rPr lang="en-US"/>
               <a:t>Nguyễn tiến Huy   Tháng 10/2017</a:t>
             </a:r>
+            <a:endParaRPr lang="en-US"/>
           </a:p>
         </p:txBody>
       </p:sp>
@@ -3153,7 +3269,6 @@
           <a:p>
             <a:fld id="{441BF3E4-0CA8-4285-94DC-B5457A2A1DF6}" type="slidenum">
               <a:rPr lang="en-US" smtClean="0"/>
-              <a:t>‹#›</a:t>
             </a:fld>
             <a:endParaRPr lang="en-US"/>
           </a:p>
@@ -3218,6 +3333,7 @@
               <a:rPr lang="en-US"/>
               <a:t>Click to edit Master title style</a:t>
             </a:r>
+            <a:endParaRPr lang="en-US"/>
           </a:p>
         </p:txBody>
       </p:sp>
@@ -3251,6 +3367,7 @@
               <a:rPr lang="en-US"/>
               <a:t>Click to edit Master text styles</a:t>
             </a:r>
+            <a:endParaRPr lang="en-US"/>
           </a:p>
           <a:p>
             <a:pPr lvl="1"/>
@@ -3258,6 +3375,7 @@
               <a:rPr lang="en-US"/>
               <a:t>Second level</a:t>
             </a:r>
+            <a:endParaRPr lang="en-US"/>
           </a:p>
           <a:p>
             <a:pPr lvl="2"/>
@@ -3265,6 +3383,7 @@
               <a:rPr lang="en-US"/>
               <a:t>Third level</a:t>
             </a:r>
+            <a:endParaRPr lang="en-US"/>
           </a:p>
           <a:p>
             <a:pPr lvl="3"/>
@@ -3272,6 +3391,7 @@
               <a:rPr lang="en-US"/>
               <a:t>Fourth level</a:t>
             </a:r>
+            <a:endParaRPr lang="en-US"/>
           </a:p>
           <a:p>
             <a:pPr lvl="4"/>
@@ -3279,6 +3399,7 @@
               <a:rPr lang="en-US"/>
               <a:t>Fifth level</a:t>
             </a:r>
+            <a:endParaRPr lang="en-US"/>
           </a:p>
         </p:txBody>
       </p:sp>
@@ -3317,7 +3438,6 @@
           <a:p>
             <a:fld id="{265B18C2-D0C8-4837-89F4-FB5823145B08}" type="datetime1">
               <a:rPr lang="en-US" smtClean="0"/>
-              <a:t>3/13/2018</a:t>
             </a:fld>
             <a:endParaRPr lang="en-US"/>
           </a:p>
@@ -3360,6 +3480,7 @@
               <a:rPr lang="en-US"/>
               <a:t>Nguyễn tiến Huy   Tháng 10/2017</a:t>
             </a:r>
+            <a:endParaRPr lang="en-US"/>
           </a:p>
         </p:txBody>
       </p:sp>
@@ -3398,7 +3519,6 @@
           <a:p>
             <a:fld id="{441BF3E4-0CA8-4285-94DC-B5457A2A1DF6}" type="slidenum">
               <a:rPr lang="en-US" smtClean="0"/>
-              <a:t>‹#›</a:t>
             </a:fld>
             <a:endParaRPr lang="en-US"/>
           </a:p>
@@ -3771,16 +3891,6 @@
               </a:rPr>
               <a:t>Ngữ cảnh </a:t>
             </a:r>
-            <a:r>
-              <a:rPr lang="en-US" sz="1400">
-                <a:solidFill>
-                  <a:prstClr val="black"/>
-                </a:solidFill>
-                <a:latin typeface="Arial" panose="020B0604020202020204" pitchFamily="34" charset="0"/>
-                <a:cs typeface="Arial" panose="020B0604020202020204" pitchFamily="34" charset="0"/>
-              </a:rPr>
-              <a:t/>
-            </a:r>
             <a:br>
               <a:rPr lang="en-US" sz="1400">
                 <a:solidFill>
@@ -3845,6 +3955,13 @@
               </a:rPr>
               <a:t>, Hình. </a:t>
             </a:r>
+            <a:endParaRPr lang="en-US" sz="1400">
+              <a:solidFill>
+                <a:prstClr val="black"/>
+              </a:solidFill>
+              <a:latin typeface="Arial" panose="020B0604020202020204" pitchFamily="34" charset="0"/>
+              <a:cs typeface="Arial" panose="020B0604020202020204" pitchFamily="34" charset="0"/>
+            </a:endParaRPr>
           </a:p>
           <a:p>
             <a:pPr fontAlgn="auto">
@@ -3995,6 +4112,15 @@
               </a:rPr>
               <a:t>Quản lý Phim  </a:t>
             </a:r>
+            <a:endParaRPr lang="en-US" sz="1400">
+              <a:solidFill>
+                <a:schemeClr val="accent2">
+                  <a:lumMod val="50000"/>
+                </a:schemeClr>
+              </a:solidFill>
+              <a:latin typeface="Arial" panose="020B0604020202020204" pitchFamily="34" charset="0"/>
+              <a:cs typeface="Arial" panose="020B0604020202020204" pitchFamily="34" charset="0"/>
+            </a:endParaRPr>
           </a:p>
         </p:txBody>
       </p:sp>
@@ -4434,16 +4560,6 @@
               </a:rPr>
               <a:t>  </a:t>
             </a:r>
-            <a:r>
-              <a:rPr lang="en-US" sz="1400" b="1" dirty="0">
-                <a:solidFill>
-                  <a:srgbClr val="002060"/>
-                </a:solidFill>
-                <a:latin typeface="Arial" panose="020B0604020202020204" pitchFamily="34" charset="0"/>
-                <a:cs typeface="Arial" panose="020B0604020202020204" pitchFamily="34" charset="0"/>
-              </a:rPr>
-              <a:t/>
-            </a:r>
             <a:br>
               <a:rPr lang="en-US" sz="1400" b="1" dirty="0">
                 <a:solidFill>
@@ -4515,16 +4631,6 @@
                 <a:sym typeface="+mn-ea"/>
               </a:rPr>
               <a:t>nhân viên</a:t>
-            </a:r>
-            <a:r>
-              <a:rPr lang="en-US" sz="1400" b="1" dirty="0">
-                <a:solidFill>
-                  <a:srgbClr val="002060"/>
-                </a:solidFill>
-                <a:latin typeface="Arial" panose="020B0604020202020204" pitchFamily="34" charset="0"/>
-                <a:cs typeface="Arial" panose="020B0604020202020204" pitchFamily="34" charset="0"/>
-              </a:rPr>
-              <a:t/>
             </a:r>
             <a:br>
               <a:rPr lang="en-US" sz="1400" b="1" dirty="0">
@@ -4786,7 +4892,7 @@
       <p:sp>
         <p:nvSpPr>
           <p:cNvPr id="69" name="Rounded Rectangle 68">
-            <a:hlinkClick r:id="rId3" action="ppaction://hlinksldjump"/>
+            <a:hlinkClick r:id="rId1" action="ppaction://hlinksldjump"/>
           </p:cNvPr>
           <p:cNvSpPr/>
           <p:nvPr/>
@@ -4884,6 +4990,13 @@
               </a:rPr>
               <a:t>)</a:t>
             </a:r>
+            <a:endParaRPr lang="en-US" sz="1600">
+              <a:solidFill>
+                <a:prstClr val="white"/>
+              </a:solidFill>
+              <a:latin typeface="Arial" panose="020B0604020202020204" pitchFamily="34" charset="0"/>
+              <a:cs typeface="Arial" panose="020B0604020202020204" pitchFamily="34" charset="0"/>
+            </a:endParaRPr>
           </a:p>
           <a:p>
             <a:pPr algn="ctr"/>
@@ -4991,7 +5104,7 @@
           <p:nvPr/>
         </p:nvPicPr>
         <p:blipFill>
-          <a:blip r:embed="rId4">
+          <a:blip r:embed="rId2">
             <a:extLst>
               <a:ext uri="{28A0092B-C50C-407E-A947-70E740481C1C}">
                 <a14:useLocalDpi xmlns:a14="http://schemas.microsoft.com/office/drawing/2010/main" val="0"/>
@@ -5047,36 +5160,42 @@
               <a:rPr lang="en-US"/>
               <a:t>Phiếu bán</a:t>
             </a:r>
+            <a:endParaRPr lang="en-US"/>
           </a:p>
           <a:p>
             <a:r>
               <a:rPr lang="en-US"/>
               <a:t>Họ tên: ...  Điện thoại:....</a:t>
             </a:r>
+            <a:endParaRPr lang="en-US"/>
           </a:p>
           <a:p>
             <a:r>
               <a:rPr lang="en-US"/>
               <a:t>Email:....</a:t>
             </a:r>
+            <a:endParaRPr lang="en-US"/>
           </a:p>
           <a:p>
             <a:r>
               <a:rPr lang="en-US"/>
               <a:t>Phòng chiếu:... Số ghế:....</a:t>
             </a:r>
+            <a:endParaRPr lang="en-US"/>
           </a:p>
           <a:p>
             <a:r>
               <a:rPr lang="en-US"/>
               <a:t>Phim Sốlượng Đơn giá Tiền</a:t>
             </a:r>
+            <a:endParaRPr lang="en-US"/>
           </a:p>
           <a:p>
             <a:r>
               <a:rPr lang="en-US"/>
               <a:t>....</a:t>
             </a:r>
+            <a:endParaRPr lang="en-US"/>
           </a:p>
           <a:p>
             <a:pPr algn="r"/>
@@ -5084,6 +5203,7 @@
               <a:rPr lang="en-US"/>
               <a:t>Tổng tiền:....</a:t>
             </a:r>
+            <a:endParaRPr lang="en-US"/>
           </a:p>
           <a:p>
             <a:pPr algn="r"/>
@@ -5091,6 +5211,7 @@
               <a:rPr lang="en-US"/>
               <a:t>Ngày:...</a:t>
             </a:r>
+            <a:endParaRPr lang="en-US"/>
           </a:p>
           <a:p>
             <a:pPr algn="r"/>
@@ -5098,6 +5219,7 @@
               <a:rPr lang="en-US"/>
               <a:t>Họ tên NV bán vé:...</a:t>
             </a:r>
+            <a:endParaRPr lang="en-US"/>
           </a:p>
         </p:txBody>
       </p:sp>
@@ -5135,18 +5257,21 @@
               <a:rPr lang="en-US"/>
               <a:t>Phiếu đặt vé</a:t>
             </a:r>
+            <a:endParaRPr lang="en-US"/>
           </a:p>
           <a:p>
             <a:r>
               <a:rPr lang="en-US"/>
               <a:t>Họ tên: ...  Điện thoại:....</a:t>
             </a:r>
+            <a:endParaRPr lang="en-US"/>
           </a:p>
           <a:p>
             <a:r>
               <a:rPr lang="en-US"/>
               <a:t>Email:....  Mã nhận vé:...</a:t>
             </a:r>
+            <a:endParaRPr lang="en-US"/>
           </a:p>
           <a:p>
             <a:r>
@@ -5219,7 +5344,7 @@
       <p:sp>
         <p:nvSpPr>
           <p:cNvPr id="69" name="Rounded Rectangle 68">
-            <a:hlinkClick r:id="rId3" action="ppaction://hlinksldjump"/>
+            <a:hlinkClick r:id="rId1" action="ppaction://hlinksldjump"/>
           </p:cNvPr>
           <p:cNvSpPr/>
           <p:nvPr/>
@@ -5434,7 +5559,7 @@
           <p:nvPr/>
         </p:nvPicPr>
         <p:blipFill>
-          <a:blip r:embed="rId4">
+          <a:blip r:embed="rId2">
             <a:extLst>
               <a:ext uri="{28A0092B-C50C-407E-A947-70E740481C1C}">
                 <a14:useLocalDpi xmlns:a14="http://schemas.microsoft.com/office/drawing/2010/main" val="0"/>
@@ -5663,16 +5788,6 @@
                 </a:rPr>
                 <a:t>Du_lieu</a:t>
               </a:r>
-              <a:r>
-                <a:rPr lang="en-US" sz="1400">
-                  <a:solidFill>
-                    <a:srgbClr val="002060"/>
-                  </a:solidFill>
-                  <a:latin typeface="Arial" panose="020B0604020202020204" pitchFamily="34" charset="0"/>
-                  <a:cs typeface="Arial" panose="020B0604020202020204" pitchFamily="34" charset="0"/>
-                </a:rPr>
-                <a:t/>
-              </a:r>
               <a:br>
                 <a:rPr lang="en-US" sz="1400">
                   <a:solidFill>
@@ -5691,16 +5806,6 @@
                   <a:cs typeface="Arial" panose="020B0604020202020204" pitchFamily="34" charset="0"/>
                 </a:rPr>
                 <a:t> Cong_ty</a:t>
-              </a:r>
-              <a:r>
-                <a:rPr lang="en-US" sz="1400" b="1">
-                  <a:solidFill>
-                    <a:srgbClr val="002060"/>
-                  </a:solidFill>
-                  <a:latin typeface="Arial" panose="020B0604020202020204" pitchFamily="34" charset="0"/>
-                  <a:cs typeface="Arial" panose="020B0604020202020204" pitchFamily="34" charset="0"/>
-                </a:rPr>
-                <a:t/>
               </a:r>
               <a:br>
                 <a:rPr lang="en-US" sz="1400" b="1">
@@ -6114,6 +6219,10 @@
                 </a:rPr>
                 <a:t>Ten,Ma_so,Dien_thoai,Dia_chi</a:t>
               </a:r>
+              <a:endParaRPr lang="en-US" sz="1400">
+                <a:latin typeface="Arial" panose="020B0604020202020204" pitchFamily="34" charset="0"/>
+                <a:cs typeface="Arial" panose="020B0604020202020204" pitchFamily="34" charset="0"/>
+              </a:endParaRPr>
             </a:p>
             <a:p>
               <a:r>
@@ -6142,13 +6251,6 @@
                 </a:rPr>
                 <a:t>Ten,Ma_so, Danh_sach_Phong_chieu</a:t>
               </a:r>
-              <a:r>
-                <a:rPr lang="en-US" sz="1400" i="1">
-                  <a:latin typeface="Arial" panose="020B0604020202020204" pitchFamily="34" charset="0"/>
-                  <a:cs typeface="Arial" panose="020B0604020202020204" pitchFamily="34" charset="0"/>
-                </a:rPr>
-                <a:t/>
-              </a:r>
               <a:br>
                 <a:rPr lang="en-US" sz="1400" i="1">
                   <a:latin typeface="Arial" panose="020B0604020202020204" pitchFamily="34" charset="0"/>
@@ -6174,6 +6276,10 @@
                 </a:rPr>
                 <a:t> :    </a:t>
               </a:r>
+              <a:endParaRPr lang="en-US" sz="1400" i="1">
+                <a:latin typeface="Arial" panose="020B0604020202020204" pitchFamily="34" charset="0"/>
+                <a:cs typeface="Arial" panose="020B0604020202020204" pitchFamily="34" charset="0"/>
+              </a:endParaRPr>
             </a:p>
             <a:p>
               <a:r>
@@ -6190,6 +6296,10 @@
                 </a:rPr>
                 <a:t>Ho_ten,Ma_so, Ten_Dang_nhap,Mat_khau, Rap</a:t>
               </a:r>
+              <a:endParaRPr lang="en-US" sz="1400">
+                <a:latin typeface="Arial" panose="020B0604020202020204" pitchFamily="34" charset="0"/>
+                <a:cs typeface="Arial" panose="020B0604020202020204" pitchFamily="34" charset="0"/>
+              </a:endParaRPr>
             </a:p>
             <a:p>
               <a:r>
@@ -6211,6 +6321,10 @@
                 </a:rPr>
                 <a:t> :    </a:t>
               </a:r>
+              <a:endParaRPr lang="en-US" sz="1400" i="1">
+                <a:latin typeface="Arial" panose="020B0604020202020204" pitchFamily="34" charset="0"/>
+                <a:cs typeface="Arial" panose="020B0604020202020204" pitchFamily="34" charset="0"/>
+              </a:endParaRPr>
             </a:p>
             <a:p>
               <a:r>
@@ -6260,6 +6374,10 @@
                 </a:rPr>
                 <a:t> :    </a:t>
               </a:r>
+              <a:endParaRPr lang="en-US" sz="1400" i="1">
+                <a:latin typeface="Arial" panose="020B0604020202020204" pitchFamily="34" charset="0"/>
+                <a:cs typeface="Arial" panose="020B0604020202020204" pitchFamily="34" charset="0"/>
+              </a:endParaRPr>
             </a:p>
             <a:p>
               <a:r>
@@ -6276,6 +6394,10 @@
                 </a:rPr>
                 <a:t>Ho_ten,Ma_so, Ten_Dang_nhap,Mat_khau</a:t>
               </a:r>
+              <a:endParaRPr lang="en-US" sz="1400">
+                <a:latin typeface="Arial" panose="020B0604020202020204" pitchFamily="34" charset="0"/>
+                <a:cs typeface="Arial" panose="020B0604020202020204" pitchFamily="34" charset="0"/>
+              </a:endParaRPr>
             </a:p>
           </p:txBody>
         </p:sp>
@@ -6373,6 +6495,10 @@
                 </a:rPr>
                 <a:t>Ten,Ma_so,Ten_tieng_Anh,Don_gia,Trang_thai,Thoi_luong,Rating,Phan_loai,Quoc_gia,Dao_dien,Nha_san_xuat,The_loai,Dien_vien,Khoi_chieu.Noi_dung,Dich_thuat,</a:t>
               </a:r>
+              <a:endParaRPr lang="en-US" sz="1400">
+                <a:latin typeface="Arial" panose="020B0604020202020204" pitchFamily="34" charset="0"/>
+                <a:cs typeface="Arial" panose="020B0604020202020204" pitchFamily="34" charset="0"/>
+              </a:endParaRPr>
             </a:p>
             <a:p>
               <a:r>
@@ -6394,16 +6520,6 @@
                   <a:cs typeface="Arial" panose="020B0604020202020204" pitchFamily="34" charset="0"/>
                 </a:rPr>
                 <a:t>Ma_so, Bat_dau, Danh_sach_Ghe_trong, Rap, Phong_chieu</a:t>
-              </a:r>
-              <a:r>
-                <a:rPr lang="en-US" sz="1400" i="1">
-                  <a:solidFill>
-                    <a:schemeClr val="tx1"/>
-                  </a:solidFill>
-                  <a:latin typeface="Arial" panose="020B0604020202020204" pitchFamily="34" charset="0"/>
-                  <a:cs typeface="Arial" panose="020B0604020202020204" pitchFamily="34" charset="0"/>
-                </a:rPr>
-                <a:t/>
               </a:r>
               <a:br>
                 <a:rPr lang="en-US" sz="1400" i="1">
@@ -6438,6 +6554,10 @@
                 </a:rPr>
                 <a:t>Ma_so, Ma_nhan_ve, Danh_sach_Ghe_dat, Suat_chieu, Rap, Phong_chieu, So_luong, Don_gia, Tien, Ngay_dat, Trang_thai, </a:t>
               </a:r>
+              <a:endParaRPr lang="en-US" sz="1400">
+                <a:latin typeface="Arial" panose="020B0604020202020204" pitchFamily="34" charset="0"/>
+                <a:cs typeface="Arial" panose="020B0604020202020204" pitchFamily="34" charset="0"/>
+              </a:endParaRPr>
             </a:p>
             <a:p>
               <a:r>
@@ -6485,6 +6605,11 @@
                 </a:rPr>
                 <a:t>Danh_sach_Ghe_dat, Nhan_vien_Ban_ve, Suat_chieu, Rap, Phong_chieu</a:t>
               </a:r>
+              <a:endParaRPr lang="en-US" sz="1400">
+                <a:latin typeface="Arial" panose="020B0604020202020204" pitchFamily="34" charset="0"/>
+                <a:cs typeface="Arial" panose="020B0604020202020204" pitchFamily="34" charset="0"/>
+                <a:sym typeface="+mn-ea"/>
+              </a:endParaRPr>
             </a:p>
           </p:txBody>
         </p:sp>
@@ -6517,7 +6642,7 @@
       <p:sp>
         <p:nvSpPr>
           <p:cNvPr id="69" name="Rounded Rectangle 68">
-            <a:hlinkClick r:id="rId3" action="ppaction://hlinksldjump"/>
+            <a:hlinkClick r:id="rId1" action="ppaction://hlinksldjump"/>
           </p:cNvPr>
           <p:cNvSpPr/>
           <p:nvPr/>
@@ -6733,7 +6858,7 @@
           <p:nvPr/>
         </p:nvPicPr>
         <p:blipFill>
-          <a:blip r:embed="rId4">
+          <a:blip r:embed="rId2">
             <a:extLst>
               <a:ext uri="{28A0092B-C50C-407E-A947-70E740481C1C}">
                 <a14:useLocalDpi xmlns:a14="http://schemas.microsoft.com/office/drawing/2010/main" val="0"/>
@@ -7479,6 +7604,10 @@
               </a:rPr>
               <a:t>Du_lieu</a:t>
             </a:r>
+            <a:endParaRPr lang="en-US" sz="1400">
+              <a:latin typeface="Arial" panose="020B0604020202020204" pitchFamily="34" charset="0"/>
+              <a:cs typeface="Arial" panose="020B0604020202020204" pitchFamily="34" charset="0"/>
+            </a:endParaRPr>
           </a:p>
         </p:txBody>
       </p:sp>
@@ -7669,16 +7798,6 @@
               </a:rPr>
               <a:t>Du_lieu</a:t>
             </a:r>
-            <a:r>
-              <a:rPr lang="en-US" sz="1400">
-                <a:solidFill>
-                  <a:srgbClr val="002060"/>
-                </a:solidFill>
-                <a:latin typeface="Arial" panose="020B0604020202020204" pitchFamily="34" charset="0"/>
-                <a:cs typeface="Arial" panose="020B0604020202020204" pitchFamily="34" charset="0"/>
-              </a:rPr>
-              <a:t/>
-            </a:r>
             <a:br>
               <a:rPr lang="en-US" sz="1400">
                 <a:solidFill>
@@ -7697,16 +7816,6 @@
                 <a:cs typeface="Arial" panose="020B0604020202020204" pitchFamily="34" charset="0"/>
               </a:rPr>
               <a:t> Cong_ty</a:t>
-            </a:r>
-            <a:r>
-              <a:rPr lang="en-US" sz="1400" b="1">
-                <a:solidFill>
-                  <a:srgbClr val="002060"/>
-                </a:solidFill>
-                <a:latin typeface="Arial" panose="020B0604020202020204" pitchFamily="34" charset="0"/>
-                <a:cs typeface="Arial" panose="020B0604020202020204" pitchFamily="34" charset="0"/>
-              </a:rPr>
-              <a:t/>
             </a:r>
             <a:br>
               <a:rPr lang="en-US" sz="1400" b="1">
@@ -7830,6 +7939,10 @@
                 </a:rPr>
                 <a:t>Ten,Ma_so,Dien_thoai,Dia_chi</a:t>
               </a:r>
+              <a:endParaRPr lang="en-US" sz="1400">
+                <a:latin typeface="Arial" panose="020B0604020202020204" pitchFamily="34" charset="0"/>
+                <a:cs typeface="Arial" panose="020B0604020202020204" pitchFamily="34" charset="0"/>
+              </a:endParaRPr>
             </a:p>
             <a:p>
               <a:r>
@@ -7858,6 +7971,10 @@
                 </a:rPr>
                 <a:t>Ten,Ma_so, Danh_sach_Phong_chieu</a:t>
               </a:r>
+              <a:endParaRPr lang="en-US" sz="1400">
+                <a:latin typeface="Arial" panose="020B0604020202020204" pitchFamily="34" charset="0"/>
+                <a:cs typeface="Arial" panose="020B0604020202020204" pitchFamily="34" charset="0"/>
+              </a:endParaRPr>
             </a:p>
           </p:txBody>
         </p:sp>
@@ -7955,6 +8072,10 @@
                 </a:rPr>
                 <a:t>Ten,Ma_so,Ten_tieng_Anh,Don_gia,Trang_thai,Thoi_luong,Rating,Phan_loai,Quoc_gia,Dao_dien,Nha_san_xuat,The_loai,Dien_vien,Khoi_chieu.Noi_dung,Dich_thuat,</a:t>
               </a:r>
+              <a:endParaRPr lang="en-US" sz="1400">
+                <a:latin typeface="Arial" panose="020B0604020202020204" pitchFamily="34" charset="0"/>
+                <a:cs typeface="Arial" panose="020B0604020202020204" pitchFamily="34" charset="0"/>
+              </a:endParaRPr>
             </a:p>
             <a:p>
               <a:r>
@@ -8014,7 +8135,7 @@
       <p:sp>
         <p:nvSpPr>
           <p:cNvPr id="69" name="Rounded Rectangle 68">
-            <a:hlinkClick r:id="rId3" action="ppaction://hlinksldjump"/>
+            <a:hlinkClick r:id="rId1" action="ppaction://hlinksldjump"/>
           </p:cNvPr>
           <p:cNvSpPr/>
           <p:nvPr/>
@@ -8600,7 +8721,7 @@
           <p:nvPr/>
         </p:nvPicPr>
         <p:blipFill>
-          <a:blip r:embed="rId4">
+          <a:blip r:embed="rId2">
             <a:extLst>
               <a:ext uri="{28A0092B-C50C-407E-A947-70E740481C1C}">
                 <a14:useLocalDpi xmlns:a14="http://schemas.microsoft.com/office/drawing/2010/main" val="0"/>
@@ -9514,6 +9635,10 @@
               </a:rPr>
               <a:t>Du_lieu</a:t>
             </a:r>
+            <a:endParaRPr lang="en-US" sz="1400">
+              <a:latin typeface="Arial" panose="020B0604020202020204" pitchFamily="34" charset="0"/>
+              <a:cs typeface="Arial" panose="020B0604020202020204" pitchFamily="34" charset="0"/>
+            </a:endParaRPr>
           </a:p>
         </p:txBody>
       </p:sp>
@@ -10996,16 +11121,6 @@
               </a:rPr>
               <a:t>Du_lieu</a:t>
             </a:r>
-            <a:r>
-              <a:rPr lang="en-US" sz="1400" dirty="0">
-                <a:solidFill>
-                  <a:srgbClr val="002060"/>
-                </a:solidFill>
-                <a:latin typeface="Arial" panose="020B0604020202020204" pitchFamily="34" charset="0"/>
-                <a:cs typeface="Arial" panose="020B0604020202020204" pitchFamily="34" charset="0"/>
-              </a:rPr>
-              <a:t/>
-            </a:r>
             <a:br>
               <a:rPr lang="en-US" sz="1400" dirty="0">
                 <a:solidFill>
@@ -11053,16 +11168,6 @@
                 <a:cs typeface="Arial" panose="020B0604020202020204" pitchFamily="34" charset="0"/>
               </a:rPr>
               <a:t>Danh_sach_Nguoi_dung_Noi_bo</a:t>
-            </a:r>
-            <a:r>
-              <a:rPr lang="en-US" sz="1400" b="1" dirty="0">
-                <a:solidFill>
-                  <a:srgbClr val="002060"/>
-                </a:solidFill>
-                <a:latin typeface="Arial" panose="020B0604020202020204" pitchFamily="34" charset="0"/>
-                <a:cs typeface="Arial" panose="020B0604020202020204" pitchFamily="34" charset="0"/>
-              </a:rPr>
-              <a:t/>
             </a:r>
             <a:br>
               <a:rPr lang="en-US" sz="1400" b="1" dirty="0">
@@ -11343,6 +11448,10 @@
                 </a:rPr>
                 <a:t>Ten,Ma_so,Ten_tieng_Anh,Don_gia,Trang_thai,Thoi_luong,Rating,Phan_loai,Quoc_gia,Dao_dien,Nha_san_xuat,The_loai,Dien_vien,Khoi_chieu,Noi_dung,Dich_thuat,</a:t>
               </a:r>
+              <a:endParaRPr lang="en-US" sz="1400" dirty="0">
+                <a:latin typeface="Arial" panose="020B0604020202020204" pitchFamily="34" charset="0"/>
+                <a:cs typeface="Arial" panose="020B0604020202020204" pitchFamily="34" charset="0"/>
+              </a:endParaRPr>
             </a:p>
             <a:p>
               <a:r>
@@ -11427,6 +11536,13 @@
                 </a:rPr>
                 <a:t>, Rap</a:t>
               </a:r>
+              <a:endParaRPr lang="en-US" sz="1400" dirty="0">
+                <a:solidFill>
+                  <a:schemeClr val="tx1"/>
+                </a:solidFill>
+                <a:latin typeface="Arial" panose="020B0604020202020204" pitchFamily="34" charset="0"/>
+                <a:cs typeface="Arial" panose="020B0604020202020204" pitchFamily="34" charset="0"/>
+              </a:endParaRPr>
             </a:p>
             <a:p>
               <a:r>
@@ -11499,13 +11615,7 @@
       </p:grpSp>
       <p:grpSp>
         <p:nvGrpSpPr>
-          <p:cNvPr id="28" name="Group 27">
-            <a:extLst>
-              <a:ext uri="{FF2B5EF4-FFF2-40B4-BE49-F238E27FC236}">
-                <a16:creationId xmlns:a16="http://schemas.microsoft.com/office/drawing/2014/main" id="{D38367C0-A8C4-4C32-9FCF-2642B959C874}"/>
-              </a:ext>
-            </a:extLst>
-          </p:cNvPr>
+          <p:cNvPr id="28" name="Group 27"/>
           <p:cNvGrpSpPr/>
           <p:nvPr/>
         </p:nvGrpSpPr>
@@ -11519,13 +11629,7 @@
         </p:grpSpPr>
         <p:sp>
           <p:nvSpPr>
-            <p:cNvPr id="29" name="TextBox 28">
-              <a:extLst>
-                <a:ext uri="{FF2B5EF4-FFF2-40B4-BE49-F238E27FC236}">
-                  <a16:creationId xmlns:a16="http://schemas.microsoft.com/office/drawing/2014/main" id="{BDA30C46-B7A0-4DF1-AF41-EE3E7F7B1684}"/>
-                </a:ext>
-              </a:extLst>
-            </p:cNvPr>
+            <p:cNvPr id="29" name="TextBox 28"/>
             <p:cNvSpPr txBox="1"/>
             <p:nvPr/>
           </p:nvSpPr>
@@ -11573,13 +11677,7 @@
         </p:sp>
         <p:sp>
           <p:nvSpPr>
-            <p:cNvPr id="30" name="TextBox 29">
-              <a:extLst>
-                <a:ext uri="{FF2B5EF4-FFF2-40B4-BE49-F238E27FC236}">
-                  <a16:creationId xmlns:a16="http://schemas.microsoft.com/office/drawing/2014/main" id="{659729D2-CF72-4814-B800-E04138F38C8B}"/>
-                </a:ext>
-              </a:extLst>
-            </p:cNvPr>
+            <p:cNvPr id="30" name="TextBox 29"/>
             <p:cNvSpPr txBox="1"/>
             <p:nvPr/>
           </p:nvSpPr>
@@ -11690,11 +11788,6 @@
         </p:sp>
       </p:grpSp>
     </p:spTree>
-    <p:extLst>
-      <p:ext uri="{BB962C8B-B14F-4D97-AF65-F5344CB8AC3E}">
-        <p14:creationId xmlns:p14="http://schemas.microsoft.com/office/powerpoint/2010/main" val="3885598075"/>
-      </p:ext>
-    </p:extLst>
   </p:cSld>
   <p:clrMapOvr>
     <a:masterClrMapping/>
@@ -11722,7 +11815,7 @@
       <p:sp>
         <p:nvSpPr>
           <p:cNvPr id="69" name="Rounded Rectangle 68">
-            <a:hlinkClick r:id="rId3" action="ppaction://hlinksldjump"/>
+            <a:hlinkClick r:id="rId1" action="ppaction://hlinksldjump"/>
           </p:cNvPr>
           <p:cNvSpPr/>
           <p:nvPr/>
@@ -12044,7 +12137,7 @@
           <p:nvPr/>
         </p:nvPicPr>
         <p:blipFill>
-          <a:blip r:embed="rId4">
+          <a:blip r:embed="rId2">
             <a:extLst>
               <a:ext uri="{28A0092B-C50C-407E-A947-70E740481C1C}">
                 <a14:useLocalDpi xmlns:a14="http://schemas.microsoft.com/office/drawing/2010/main" val="0"/>
@@ -12958,6 +13051,10 @@
               </a:rPr>
               <a:t>Du_lieu</a:t>
             </a:r>
+            <a:endParaRPr lang="en-US" sz="1400">
+              <a:latin typeface="Arial" panose="020B0604020202020204" pitchFamily="34" charset="0"/>
+              <a:cs typeface="Arial" panose="020B0604020202020204" pitchFamily="34" charset="0"/>
+            </a:endParaRPr>
           </a:p>
         </p:txBody>
       </p:sp>
@@ -13194,16 +13291,6 @@
                 <a:cs typeface="Arial" panose="020B0604020202020204" pitchFamily="34" charset="0"/>
               </a:rPr>
               <a:t>Du_lieu</a:t>
-            </a:r>
-            <a:r>
-              <a:rPr lang="en-US" sz="1400" dirty="0">
-                <a:solidFill>
-                  <a:srgbClr val="002060"/>
-                </a:solidFill>
-                <a:latin typeface="Arial" panose="020B0604020202020204" pitchFamily="34" charset="0"/>
-                <a:cs typeface="Arial" panose="020B0604020202020204" pitchFamily="34" charset="0"/>
-              </a:rPr>
-              <a:t/>
             </a:r>
             <a:br>
               <a:rPr lang="en-US" sz="1400" dirty="0">
@@ -13513,6 +13600,10 @@
                 </a:rPr>
                 <a:t>Ten,Ma_so,Ten_tieng_Anh,Don_gia,Trang_thai,Thoi_luong,Rating,Phan_loai,Quoc_gia,Dao_dien,Nha_san_xuat,The_loai,Dien_vien,Khoi_chieu,Noi_dung,Dich_thuat,</a:t>
               </a:r>
+              <a:endParaRPr lang="en-US" sz="1400" dirty="0">
+                <a:latin typeface="Arial" panose="020B0604020202020204" pitchFamily="34" charset="0"/>
+                <a:cs typeface="Arial" panose="020B0604020202020204" pitchFamily="34" charset="0"/>
+              </a:endParaRPr>
             </a:p>
             <a:p>
               <a:r>
@@ -13607,11 +13698,1747 @@
         </p:sp>
       </p:grpSp>
     </p:spTree>
-    <p:extLst>
-      <p:ext uri="{BB962C8B-B14F-4D97-AF65-F5344CB8AC3E}">
-        <p14:creationId xmlns:p14="http://schemas.microsoft.com/office/powerpoint/2010/main" val="352141057"/>
-      </p:ext>
-    </p:extLst>
+  </p:cSld>
+  <p:clrMapOvr>
+    <a:masterClrMapping/>
+  </p:clrMapOvr>
+</p:sld>
+</file>
+
+<file path=ppt/slides/slide6.xml><?xml version="1.0" encoding="utf-8"?>
+<p:sld xmlns:a="http://schemas.openxmlformats.org/drawingml/2006/main" xmlns:r="http://schemas.openxmlformats.org/officeDocument/2006/relationships" xmlns:p="http://schemas.openxmlformats.org/presentationml/2006/main">
+  <p:cSld>
+    <p:spTree>
+      <p:nvGrpSpPr>
+        <p:cNvPr id="1" name=""/>
+        <p:cNvGrpSpPr/>
+        <p:nvPr/>
+      </p:nvGrpSpPr>
+      <p:grpSpPr>
+        <a:xfrm>
+          <a:off x="0" y="0"/>
+          <a:ext cx="0" cy="0"/>
+          <a:chOff x="0" y="0"/>
+          <a:chExt cx="0" cy="0"/>
+        </a:xfrm>
+      </p:grpSpPr>
+      <p:sp>
+        <p:nvSpPr>
+          <p:cNvPr id="69" name="Rounded Rectangle 68">
+            <a:hlinkClick r:id="rId1" action="ppaction://hlinksldjump"/>
+          </p:cNvPr>
+          <p:cNvSpPr/>
+          <p:nvPr/>
+        </p:nvSpPr>
+        <p:spPr>
+          <a:xfrm>
+            <a:off x="2232941" y="256387"/>
+            <a:ext cx="6074929" cy="754401"/>
+          </a:xfrm>
+          <a:prstGeom prst="roundRect">
+            <a:avLst/>
+          </a:prstGeom>
+          <a:solidFill>
+            <a:srgbClr val="002060"/>
+          </a:solidFill>
+          <a:ln w="38100" cap="rnd">
+            <a:solidFill>
+              <a:schemeClr val="bg1"/>
+            </a:solidFill>
+          </a:ln>
+          <a:effectLst>
+            <a:outerShdw blurRad="482600" dir="5400000" sx="89000" sy="89000" algn="ctr" rotWithShape="0">
+              <a:srgbClr val="000000">
+                <a:alpha val="49000"/>
+              </a:srgbClr>
+            </a:outerShdw>
+          </a:effectLst>
+          <a:scene3d>
+            <a:camera prst="orthographicFront"/>
+            <a:lightRig rig="twoPt" dir="t"/>
+          </a:scene3d>
+          <a:sp3d extrusionH="12700" prstMaterial="translucentPowder">
+            <a:bevelB w="165100" prst="coolSlant"/>
+          </a:sp3d>
+        </p:spPr>
+        <p:style>
+          <a:lnRef idx="2">
+            <a:schemeClr val="accent1">
+              <a:shade val="50000"/>
+            </a:schemeClr>
+          </a:lnRef>
+          <a:fillRef idx="1">
+            <a:schemeClr val="accent1"/>
+          </a:fillRef>
+          <a:effectRef idx="0">
+            <a:schemeClr val="accent1"/>
+          </a:effectRef>
+          <a:fontRef idx="minor">
+            <a:schemeClr val="lt1"/>
+          </a:fontRef>
+        </p:style>
+        <p:txBody>
+          <a:bodyPr rtlCol="0" anchor="ctr"/>
+          <a:lstStyle/>
+          <a:p>
+            <a:pPr algn="ctr"/>
+            <a:r>
+              <a:rPr lang="en-US" sz="1600" b="1" dirty="0" err="1">
+                <a:solidFill>
+                  <a:prstClr val="white"/>
+                </a:solidFill>
+                <a:latin typeface="Arial" panose="020B0604020202020204" pitchFamily="34" charset="0"/>
+                <a:cs typeface="Arial" panose="020B0604020202020204" pitchFamily="34" charset="0"/>
+                <a:sym typeface="+mn-ea"/>
+              </a:rPr>
+              <a:t>Công</a:t>
+            </a:r>
+            <a:r>
+              <a:rPr lang="en-US" sz="1600" b="1" dirty="0">
+                <a:solidFill>
+                  <a:prstClr val="white"/>
+                </a:solidFill>
+                <a:latin typeface="Arial" panose="020B0604020202020204" pitchFamily="34" charset="0"/>
+                <a:cs typeface="Arial" panose="020B0604020202020204" pitchFamily="34" charset="0"/>
+                <a:sym typeface="+mn-ea"/>
+              </a:rPr>
+              <a:t> ty Galaxy Cinema </a:t>
+            </a:r>
+            <a:r>
+              <a:rPr lang="en-US" sz="1600" dirty="0">
+                <a:solidFill>
+                  <a:prstClr val="white"/>
+                </a:solidFill>
+                <a:latin typeface="Arial" panose="020B0604020202020204" pitchFamily="34" charset="0"/>
+                <a:cs typeface="Arial" panose="020B0604020202020204" pitchFamily="34" charset="0"/>
+                <a:sym typeface="+mn-ea"/>
+              </a:rPr>
+              <a:t>( </a:t>
+            </a:r>
+            <a:r>
+              <a:rPr lang="en-US" sz="1600" dirty="0" err="1">
+                <a:solidFill>
+                  <a:prstClr val="white"/>
+                </a:solidFill>
+                <a:latin typeface="Arial" panose="020B0604020202020204" pitchFamily="34" charset="0"/>
+                <a:cs typeface="Arial" panose="020B0604020202020204" pitchFamily="34" charset="0"/>
+                <a:sym typeface="+mn-ea"/>
+              </a:rPr>
+              <a:t>Mã</a:t>
+            </a:r>
+            <a:r>
+              <a:rPr lang="en-US" sz="1600" dirty="0">
+                <a:solidFill>
+                  <a:prstClr val="white"/>
+                </a:solidFill>
+                <a:latin typeface="Arial" panose="020B0604020202020204" pitchFamily="34" charset="0"/>
+                <a:cs typeface="Arial" panose="020B0604020202020204" pitchFamily="34" charset="0"/>
+                <a:sym typeface="+mn-ea"/>
+              </a:rPr>
+              <a:t> </a:t>
+            </a:r>
+            <a:r>
+              <a:rPr lang="en-US" sz="1600" dirty="0" err="1">
+                <a:solidFill>
+                  <a:prstClr val="white"/>
+                </a:solidFill>
+                <a:latin typeface="Arial" panose="020B0604020202020204" pitchFamily="34" charset="0"/>
+                <a:cs typeface="Arial" panose="020B0604020202020204" pitchFamily="34" charset="0"/>
+                <a:sym typeface="+mn-ea"/>
+              </a:rPr>
+              <a:t>số</a:t>
+            </a:r>
+            <a:r>
+              <a:rPr lang="en-US" sz="1600" dirty="0">
+                <a:solidFill>
+                  <a:prstClr val="white"/>
+                </a:solidFill>
+                <a:latin typeface="Arial" panose="020B0604020202020204" pitchFamily="34" charset="0"/>
+                <a:cs typeface="Arial" panose="020B0604020202020204" pitchFamily="34" charset="0"/>
+                <a:sym typeface="+mn-ea"/>
+              </a:rPr>
+              <a:t> : </a:t>
+            </a:r>
+            <a:r>
+              <a:rPr lang="en-US" sz="1600" dirty="0" err="1">
+                <a:solidFill>
+                  <a:schemeClr val="bg1"/>
+                </a:solidFill>
+                <a:latin typeface="Arial" panose="020B0604020202020204" pitchFamily="34" charset="0"/>
+                <a:cs typeface="Arial" panose="020B0604020202020204" pitchFamily="34" charset="0"/>
+                <a:sym typeface="+mn-ea"/>
+              </a:rPr>
+              <a:t>Galaxy_Cinema</a:t>
+            </a:r>
+            <a:r>
+              <a:rPr lang="en-US" sz="1600" dirty="0">
+                <a:solidFill>
+                  <a:prstClr val="white"/>
+                </a:solidFill>
+                <a:latin typeface="Arial" panose="020B0604020202020204" pitchFamily="34" charset="0"/>
+                <a:cs typeface="Arial" panose="020B0604020202020204" pitchFamily="34" charset="0"/>
+                <a:sym typeface="+mn-ea"/>
+              </a:rPr>
+              <a:t>)</a:t>
+            </a:r>
+            <a:endParaRPr lang="en-US" sz="1600" dirty="0">
+              <a:solidFill>
+                <a:prstClr val="white"/>
+              </a:solidFill>
+              <a:latin typeface="Arial" panose="020B0604020202020204" pitchFamily="34" charset="0"/>
+              <a:cs typeface="Arial" panose="020B0604020202020204" pitchFamily="34" charset="0"/>
+            </a:endParaRPr>
+          </a:p>
+          <a:p>
+            <a:pPr algn="ctr"/>
+            <a:r>
+              <a:rPr lang="en-US" sz="1600" b="1" dirty="0">
+                <a:solidFill>
+                  <a:srgbClr val="FFFF00"/>
+                </a:solidFill>
+                <a:latin typeface="Arial" panose="020B0604020202020204" pitchFamily="34" charset="0"/>
+                <a:cs typeface="Arial" panose="020B0604020202020204" pitchFamily="34" charset="0"/>
+                <a:sym typeface="+mn-ea"/>
+              </a:rPr>
+              <a:t>Mô hình Đối tượng xử lý của Phân hệ </a:t>
+            </a:r>
+            <a:r>
+              <a:rPr lang="en-US" sz="1600" b="1" dirty="0" smtClean="0">
+                <a:solidFill>
+                  <a:srgbClr val="FFFF00"/>
+                </a:solidFill>
+                <a:latin typeface="Arial" panose="020B0604020202020204" pitchFamily="34" charset="0"/>
+                <a:cs typeface="Arial" panose="020B0604020202020204" pitchFamily="34" charset="0"/>
+                <a:sym typeface="+mn-ea"/>
+              </a:rPr>
+              <a:t>Quản lý Nhân viên </a:t>
+            </a:r>
+            <a:endParaRPr lang="vi-VN" sz="1600" dirty="0">
+              <a:solidFill>
+                <a:srgbClr val="FFFF00"/>
+              </a:solidFill>
+              <a:latin typeface="Arial" panose="020B0604020202020204" pitchFamily="34" charset="0"/>
+              <a:cs typeface="Arial" panose="020B0604020202020204" pitchFamily="34" charset="0"/>
+            </a:endParaRPr>
+          </a:p>
+        </p:txBody>
+      </p:sp>
+      <p:sp>
+        <p:nvSpPr>
+          <p:cNvPr id="70" name="Footer Placeholder 2"/>
+          <p:cNvSpPr>
+            <a:spLocks noGrp="1"/>
+          </p:cNvSpPr>
+          <p:nvPr>
+            <p:ph type="ftr" sz="quarter" idx="11"/>
+          </p:nvPr>
+        </p:nvSpPr>
+        <p:spPr>
+          <a:xfrm>
+            <a:off x="6049839" y="5712349"/>
+            <a:ext cx="3273554" cy="365125"/>
+          </a:xfrm>
+        </p:spPr>
+        <p:txBody>
+          <a:bodyPr/>
+          <a:lstStyle/>
+          <a:p>
+            <a:pPr>
+              <a:defRPr/>
+            </a:pPr>
+            <a:r>
+              <a:rPr lang="vi-VN" sz="1600" dirty="0">
+                <a:solidFill>
+                  <a:srgbClr val="002060"/>
+                </a:solidFill>
+                <a:latin typeface="Arial" panose="020B0604020202020204" pitchFamily="34" charset="0"/>
+                <a:cs typeface="Arial" panose="020B0604020202020204" pitchFamily="34" charset="0"/>
+              </a:rPr>
+              <a:t>Nguyễn </a:t>
+            </a:r>
+            <a:r>
+              <a:rPr lang="vi-VN" sz="1600" dirty="0" err="1">
+                <a:solidFill>
+                  <a:srgbClr val="002060"/>
+                </a:solidFill>
+                <a:latin typeface="Arial" panose="020B0604020202020204" pitchFamily="34" charset="0"/>
+                <a:cs typeface="Arial" panose="020B0604020202020204" pitchFamily="34" charset="0"/>
+              </a:rPr>
+              <a:t>tiến</a:t>
+            </a:r>
+            <a:r>
+              <a:rPr lang="vi-VN" sz="1600" dirty="0">
+                <a:solidFill>
+                  <a:srgbClr val="002060"/>
+                </a:solidFill>
+                <a:latin typeface="Arial" panose="020B0604020202020204" pitchFamily="34" charset="0"/>
+                <a:cs typeface="Arial" panose="020B0604020202020204" pitchFamily="34" charset="0"/>
+              </a:rPr>
+              <a:t> Huy   </a:t>
+            </a:r>
+            <a:r>
+              <a:rPr lang="vi-VN" sz="1600" dirty="0" err="1">
+                <a:solidFill>
+                  <a:srgbClr val="002060"/>
+                </a:solidFill>
+                <a:latin typeface="Arial" panose="020B0604020202020204" pitchFamily="34" charset="0"/>
+                <a:cs typeface="Arial" panose="020B0604020202020204" pitchFamily="34" charset="0"/>
+              </a:rPr>
+              <a:t>Tháng</a:t>
+            </a:r>
+            <a:r>
+              <a:rPr lang="vi-VN" sz="1600" dirty="0">
+                <a:solidFill>
+                  <a:srgbClr val="002060"/>
+                </a:solidFill>
+                <a:latin typeface="Arial" panose="020B0604020202020204" pitchFamily="34" charset="0"/>
+                <a:cs typeface="Arial" panose="020B0604020202020204" pitchFamily="34" charset="0"/>
+              </a:rPr>
+              <a:t> </a:t>
+            </a:r>
+            <a:r>
+              <a:rPr lang="en-US" sz="1600" dirty="0">
+                <a:solidFill>
+                  <a:srgbClr val="002060"/>
+                </a:solidFill>
+                <a:latin typeface="Arial" panose="020B0604020202020204" pitchFamily="34" charset="0"/>
+                <a:cs typeface="Arial" panose="020B0604020202020204" pitchFamily="34" charset="0"/>
+              </a:rPr>
+              <a:t>2</a:t>
+            </a:r>
+            <a:r>
+              <a:rPr lang="vi-VN" sz="1600" dirty="0">
+                <a:solidFill>
+                  <a:srgbClr val="002060"/>
+                </a:solidFill>
+                <a:latin typeface="Arial" panose="020B0604020202020204" pitchFamily="34" charset="0"/>
+                <a:cs typeface="Arial" panose="020B0604020202020204" pitchFamily="34" charset="0"/>
+              </a:rPr>
+              <a:t>/201</a:t>
+            </a:r>
+            <a:r>
+              <a:rPr lang="en-US" sz="1600" dirty="0">
+                <a:solidFill>
+                  <a:srgbClr val="002060"/>
+                </a:solidFill>
+                <a:latin typeface="Arial" panose="020B0604020202020204" pitchFamily="34" charset="0"/>
+                <a:cs typeface="Arial" panose="020B0604020202020204" pitchFamily="34" charset="0"/>
+              </a:rPr>
+              <a:t>8</a:t>
+            </a:r>
+            <a:endParaRPr lang="vi-VN" sz="1600" dirty="0">
+              <a:solidFill>
+                <a:srgbClr val="002060"/>
+              </a:solidFill>
+              <a:latin typeface="Arial" panose="020B0604020202020204" pitchFamily="34" charset="0"/>
+              <a:cs typeface="Arial" panose="020B0604020202020204" pitchFamily="34" charset="0"/>
+            </a:endParaRPr>
+          </a:p>
+        </p:txBody>
+      </p:sp>
+      <p:pic>
+        <p:nvPicPr>
+          <p:cNvPr id="71" name="Picture 70">
+            <a:hlinkClick r:id="" action="ppaction://noaction"/>
+          </p:cNvPr>
+          <p:cNvPicPr>
+            <a:picLocks noChangeAspect="1"/>
+          </p:cNvPicPr>
+          <p:nvPr/>
+        </p:nvPicPr>
+        <p:blipFill>
+          <a:blip r:embed="rId2">
+            <a:extLst>
+              <a:ext uri="{28A0092B-C50C-407E-A947-70E740481C1C}">
+                <a14:useLocalDpi xmlns:a14="http://schemas.microsoft.com/office/drawing/2010/main" val="0"/>
+              </a:ext>
+            </a:extLst>
+          </a:blip>
+          <a:stretch>
+            <a:fillRect/>
+          </a:stretch>
+        </p:blipFill>
+        <p:spPr>
+          <a:xfrm>
+            <a:off x="5420103" y="5645562"/>
+            <a:ext cx="562698" cy="453082"/>
+          </a:xfrm>
+          <a:prstGeom prst="rect">
+            <a:avLst/>
+          </a:prstGeom>
+        </p:spPr>
+      </p:pic>
+      <p:sp>
+        <p:nvSpPr>
+          <p:cNvPr id="10" name="Cube 9">
+            <a:hlinkClick r:id="" action="ppaction://noaction"/>
+          </p:cNvPr>
+          <p:cNvSpPr/>
+          <p:nvPr/>
+        </p:nvSpPr>
+        <p:spPr>
+          <a:xfrm>
+            <a:off x="5161897" y="2013059"/>
+            <a:ext cx="4665340" cy="1292616"/>
+          </a:xfrm>
+          <a:prstGeom prst="cube">
+            <a:avLst>
+              <a:gd name="adj" fmla="val 15836"/>
+            </a:avLst>
+          </a:prstGeom>
+          <a:solidFill>
+            <a:schemeClr val="bg1"/>
+          </a:solidFill>
+          <a:ln w="6350">
+            <a:prstDash val="sysDash"/>
+          </a:ln>
+        </p:spPr>
+        <p:style>
+          <a:lnRef idx="2">
+            <a:schemeClr val="accent1">
+              <a:shade val="50000"/>
+            </a:schemeClr>
+          </a:lnRef>
+          <a:fillRef idx="1">
+            <a:schemeClr val="accent1"/>
+          </a:fillRef>
+          <a:effectRef idx="0">
+            <a:schemeClr val="accent1"/>
+          </a:effectRef>
+          <a:fontRef idx="minor">
+            <a:schemeClr val="lt1"/>
+          </a:fontRef>
+        </p:style>
+        <p:txBody>
+          <a:bodyPr rtlCol="0" anchor="ctr"/>
+          <a:lstStyle/>
+          <a:p>
+            <a:pPr algn="ctr"/>
+            <a:endParaRPr lang="vi-VN" sz="3200" b="1">
+              <a:solidFill>
+                <a:prstClr val="white"/>
+              </a:solidFill>
+            </a:endParaRPr>
+          </a:p>
+        </p:txBody>
+      </p:sp>
+      <p:sp>
+        <p:nvSpPr>
+          <p:cNvPr id="11" name="Oval 10"/>
+          <p:cNvSpPr/>
+          <p:nvPr/>
+        </p:nvSpPr>
+        <p:spPr>
+          <a:xfrm>
+            <a:off x="7749054" y="2318725"/>
+            <a:ext cx="1763271" cy="680610"/>
+          </a:xfrm>
+          <a:prstGeom prst="ellipse">
+            <a:avLst/>
+          </a:prstGeom>
+          <a:solidFill>
+            <a:schemeClr val="bg1"/>
+          </a:solidFill>
+        </p:spPr>
+        <p:style>
+          <a:lnRef idx="2">
+            <a:schemeClr val="accent1">
+              <a:shade val="50000"/>
+            </a:schemeClr>
+          </a:lnRef>
+          <a:fillRef idx="1">
+            <a:schemeClr val="accent1"/>
+          </a:fillRef>
+          <a:effectRef idx="0">
+            <a:schemeClr val="accent1"/>
+          </a:effectRef>
+          <a:fontRef idx="minor">
+            <a:schemeClr val="lt1"/>
+          </a:fontRef>
+        </p:style>
+        <p:txBody>
+          <a:bodyPr rtlCol="0" anchor="ctr"/>
+          <a:lstStyle/>
+          <a:p>
+            <a:pPr algn="ctr"/>
+            <a:endParaRPr lang="en-US" sz="1600">
+              <a:solidFill>
+                <a:srgbClr val="FF0000"/>
+              </a:solidFill>
+              <a:latin typeface="Arial" panose="020B0604020202020204" pitchFamily="34" charset="0"/>
+              <a:cs typeface="Arial" panose="020B0604020202020204" pitchFamily="34" charset="0"/>
+            </a:endParaRPr>
+          </a:p>
+          <a:p>
+            <a:pPr algn="ctr"/>
+            <a:r>
+              <a:rPr lang="en-US" sz="1600">
+                <a:solidFill>
+                  <a:srgbClr val="FF0000"/>
+                </a:solidFill>
+                <a:latin typeface="Arial" panose="020B0604020202020204" pitchFamily="34" charset="0"/>
+                <a:cs typeface="Arial" panose="020B0604020202020204" pitchFamily="34" charset="0"/>
+              </a:rPr>
+              <a:t>Lệnh </a:t>
+            </a:r>
+            <a:r>
+              <a:rPr lang="en-US" sz="1600" b="1">
+                <a:solidFill>
+                  <a:srgbClr val="FF0000"/>
+                </a:solidFill>
+                <a:latin typeface="Arial" panose="020B0604020202020204" pitchFamily="34" charset="0"/>
+                <a:cs typeface="Arial" panose="020B0604020202020204" pitchFamily="34" charset="0"/>
+              </a:rPr>
+              <a:t>(3B)</a:t>
+            </a:r>
+            <a:br>
+              <a:rPr lang="en-US" sz="1600" b="1">
+                <a:solidFill>
+                  <a:srgbClr val="FF0000"/>
+                </a:solidFill>
+                <a:latin typeface="Arial" panose="020B0604020202020204" pitchFamily="34" charset="0"/>
+                <a:cs typeface="Arial" panose="020B0604020202020204" pitchFamily="34" charset="0"/>
+              </a:rPr>
+            </a:br>
+            <a:r>
+              <a:rPr lang="en-US" sz="1600" b="1" i="1" u="sng">
+                <a:solidFill>
+                  <a:srgbClr val="FF0000"/>
+                </a:solidFill>
+                <a:latin typeface="Arial" panose="020B0604020202020204" pitchFamily="34" charset="0"/>
+                <a:cs typeface="Arial" panose="020B0604020202020204" pitchFamily="34" charset="0"/>
+              </a:rPr>
+              <a:t> </a:t>
+            </a:r>
+            <a:endParaRPr lang="en-US" sz="1600" b="1">
+              <a:solidFill>
+                <a:srgbClr val="FF0000"/>
+              </a:solidFill>
+              <a:latin typeface="Arial" panose="020B0604020202020204" pitchFamily="34" charset="0"/>
+              <a:cs typeface="Arial" panose="020B0604020202020204" pitchFamily="34" charset="0"/>
+            </a:endParaRPr>
+          </a:p>
+        </p:txBody>
+      </p:sp>
+      <p:grpSp>
+        <p:nvGrpSpPr>
+          <p:cNvPr id="15" name="Group 93"/>
+          <p:cNvGrpSpPr/>
+          <p:nvPr/>
+        </p:nvGrpSpPr>
+        <p:grpSpPr bwMode="auto">
+          <a:xfrm>
+            <a:off x="6275101" y="1190568"/>
+            <a:ext cx="630966" cy="632252"/>
+            <a:chOff x="4628879" y="642920"/>
+            <a:chExt cx="676276" cy="928696"/>
+          </a:xfrm>
+          <a:solidFill>
+            <a:srgbClr val="0070C0"/>
+          </a:solidFill>
+        </p:grpSpPr>
+        <p:sp>
+          <p:nvSpPr>
+            <p:cNvPr id="17" name="Oval 16"/>
+            <p:cNvSpPr/>
+            <p:nvPr/>
+          </p:nvSpPr>
+          <p:spPr>
+            <a:xfrm>
+              <a:off x="4703494" y="642920"/>
+              <a:ext cx="450850" cy="214315"/>
+            </a:xfrm>
+            <a:prstGeom prst="ellipse">
+              <a:avLst/>
+            </a:prstGeom>
+            <a:solidFill>
+              <a:schemeClr val="bg1"/>
+            </a:solidFill>
+            <a:ln w="31750" cmpd="sng">
+              <a:solidFill>
+                <a:schemeClr val="accent2"/>
+              </a:solidFill>
+            </a:ln>
+          </p:spPr>
+          <p:style>
+            <a:lnRef idx="2">
+              <a:schemeClr val="accent1">
+                <a:shade val="50000"/>
+              </a:schemeClr>
+            </a:lnRef>
+            <a:fillRef idx="1">
+              <a:schemeClr val="accent1"/>
+            </a:fillRef>
+            <a:effectRef idx="0">
+              <a:schemeClr val="accent1"/>
+            </a:effectRef>
+            <a:fontRef idx="minor">
+              <a:schemeClr val="lt1"/>
+            </a:fontRef>
+          </p:style>
+          <p:txBody>
+            <a:bodyPr anchor="ctr"/>
+            <a:lstStyle/>
+            <a:p>
+              <a:pPr algn="ctr">
+                <a:defRPr/>
+              </a:pPr>
+              <a:endParaRPr lang="vi-VN">
+                <a:solidFill>
+                  <a:prstClr val="white"/>
+                </a:solidFill>
+              </a:endParaRPr>
+            </a:p>
+          </p:txBody>
+        </p:sp>
+        <p:cxnSp>
+          <p:nvCxnSpPr>
+            <p:cNvPr id="18" name="Straight Arrow Connector 17"/>
+            <p:cNvCxnSpPr>
+              <a:stCxn id="17" idx="4"/>
+            </p:cNvCxnSpPr>
+            <p:nvPr/>
+          </p:nvCxnSpPr>
+          <p:spPr>
+            <a:xfrm rot="5400000">
+              <a:off x="4679679" y="1108062"/>
+              <a:ext cx="500067" cy="1588"/>
+            </a:xfrm>
+            <a:prstGeom prst="straightConnector1">
+              <a:avLst/>
+            </a:prstGeom>
+            <a:grpFill/>
+            <a:ln w="31750" cmpd="sng">
+              <a:solidFill>
+                <a:schemeClr val="accent2"/>
+              </a:solidFill>
+              <a:tailEnd type="none"/>
+            </a:ln>
+          </p:spPr>
+          <p:style>
+            <a:lnRef idx="1">
+              <a:schemeClr val="accent1"/>
+            </a:lnRef>
+            <a:fillRef idx="0">
+              <a:schemeClr val="accent1"/>
+            </a:fillRef>
+            <a:effectRef idx="0">
+              <a:schemeClr val="accent1"/>
+            </a:effectRef>
+            <a:fontRef idx="minor">
+              <a:schemeClr val="tx1"/>
+            </a:fontRef>
+          </p:style>
+        </p:cxnSp>
+        <p:cxnSp>
+          <p:nvCxnSpPr>
+            <p:cNvPr id="19" name="Straight Arrow Connector 18"/>
+            <p:cNvCxnSpPr/>
+            <p:nvPr/>
+          </p:nvCxnSpPr>
+          <p:spPr>
+            <a:xfrm rot="10800000" flipV="1">
+              <a:off x="4628879" y="1000111"/>
+              <a:ext cx="300037" cy="214314"/>
+            </a:xfrm>
+            <a:prstGeom prst="straightConnector1">
+              <a:avLst/>
+            </a:prstGeom>
+            <a:grpFill/>
+            <a:ln w="31750" cmpd="sng">
+              <a:solidFill>
+                <a:schemeClr val="accent2"/>
+              </a:solidFill>
+              <a:tailEnd type="none"/>
+            </a:ln>
+          </p:spPr>
+          <p:style>
+            <a:lnRef idx="1">
+              <a:schemeClr val="accent1"/>
+            </a:lnRef>
+            <a:fillRef idx="0">
+              <a:schemeClr val="accent1"/>
+            </a:fillRef>
+            <a:effectRef idx="0">
+              <a:schemeClr val="accent1"/>
+            </a:effectRef>
+            <a:fontRef idx="minor">
+              <a:schemeClr val="tx1"/>
+            </a:fontRef>
+          </p:style>
+        </p:cxnSp>
+        <p:cxnSp>
+          <p:nvCxnSpPr>
+            <p:cNvPr id="20" name="Straight Arrow Connector 19"/>
+            <p:cNvCxnSpPr/>
+            <p:nvPr/>
+          </p:nvCxnSpPr>
+          <p:spPr>
+            <a:xfrm rot="16200000" flipH="1">
+              <a:off x="4934471" y="1351746"/>
+              <a:ext cx="214315" cy="225426"/>
+            </a:xfrm>
+            <a:prstGeom prst="straightConnector1">
+              <a:avLst/>
+            </a:prstGeom>
+            <a:grpFill/>
+            <a:ln w="31750" cmpd="sng">
+              <a:solidFill>
+                <a:schemeClr val="accent2"/>
+              </a:solidFill>
+              <a:tailEnd type="none"/>
+            </a:ln>
+          </p:spPr>
+          <p:style>
+            <a:lnRef idx="1">
+              <a:schemeClr val="accent1"/>
+            </a:lnRef>
+            <a:fillRef idx="0">
+              <a:schemeClr val="accent1"/>
+            </a:fillRef>
+            <a:effectRef idx="0">
+              <a:schemeClr val="accent1"/>
+            </a:effectRef>
+            <a:fontRef idx="minor">
+              <a:schemeClr val="tx1"/>
+            </a:fontRef>
+          </p:style>
+        </p:cxnSp>
+        <p:cxnSp>
+          <p:nvCxnSpPr>
+            <p:cNvPr id="21" name="Straight Arrow Connector 20"/>
+            <p:cNvCxnSpPr/>
+            <p:nvPr/>
+          </p:nvCxnSpPr>
+          <p:spPr>
+            <a:xfrm rot="5400000">
+              <a:off x="4747145" y="1389846"/>
+              <a:ext cx="214315" cy="149225"/>
+            </a:xfrm>
+            <a:prstGeom prst="straightConnector1">
+              <a:avLst/>
+            </a:prstGeom>
+            <a:grpFill/>
+            <a:ln w="31750" cmpd="sng">
+              <a:solidFill>
+                <a:schemeClr val="accent2"/>
+              </a:solidFill>
+              <a:tailEnd type="none"/>
+            </a:ln>
+          </p:spPr>
+          <p:style>
+            <a:lnRef idx="1">
+              <a:schemeClr val="accent1"/>
+            </a:lnRef>
+            <a:fillRef idx="0">
+              <a:schemeClr val="accent1"/>
+            </a:fillRef>
+            <a:effectRef idx="0">
+              <a:schemeClr val="accent1"/>
+            </a:effectRef>
+            <a:fontRef idx="minor">
+              <a:schemeClr val="tx1"/>
+            </a:fontRef>
+          </p:style>
+        </p:cxnSp>
+        <p:cxnSp>
+          <p:nvCxnSpPr>
+            <p:cNvPr id="22" name="Straight Arrow Connector 21"/>
+            <p:cNvCxnSpPr/>
+            <p:nvPr/>
+          </p:nvCxnSpPr>
+          <p:spPr>
+            <a:xfrm flipV="1">
+              <a:off x="4928917" y="1071547"/>
+              <a:ext cx="376238" cy="71439"/>
+            </a:xfrm>
+            <a:prstGeom prst="straightConnector1">
+              <a:avLst/>
+            </a:prstGeom>
+            <a:grpFill/>
+            <a:ln w="31750" cmpd="sng">
+              <a:solidFill>
+                <a:schemeClr val="accent2"/>
+              </a:solidFill>
+              <a:tailEnd type="none"/>
+            </a:ln>
+          </p:spPr>
+          <p:style>
+            <a:lnRef idx="1">
+              <a:schemeClr val="accent1"/>
+            </a:lnRef>
+            <a:fillRef idx="0">
+              <a:schemeClr val="accent1"/>
+            </a:fillRef>
+            <a:effectRef idx="0">
+              <a:schemeClr val="accent1"/>
+            </a:effectRef>
+            <a:fontRef idx="minor">
+              <a:schemeClr val="tx1"/>
+            </a:fontRef>
+          </p:style>
+        </p:cxnSp>
+        <p:sp>
+          <p:nvSpPr>
+            <p:cNvPr id="23" name="Oval 22"/>
+            <p:cNvSpPr/>
+            <p:nvPr/>
+          </p:nvSpPr>
+          <p:spPr>
+            <a:xfrm>
+              <a:off x="4779699" y="714355"/>
+              <a:ext cx="74614" cy="71437"/>
+            </a:xfrm>
+            <a:prstGeom prst="ellipse">
+              <a:avLst/>
+            </a:prstGeom>
+            <a:grpFill/>
+            <a:ln w="31750" cmpd="sng">
+              <a:solidFill>
+                <a:schemeClr val="bg1"/>
+              </a:solidFill>
+            </a:ln>
+          </p:spPr>
+          <p:style>
+            <a:lnRef idx="2">
+              <a:schemeClr val="accent1">
+                <a:shade val="50000"/>
+              </a:schemeClr>
+            </a:lnRef>
+            <a:fillRef idx="1">
+              <a:schemeClr val="accent1"/>
+            </a:fillRef>
+            <a:effectRef idx="0">
+              <a:schemeClr val="accent1"/>
+            </a:effectRef>
+            <a:fontRef idx="minor">
+              <a:schemeClr val="lt1"/>
+            </a:fontRef>
+          </p:style>
+          <p:txBody>
+            <a:bodyPr anchor="ctr"/>
+            <a:lstStyle/>
+            <a:p>
+              <a:pPr algn="ctr">
+                <a:defRPr/>
+              </a:pPr>
+              <a:endParaRPr lang="vi-VN">
+                <a:solidFill>
+                  <a:prstClr val="white"/>
+                </a:solidFill>
+              </a:endParaRPr>
+            </a:p>
+          </p:txBody>
+        </p:sp>
+        <p:sp>
+          <p:nvSpPr>
+            <p:cNvPr id="24" name="Oval 23"/>
+            <p:cNvSpPr/>
+            <p:nvPr/>
+          </p:nvSpPr>
+          <p:spPr>
+            <a:xfrm>
+              <a:off x="5005149" y="714358"/>
+              <a:ext cx="74614" cy="71437"/>
+            </a:xfrm>
+            <a:prstGeom prst="ellipse">
+              <a:avLst/>
+            </a:prstGeom>
+            <a:grpFill/>
+            <a:ln w="31750" cmpd="sng">
+              <a:solidFill>
+                <a:schemeClr val="bg1"/>
+              </a:solidFill>
+            </a:ln>
+          </p:spPr>
+          <p:style>
+            <a:lnRef idx="2">
+              <a:schemeClr val="accent1">
+                <a:shade val="50000"/>
+              </a:schemeClr>
+            </a:lnRef>
+            <a:fillRef idx="1">
+              <a:schemeClr val="accent1"/>
+            </a:fillRef>
+            <a:effectRef idx="0">
+              <a:schemeClr val="accent1"/>
+            </a:effectRef>
+            <a:fontRef idx="minor">
+              <a:schemeClr val="lt1"/>
+            </a:fontRef>
+          </p:style>
+          <p:txBody>
+            <a:bodyPr anchor="ctr"/>
+            <a:lstStyle/>
+            <a:p>
+              <a:pPr algn="ctr">
+                <a:defRPr/>
+              </a:pPr>
+              <a:endParaRPr lang="vi-VN">
+                <a:solidFill>
+                  <a:prstClr val="white"/>
+                </a:solidFill>
+              </a:endParaRPr>
+            </a:p>
+          </p:txBody>
+        </p:sp>
+      </p:grpSp>
+      <p:sp>
+        <p:nvSpPr>
+          <p:cNvPr id="16" name="TextBox 15">
+            <a:hlinkClick r:id="" action="ppaction://noaction"/>
+          </p:cNvPr>
+          <p:cNvSpPr txBox="1"/>
+          <p:nvPr/>
+        </p:nvSpPr>
+        <p:spPr>
+          <a:xfrm>
+            <a:off x="5781745" y="1703035"/>
+            <a:ext cx="2765467" cy="338554"/>
+          </a:xfrm>
+          <a:prstGeom prst="rect">
+            <a:avLst/>
+          </a:prstGeom>
+          <a:solidFill>
+            <a:schemeClr val="bg1"/>
+          </a:solidFill>
+          <a:ln>
+            <a:solidFill>
+              <a:schemeClr val="accent2">
+                <a:lumMod val="50000"/>
+              </a:schemeClr>
+            </a:solidFill>
+          </a:ln>
+        </p:spPr>
+        <p:txBody>
+          <a:bodyPr wrap="square" rtlCol="0">
+            <a:spAutoFit/>
+          </a:bodyPr>
+          <a:lstStyle/>
+          <a:p>
+            <a:r>
+              <a:rPr lang="en-US" sz="1600" dirty="0" err="1">
+                <a:solidFill>
+                  <a:schemeClr val="accent2">
+                    <a:lumMod val="50000"/>
+                  </a:schemeClr>
+                </a:solidFill>
+                <a:latin typeface="Arial" panose="020B0604020202020204" pitchFamily="34" charset="0"/>
+                <a:cs typeface="Arial" panose="020B0604020202020204" pitchFamily="34" charset="0"/>
+              </a:rPr>
+              <a:t>Màn</a:t>
+            </a:r>
+            <a:r>
+              <a:rPr lang="en-US" sz="1600" dirty="0">
+                <a:solidFill>
+                  <a:schemeClr val="accent2">
+                    <a:lumMod val="50000"/>
+                  </a:schemeClr>
+                </a:solidFill>
+                <a:latin typeface="Arial" panose="020B0604020202020204" pitchFamily="34" charset="0"/>
+                <a:cs typeface="Arial" panose="020B0604020202020204" pitchFamily="34" charset="0"/>
+              </a:rPr>
+              <a:t> </a:t>
+            </a:r>
+            <a:r>
+              <a:rPr lang="en-US" sz="1600" dirty="0" err="1">
+                <a:solidFill>
+                  <a:schemeClr val="accent2">
+                    <a:lumMod val="50000"/>
+                  </a:schemeClr>
+                </a:solidFill>
+                <a:latin typeface="Arial" panose="020B0604020202020204" pitchFamily="34" charset="0"/>
+                <a:cs typeface="Arial" panose="020B0604020202020204" pitchFamily="34" charset="0"/>
+              </a:rPr>
+              <a:t>hình</a:t>
+            </a:r>
+            <a:r>
+              <a:rPr lang="en-US" sz="1600" dirty="0">
+                <a:solidFill>
+                  <a:schemeClr val="accent2">
+                    <a:lumMod val="50000"/>
+                  </a:schemeClr>
+                </a:solidFill>
+                <a:latin typeface="Arial" panose="020B0604020202020204" pitchFamily="34" charset="0"/>
+                <a:cs typeface="Arial" panose="020B0604020202020204" pitchFamily="34" charset="0"/>
+              </a:rPr>
+              <a:t> </a:t>
+            </a:r>
+            <a:r>
+              <a:rPr lang="en-US" sz="1600" dirty="0" err="1">
+                <a:solidFill>
+                  <a:schemeClr val="accent2">
+                    <a:lumMod val="50000"/>
+                  </a:schemeClr>
+                </a:solidFill>
+                <a:latin typeface="Arial" panose="020B0604020202020204" pitchFamily="34" charset="0"/>
+                <a:cs typeface="Arial" panose="020B0604020202020204" pitchFamily="34" charset="0"/>
+              </a:rPr>
+              <a:t>Giao</a:t>
+            </a:r>
+            <a:r>
+              <a:rPr lang="en-US" sz="1600" dirty="0">
+                <a:solidFill>
+                  <a:schemeClr val="accent2">
+                    <a:lumMod val="50000"/>
+                  </a:schemeClr>
+                </a:solidFill>
+                <a:latin typeface="Arial" panose="020B0604020202020204" pitchFamily="34" charset="0"/>
+                <a:cs typeface="Arial" panose="020B0604020202020204" pitchFamily="34" charset="0"/>
+              </a:rPr>
+              <a:t> </a:t>
+            </a:r>
+            <a:r>
+              <a:rPr lang="en-US" sz="1600" dirty="0" err="1">
+                <a:solidFill>
+                  <a:schemeClr val="accent2">
+                    <a:lumMod val="50000"/>
+                  </a:schemeClr>
+                </a:solidFill>
+                <a:latin typeface="Arial" panose="020B0604020202020204" pitchFamily="34" charset="0"/>
+                <a:cs typeface="Arial" panose="020B0604020202020204" pitchFamily="34" charset="0"/>
+              </a:rPr>
+              <a:t>diện</a:t>
+            </a:r>
+            <a:r>
+              <a:rPr lang="en-US" sz="1600" dirty="0">
+                <a:solidFill>
+                  <a:schemeClr val="accent2">
+                    <a:lumMod val="50000"/>
+                  </a:schemeClr>
+                </a:solidFill>
+                <a:latin typeface="Arial" panose="020B0604020202020204" pitchFamily="34" charset="0"/>
+                <a:cs typeface="Arial" panose="020B0604020202020204" pitchFamily="34" charset="0"/>
+              </a:rPr>
+              <a:t> </a:t>
+            </a:r>
+            <a:r>
+              <a:rPr lang="en-US" sz="1600" b="1" dirty="0">
+                <a:solidFill>
+                  <a:schemeClr val="accent2">
+                    <a:lumMod val="50000"/>
+                  </a:schemeClr>
+                </a:solidFill>
+                <a:latin typeface="Arial" panose="020B0604020202020204" pitchFamily="34" charset="0"/>
+                <a:cs typeface="Arial" panose="020B0604020202020204" pitchFamily="34" charset="0"/>
+              </a:rPr>
+              <a:t>(1 )</a:t>
+            </a:r>
+            <a:endParaRPr lang="en-US" sz="1600" b="1" i="1" u="sng" dirty="0">
+              <a:solidFill>
+                <a:schemeClr val="accent2">
+                  <a:lumMod val="50000"/>
+                </a:schemeClr>
+              </a:solidFill>
+            </a:endParaRPr>
+          </a:p>
+        </p:txBody>
+      </p:sp>
+      <p:sp>
+        <p:nvSpPr>
+          <p:cNvPr id="31" name="TextBox 30">
+            <a:hlinkClick r:id="" action="ppaction://noaction"/>
+          </p:cNvPr>
+          <p:cNvSpPr txBox="1"/>
+          <p:nvPr/>
+        </p:nvSpPr>
+        <p:spPr>
+          <a:xfrm>
+            <a:off x="5611780" y="4481689"/>
+            <a:ext cx="2765467" cy="338553"/>
+          </a:xfrm>
+          <a:prstGeom prst="rect">
+            <a:avLst/>
+          </a:prstGeom>
+          <a:solidFill>
+            <a:schemeClr val="bg1"/>
+          </a:solidFill>
+          <a:ln>
+            <a:solidFill>
+              <a:schemeClr val="accent2">
+                <a:lumMod val="50000"/>
+              </a:schemeClr>
+            </a:solidFill>
+          </a:ln>
+        </p:spPr>
+        <p:txBody>
+          <a:bodyPr wrap="square" rtlCol="0">
+            <a:spAutoFit/>
+          </a:bodyPr>
+          <a:lstStyle/>
+          <a:p>
+            <a:r>
+              <a:rPr lang="en-US" sz="1600" dirty="0" err="1">
+                <a:solidFill>
+                  <a:schemeClr val="accent2">
+                    <a:lumMod val="50000"/>
+                  </a:schemeClr>
+                </a:solidFill>
+                <a:latin typeface="Arial" panose="020B0604020202020204" pitchFamily="34" charset="0"/>
+                <a:cs typeface="Arial" panose="020B0604020202020204" pitchFamily="34" charset="0"/>
+              </a:rPr>
+              <a:t>Dịch</a:t>
+            </a:r>
+            <a:r>
+              <a:rPr lang="en-US" sz="1600" dirty="0">
+                <a:solidFill>
+                  <a:schemeClr val="accent2">
+                    <a:lumMod val="50000"/>
+                  </a:schemeClr>
+                </a:solidFill>
+                <a:latin typeface="Arial" panose="020B0604020202020204" pitchFamily="34" charset="0"/>
+                <a:cs typeface="Arial" panose="020B0604020202020204" pitchFamily="34" charset="0"/>
+              </a:rPr>
+              <a:t> </a:t>
+            </a:r>
+            <a:r>
+              <a:rPr lang="en-US" sz="1600" dirty="0" err="1">
+                <a:solidFill>
+                  <a:schemeClr val="accent2">
+                    <a:lumMod val="50000"/>
+                  </a:schemeClr>
+                </a:solidFill>
+                <a:latin typeface="Arial" panose="020B0604020202020204" pitchFamily="34" charset="0"/>
+                <a:cs typeface="Arial" panose="020B0604020202020204" pitchFamily="34" charset="0"/>
+              </a:rPr>
+              <a:t>vụ</a:t>
+            </a:r>
+            <a:r>
+              <a:rPr lang="en-US" sz="1600" dirty="0">
+                <a:solidFill>
+                  <a:schemeClr val="accent2">
+                    <a:lumMod val="50000"/>
+                  </a:schemeClr>
+                </a:solidFill>
+                <a:latin typeface="Arial" panose="020B0604020202020204" pitchFamily="34" charset="0"/>
+                <a:cs typeface="Arial" panose="020B0604020202020204" pitchFamily="34" charset="0"/>
+              </a:rPr>
+              <a:t> </a:t>
+            </a:r>
+            <a:r>
+              <a:rPr lang="en-US" sz="1600" dirty="0" err="1">
+                <a:solidFill>
+                  <a:schemeClr val="accent2">
+                    <a:lumMod val="50000"/>
+                  </a:schemeClr>
+                </a:solidFill>
+                <a:latin typeface="Arial" panose="020B0604020202020204" pitchFamily="34" charset="0"/>
+                <a:cs typeface="Arial" panose="020B0604020202020204" pitchFamily="34" charset="0"/>
+              </a:rPr>
+              <a:t>Giao</a:t>
+            </a:r>
+            <a:r>
+              <a:rPr lang="en-US" sz="1600" dirty="0">
+                <a:solidFill>
+                  <a:schemeClr val="accent2">
+                    <a:lumMod val="50000"/>
+                  </a:schemeClr>
+                </a:solidFill>
+                <a:latin typeface="Arial" panose="020B0604020202020204" pitchFamily="34" charset="0"/>
+                <a:cs typeface="Arial" panose="020B0604020202020204" pitchFamily="34" charset="0"/>
+              </a:rPr>
+              <a:t> </a:t>
+            </a:r>
+            <a:r>
+              <a:rPr lang="en-US" sz="1600" dirty="0" err="1">
+                <a:solidFill>
+                  <a:schemeClr val="accent2">
+                    <a:lumMod val="50000"/>
+                  </a:schemeClr>
+                </a:solidFill>
+                <a:latin typeface="Arial" panose="020B0604020202020204" pitchFamily="34" charset="0"/>
+                <a:cs typeface="Arial" panose="020B0604020202020204" pitchFamily="34" charset="0"/>
+              </a:rPr>
+              <a:t>tiếp</a:t>
+            </a:r>
+            <a:r>
+              <a:rPr lang="en-US" sz="1600" dirty="0">
+                <a:solidFill>
+                  <a:schemeClr val="accent2">
+                    <a:lumMod val="50000"/>
+                  </a:schemeClr>
+                </a:solidFill>
+                <a:latin typeface="Arial" panose="020B0604020202020204" pitchFamily="34" charset="0"/>
+                <a:cs typeface="Arial" panose="020B0604020202020204" pitchFamily="34" charset="0"/>
+              </a:rPr>
+              <a:t> </a:t>
+            </a:r>
+            <a:r>
+              <a:rPr lang="en-US" sz="1600" b="1" dirty="0">
+                <a:solidFill>
+                  <a:schemeClr val="accent2">
+                    <a:lumMod val="50000"/>
+                  </a:schemeClr>
+                </a:solidFill>
+                <a:latin typeface="Arial" panose="020B0604020202020204" pitchFamily="34" charset="0"/>
+                <a:cs typeface="Arial" panose="020B0604020202020204" pitchFamily="34" charset="0"/>
+              </a:rPr>
+              <a:t>(1 )</a:t>
+            </a:r>
+            <a:endParaRPr lang="en-US" sz="1600" b="1" i="1" u="sng" dirty="0">
+              <a:solidFill>
+                <a:schemeClr val="accent2">
+                  <a:lumMod val="50000"/>
+                </a:schemeClr>
+              </a:solidFill>
+            </a:endParaRPr>
+          </a:p>
+        </p:txBody>
+      </p:sp>
+      <p:cxnSp>
+        <p:nvCxnSpPr>
+          <p:cNvPr id="3" name="Straight Arrow Connector 2"/>
+          <p:cNvCxnSpPr/>
+          <p:nvPr/>
+        </p:nvCxnSpPr>
+        <p:spPr>
+          <a:xfrm flipV="1">
+            <a:off x="6448132" y="3312120"/>
+            <a:ext cx="0" cy="1117053"/>
+          </a:xfrm>
+          <a:prstGeom prst="straightConnector1">
+            <a:avLst/>
+          </a:prstGeom>
+          <a:ln w="50800">
+            <a:solidFill>
+              <a:schemeClr val="tx1"/>
+            </a:solidFill>
+            <a:tailEnd type="triangle"/>
+          </a:ln>
+        </p:spPr>
+        <p:style>
+          <a:lnRef idx="1">
+            <a:schemeClr val="accent1"/>
+          </a:lnRef>
+          <a:fillRef idx="0">
+            <a:schemeClr val="accent1"/>
+          </a:fillRef>
+          <a:effectRef idx="0">
+            <a:schemeClr val="accent1"/>
+          </a:effectRef>
+          <a:fontRef idx="minor">
+            <a:schemeClr val="tx1"/>
+          </a:fontRef>
+        </p:style>
+      </p:cxnSp>
+      <p:sp>
+        <p:nvSpPr>
+          <p:cNvPr id="32" name="TextBox 31">
+            <a:hlinkClick r:id="" action="ppaction://noaction"/>
+          </p:cNvPr>
+          <p:cNvSpPr txBox="1"/>
+          <p:nvPr/>
+        </p:nvSpPr>
+        <p:spPr>
+          <a:xfrm>
+            <a:off x="5161897" y="3737888"/>
+            <a:ext cx="1063470" cy="307777"/>
+          </a:xfrm>
+          <a:prstGeom prst="rect">
+            <a:avLst/>
+          </a:prstGeom>
+          <a:solidFill>
+            <a:schemeClr val="bg1"/>
+          </a:solidFill>
+          <a:ln w="41275">
+            <a:solidFill>
+              <a:schemeClr val="tx1"/>
+            </a:solidFill>
+            <a:prstDash val="sysDash"/>
+          </a:ln>
+        </p:spPr>
+        <p:txBody>
+          <a:bodyPr wrap="square" rtlCol="0">
+            <a:spAutoFit/>
+          </a:bodyPr>
+          <a:lstStyle/>
+          <a:p>
+            <a:pPr algn="ctr"/>
+            <a:r>
+              <a:rPr lang="en-US" sz="1400">
+                <a:latin typeface="Arial" panose="020B0604020202020204" pitchFamily="34" charset="0"/>
+                <a:cs typeface="Arial" panose="020B0604020202020204" pitchFamily="34" charset="0"/>
+              </a:rPr>
+              <a:t>Du_lieu</a:t>
+            </a:r>
+            <a:endParaRPr lang="en-US" sz="1400">
+              <a:latin typeface="Arial" panose="020B0604020202020204" pitchFamily="34" charset="0"/>
+              <a:cs typeface="Arial" panose="020B0604020202020204" pitchFamily="34" charset="0"/>
+            </a:endParaRPr>
+          </a:p>
+        </p:txBody>
+      </p:sp>
+      <p:sp>
+        <p:nvSpPr>
+          <p:cNvPr id="33" name="TextBox 32">
+            <a:hlinkClick r:id="" action="ppaction://noaction"/>
+          </p:cNvPr>
+          <p:cNvSpPr txBox="1"/>
+          <p:nvPr/>
+        </p:nvSpPr>
+        <p:spPr>
+          <a:xfrm>
+            <a:off x="7314770" y="873216"/>
+            <a:ext cx="4438510" cy="645160"/>
+          </a:xfrm>
+          <a:prstGeom prst="rect">
+            <a:avLst/>
+          </a:prstGeom>
+          <a:solidFill>
+            <a:schemeClr val="bg1"/>
+          </a:solidFill>
+          <a:ln>
+            <a:solidFill>
+              <a:schemeClr val="accent1"/>
+            </a:solidFill>
+          </a:ln>
+        </p:spPr>
+        <p:txBody>
+          <a:bodyPr wrap="square" rtlCol="0">
+            <a:spAutoFit/>
+          </a:bodyPr>
+          <a:lstStyle/>
+          <a:p>
+            <a:pPr>
+              <a:defRPr/>
+            </a:pPr>
+            <a:r>
+              <a:rPr lang="en-US" sz="1200" dirty="0">
+                <a:solidFill>
+                  <a:srgbClr val="FF0000"/>
+                </a:solidFill>
+                <a:latin typeface="Arial" panose="020B0604020202020204" pitchFamily="34" charset="0"/>
+                <a:cs typeface="Arial" panose="020B0604020202020204" pitchFamily="34" charset="0"/>
+                <a:sym typeface="+mn-ea"/>
+              </a:rPr>
+              <a:t>Xem </a:t>
+            </a:r>
+            <a:r>
+              <a:rPr lang="en-US" sz="1200" dirty="0">
+                <a:solidFill>
+                  <a:srgbClr val="002060"/>
+                </a:solidFill>
+                <a:latin typeface="Arial" panose="020B0604020202020204" pitchFamily="34" charset="0"/>
+                <a:cs typeface="Arial" panose="020B0604020202020204" pitchFamily="34" charset="0"/>
+                <a:sym typeface="+mn-ea"/>
+              </a:rPr>
+              <a:t>  </a:t>
+            </a:r>
+            <a:r>
+              <a:rPr lang="en-US" sz="1200" b="1" dirty="0">
+                <a:solidFill>
+                  <a:srgbClr val="002060"/>
+                </a:solidFill>
+                <a:latin typeface="Arial" panose="020B0604020202020204" pitchFamily="34" charset="0"/>
+                <a:cs typeface="Arial" panose="020B0604020202020204" pitchFamily="34" charset="0"/>
+                <a:sym typeface="+mn-ea"/>
+              </a:rPr>
+              <a:t>Thông tin nhân viên</a:t>
+            </a:r>
+            <a:r>
+              <a:rPr lang="en-US" sz="1200" dirty="0">
+                <a:solidFill>
+                  <a:srgbClr val="002060"/>
+                </a:solidFill>
+                <a:latin typeface="Arial" panose="020B0604020202020204" pitchFamily="34" charset="0"/>
+                <a:cs typeface="Arial" panose="020B0604020202020204" pitchFamily="34" charset="0"/>
+                <a:sym typeface="+mn-ea"/>
+              </a:rPr>
+              <a:t> (Tên,  Mã số, Tên đăng nhập, Mật khẩu)</a:t>
+            </a:r>
+            <a:r>
+              <a:rPr lang="en-US" sz="1200" dirty="0" smtClean="0">
+                <a:solidFill>
+                  <a:srgbClr val="002060"/>
+                </a:solidFill>
+                <a:latin typeface="Arial" panose="020B0604020202020204" pitchFamily="34" charset="0"/>
+                <a:cs typeface="Arial" panose="020B0604020202020204" pitchFamily="34" charset="0"/>
+                <a:sym typeface="+mn-ea"/>
+              </a:rPr>
+              <a:t>, </a:t>
+            </a:r>
+            <a:r>
+              <a:rPr lang="en-US" sz="1200" b="1" dirty="0">
+                <a:solidFill>
+                  <a:srgbClr val="002060"/>
+                </a:solidFill>
+                <a:latin typeface="Arial" panose="020B0604020202020204" pitchFamily="34" charset="0"/>
+                <a:cs typeface="Arial" panose="020B0604020202020204" pitchFamily="34" charset="0"/>
+                <a:sym typeface="+mn-ea"/>
+              </a:rPr>
+              <a:t> </a:t>
+            </a:r>
+            <a:r>
+              <a:rPr lang="en-US" sz="1200" dirty="0">
+                <a:solidFill>
+                  <a:srgbClr val="FF0000"/>
+                </a:solidFill>
+                <a:latin typeface="Arial" panose="020B0604020202020204" pitchFamily="34" charset="0"/>
+                <a:cs typeface="Arial" panose="020B0604020202020204" pitchFamily="34" charset="0"/>
+                <a:sym typeface="+mn-ea"/>
+              </a:rPr>
+              <a:t>Cập nhật</a:t>
+            </a:r>
+            <a:r>
+              <a:rPr lang="en-US" sz="1200" dirty="0">
+                <a:solidFill>
+                  <a:srgbClr val="002060"/>
+                </a:solidFill>
+                <a:latin typeface="Arial" panose="020B0604020202020204" pitchFamily="34" charset="0"/>
+                <a:cs typeface="Arial" panose="020B0604020202020204" pitchFamily="34" charset="0"/>
+                <a:sym typeface="+mn-ea"/>
+              </a:rPr>
+              <a:t>  </a:t>
+            </a:r>
+            <a:r>
+              <a:rPr lang="en-US" sz="1200" b="1" dirty="0">
+                <a:solidFill>
+                  <a:srgbClr val="002060"/>
+                </a:solidFill>
+                <a:latin typeface="Arial" panose="020B0604020202020204" pitchFamily="34" charset="0"/>
+                <a:cs typeface="Arial" panose="020B0604020202020204" pitchFamily="34" charset="0"/>
+                <a:sym typeface="+mn-ea"/>
+              </a:rPr>
+              <a:t>Thông tin nhân viên.  </a:t>
+            </a:r>
+            <a:r>
+              <a:rPr lang="en-US" sz="1200" dirty="0">
+                <a:solidFill>
+                  <a:srgbClr val="FF0000"/>
+                </a:solidFill>
+                <a:latin typeface="Arial" panose="020B0604020202020204" pitchFamily="34" charset="0"/>
+                <a:cs typeface="Arial" panose="020B0604020202020204" pitchFamily="34" charset="0"/>
+                <a:sym typeface="+mn-ea"/>
+              </a:rPr>
+              <a:t>Thêm, Xóa </a:t>
+            </a:r>
+            <a:r>
+              <a:rPr lang="en-US" sz="1200" b="1" dirty="0">
+                <a:solidFill>
+                  <a:srgbClr val="002060"/>
+                </a:solidFill>
+                <a:latin typeface="Arial" panose="020B0604020202020204" pitchFamily="34" charset="0"/>
+                <a:cs typeface="Arial" panose="020B0604020202020204" pitchFamily="34" charset="0"/>
+                <a:sym typeface="+mn-ea"/>
+              </a:rPr>
+              <a:t>nhân viên</a:t>
+            </a:r>
+            <a:endParaRPr lang="en-US" sz="1200" b="1" dirty="0">
+              <a:solidFill>
+                <a:srgbClr val="ED7D31">
+                  <a:lumMod val="50000"/>
+                </a:srgbClr>
+              </a:solidFill>
+              <a:latin typeface="Arial" panose="020B0604020202020204" pitchFamily="34" charset="0"/>
+              <a:cs typeface="Arial" panose="020B0604020202020204" pitchFamily="34" charset="0"/>
+            </a:endParaRPr>
+          </a:p>
+        </p:txBody>
+      </p:sp>
+      <p:sp>
+        <p:nvSpPr>
+          <p:cNvPr id="2" name="TextBox 11">
+            <a:hlinkClick r:id="" action="ppaction://noaction"/>
+          </p:cNvPr>
+          <p:cNvSpPr txBox="1"/>
+          <p:nvPr/>
+        </p:nvSpPr>
+        <p:spPr>
+          <a:xfrm>
+            <a:off x="5290726" y="2272773"/>
+            <a:ext cx="2355453" cy="953135"/>
+          </a:xfrm>
+          <a:prstGeom prst="rect">
+            <a:avLst/>
+          </a:prstGeom>
+          <a:solidFill>
+            <a:schemeClr val="bg1"/>
+          </a:solidFill>
+          <a:ln w="41275">
+            <a:solidFill>
+              <a:srgbClr val="002060"/>
+            </a:solidFill>
+            <a:prstDash val="sysDash"/>
+          </a:ln>
+        </p:spPr>
+        <p:txBody>
+          <a:bodyPr wrap="square" rtlCol="0">
+            <a:spAutoFit/>
+          </a:bodyPr>
+          <a:lstStyle/>
+          <a:p>
+            <a:r>
+              <a:rPr lang="en-US" sz="1400" b="1" dirty="0" err="1">
+                <a:solidFill>
+                  <a:srgbClr val="002060"/>
+                </a:solidFill>
+                <a:latin typeface="Arial" panose="020B0604020202020204" pitchFamily="34" charset="0"/>
+                <a:cs typeface="Arial" panose="020B0604020202020204" pitchFamily="34" charset="0"/>
+              </a:rPr>
+              <a:t>Du_lieu</a:t>
+            </a:r>
+            <a:br>
+              <a:rPr lang="en-US" sz="1400" dirty="0">
+                <a:solidFill>
+                  <a:srgbClr val="002060"/>
+                </a:solidFill>
+                <a:latin typeface="Arial" panose="020B0604020202020204" pitchFamily="34" charset="0"/>
+                <a:cs typeface="Arial" panose="020B0604020202020204" pitchFamily="34" charset="0"/>
+              </a:rPr>
+            </a:br>
+            <a:r>
+              <a:rPr lang="en-US" sz="1400" dirty="0">
+                <a:solidFill>
+                  <a:srgbClr val="002060"/>
+                </a:solidFill>
+                <a:latin typeface="Arial" panose="020B0604020202020204" pitchFamily="34" charset="0"/>
+                <a:cs typeface="Arial" panose="020B0604020202020204" pitchFamily="34" charset="0"/>
+              </a:rPr>
+              <a:t> </a:t>
+            </a:r>
+            <a:r>
+              <a:rPr lang="en-US" sz="1400" dirty="0" err="1">
+                <a:solidFill>
+                  <a:srgbClr val="002060"/>
+                </a:solidFill>
+                <a:latin typeface="Arial" panose="020B0604020202020204" pitchFamily="34" charset="0"/>
+                <a:cs typeface="Arial" panose="020B0604020202020204" pitchFamily="34" charset="0"/>
+              </a:rPr>
+              <a:t>Cong_ty</a:t>
+            </a:r>
+            <a:endParaRPr lang="en-US" sz="1400" dirty="0">
+              <a:solidFill>
+                <a:srgbClr val="002060"/>
+              </a:solidFill>
+              <a:latin typeface="Arial" panose="020B0604020202020204" pitchFamily="34" charset="0"/>
+              <a:cs typeface="Arial" panose="020B0604020202020204" pitchFamily="34" charset="0"/>
+            </a:endParaRPr>
+          </a:p>
+          <a:p>
+            <a:r>
+              <a:rPr lang="en-US" sz="1400" dirty="0">
+                <a:solidFill>
+                  <a:srgbClr val="002060"/>
+                </a:solidFill>
+                <a:latin typeface="Arial" panose="020B0604020202020204" pitchFamily="34" charset="0"/>
+                <a:cs typeface="Arial" panose="020B0604020202020204" pitchFamily="34" charset="0"/>
+              </a:rPr>
+              <a:t>Danh_sach_Nguoi_dung_noi_bo</a:t>
+            </a:r>
+            <a:endParaRPr lang="en-US" sz="1400" b="1" dirty="0">
+              <a:solidFill>
+                <a:srgbClr val="002060"/>
+              </a:solidFill>
+              <a:latin typeface="Arial" panose="020B0604020202020204" pitchFamily="34" charset="0"/>
+              <a:cs typeface="Arial" panose="020B0604020202020204" pitchFamily="34" charset="0"/>
+            </a:endParaRPr>
+          </a:p>
+        </p:txBody>
+      </p:sp>
+      <p:grpSp>
+        <p:nvGrpSpPr>
+          <p:cNvPr id="4" name="Group 3"/>
+          <p:cNvGrpSpPr/>
+          <p:nvPr/>
+        </p:nvGrpSpPr>
+        <p:grpSpPr>
+          <a:xfrm>
+            <a:off x="338408" y="1010735"/>
+            <a:ext cx="4107738" cy="643989"/>
+            <a:chOff x="903567" y="2937671"/>
+            <a:chExt cx="1767100" cy="643989"/>
+          </a:xfrm>
+        </p:grpSpPr>
+        <p:sp>
+          <p:nvSpPr>
+            <p:cNvPr id="5" name="TextBox 25"/>
+            <p:cNvSpPr txBox="1"/>
+            <p:nvPr/>
+          </p:nvSpPr>
+          <p:spPr>
+            <a:xfrm>
+              <a:off x="903567" y="2937671"/>
+              <a:ext cx="1767100" cy="337185"/>
+            </a:xfrm>
+            <a:prstGeom prst="rect">
+              <a:avLst/>
+            </a:prstGeom>
+            <a:noFill/>
+            <a:ln>
+              <a:solidFill>
+                <a:schemeClr val="tx1"/>
+              </a:solidFill>
+            </a:ln>
+          </p:spPr>
+          <p:txBody>
+            <a:bodyPr wrap="square" rtlCol="0">
+              <a:spAutoFit/>
+            </a:bodyPr>
+            <a:lstStyle/>
+            <a:p>
+              <a:pPr algn="ctr"/>
+              <a:r>
+                <a:rPr lang="en-US" sz="1600" b="1">
+                  <a:solidFill>
+                    <a:srgbClr val="002060"/>
+                  </a:solidFill>
+                  <a:latin typeface="Arial" panose="020B0604020202020204" pitchFamily="34" charset="0"/>
+                  <a:cs typeface="Arial" panose="020B0604020202020204" pitchFamily="34" charset="0"/>
+                </a:rPr>
+                <a:t>XL_CONG_TY</a:t>
+              </a:r>
+              <a:endParaRPr lang="en-US" sz="1600" b="1">
+                <a:latin typeface="Arial" panose="020B0604020202020204" pitchFamily="34" charset="0"/>
+                <a:cs typeface="Arial" panose="020B0604020202020204" pitchFamily="34" charset="0"/>
+              </a:endParaRPr>
+            </a:p>
+          </p:txBody>
+        </p:sp>
+        <p:sp>
+          <p:nvSpPr>
+            <p:cNvPr id="6" name="TextBox 26"/>
+            <p:cNvSpPr txBox="1"/>
+            <p:nvPr/>
+          </p:nvSpPr>
+          <p:spPr>
+            <a:xfrm>
+              <a:off x="903567" y="3274955"/>
+              <a:ext cx="1767100" cy="306705"/>
+            </a:xfrm>
+            <a:prstGeom prst="rect">
+              <a:avLst/>
+            </a:prstGeom>
+            <a:noFill/>
+            <a:ln>
+              <a:solidFill>
+                <a:schemeClr val="tx1"/>
+              </a:solidFill>
+            </a:ln>
+          </p:spPr>
+          <p:txBody>
+            <a:bodyPr wrap="square" rtlCol="0">
+              <a:spAutoFit/>
+            </a:bodyPr>
+            <a:lstStyle/>
+            <a:p>
+              <a:r>
+                <a:rPr lang="en-US" sz="1400" dirty="0" err="1">
+                  <a:latin typeface="Arial" panose="020B0604020202020204" pitchFamily="34" charset="0"/>
+                  <a:cs typeface="Arial" panose="020B0604020202020204" pitchFamily="34" charset="0"/>
+                </a:rPr>
+                <a:t>Ten,Ma_so,Dien_thoai,Dia_chi</a:t>
+              </a:r>
+              <a:endParaRPr lang="en-US" sz="1400" dirty="0">
+                <a:latin typeface="Arial" panose="020B0604020202020204" pitchFamily="34" charset="0"/>
+                <a:cs typeface="Arial" panose="020B0604020202020204" pitchFamily="34" charset="0"/>
+              </a:endParaRPr>
+            </a:p>
+          </p:txBody>
+        </p:sp>
+      </p:grpSp>
+      <p:grpSp>
+        <p:nvGrpSpPr>
+          <p:cNvPr id="7" name="Group 6"/>
+          <p:cNvGrpSpPr/>
+          <p:nvPr/>
+        </p:nvGrpSpPr>
+        <p:grpSpPr>
+          <a:xfrm>
+            <a:off x="-11662" y="2205997"/>
+            <a:ext cx="5173080" cy="645259"/>
+            <a:chOff x="903567" y="2937671"/>
+            <a:chExt cx="1767100" cy="645259"/>
+          </a:xfrm>
+        </p:grpSpPr>
+        <p:sp>
+          <p:nvSpPr>
+            <p:cNvPr id="8" name="TextBox 28"/>
+            <p:cNvSpPr txBox="1"/>
+            <p:nvPr/>
+          </p:nvSpPr>
+          <p:spPr>
+            <a:xfrm>
+              <a:off x="903567" y="2937671"/>
+              <a:ext cx="1767100" cy="337185"/>
+            </a:xfrm>
+            <a:prstGeom prst="rect">
+              <a:avLst/>
+            </a:prstGeom>
+            <a:noFill/>
+            <a:ln>
+              <a:solidFill>
+                <a:schemeClr val="tx1"/>
+              </a:solidFill>
+            </a:ln>
+          </p:spPr>
+          <p:txBody>
+            <a:bodyPr wrap="square" rtlCol="0">
+              <a:spAutoFit/>
+            </a:bodyPr>
+            <a:lstStyle/>
+            <a:p>
+              <a:pPr algn="ctr"/>
+              <a:r>
+                <a:rPr lang="en-US" sz="1600" b="1" dirty="0">
+                  <a:solidFill>
+                    <a:srgbClr val="002060"/>
+                  </a:solidFill>
+                  <a:latin typeface="Arial" panose="020B0604020202020204" pitchFamily="34" charset="0"/>
+                  <a:cs typeface="Arial" panose="020B0604020202020204" pitchFamily="34" charset="0"/>
+                </a:rPr>
+                <a:t>XL_Nguoi_dung_Noi_bo  </a:t>
+              </a:r>
+              <a:endParaRPr lang="en-US" sz="1600" b="1" dirty="0">
+                <a:latin typeface="Arial" panose="020B0604020202020204" pitchFamily="34" charset="0"/>
+                <a:cs typeface="Arial" panose="020B0604020202020204" pitchFamily="34" charset="0"/>
+              </a:endParaRPr>
+            </a:p>
+          </p:txBody>
+        </p:sp>
+        <p:sp>
+          <p:nvSpPr>
+            <p:cNvPr id="9" name="TextBox 29"/>
+            <p:cNvSpPr txBox="1"/>
+            <p:nvPr/>
+          </p:nvSpPr>
+          <p:spPr>
+            <a:xfrm>
+              <a:off x="903567" y="3276225"/>
+              <a:ext cx="1767100" cy="306705"/>
+            </a:xfrm>
+            <a:prstGeom prst="rect">
+              <a:avLst/>
+            </a:prstGeom>
+            <a:noFill/>
+            <a:ln>
+              <a:solidFill>
+                <a:schemeClr val="tx1"/>
+              </a:solidFill>
+            </a:ln>
+          </p:spPr>
+          <p:txBody>
+            <a:bodyPr wrap="square" rtlCol="0">
+              <a:spAutoFit/>
+            </a:bodyPr>
+            <a:lstStyle/>
+            <a:p>
+              <a:r>
+                <a:rPr lang="en-US" sz="1400" dirty="0">
+                  <a:latin typeface="Arial" panose="020B0604020202020204" pitchFamily="34" charset="0"/>
+                  <a:cs typeface="Arial" panose="020B0604020202020204" pitchFamily="34" charset="0"/>
+                </a:rPr>
+                <a:t>Ten,Ma_so,Ten_dang_nhap,Mat_khau</a:t>
+              </a:r>
+              <a:endParaRPr lang="en-US" sz="1400" dirty="0">
+                <a:latin typeface="Arial" panose="020B0604020202020204" pitchFamily="34" charset="0"/>
+                <a:cs typeface="Arial" panose="020B0604020202020204" pitchFamily="34" charset="0"/>
+                <a:sym typeface="+mn-ea"/>
+              </a:endParaRPr>
+            </a:p>
+          </p:txBody>
+        </p:sp>
+      </p:grpSp>
+    </p:spTree>
   </p:cSld>
   <p:clrMapOvr>
     <a:masterClrMapping/>
@@ -13870,8 +15697,6 @@
       </a:bgFillStyleLst>
     </a:fmtScheme>
   </a:themeElements>
-  <a:objectDefaults/>
-  <a:extraClrSchemeLst/>
   <a:extLst>
     <a:ext uri="{05A4C25C-085E-4340-85A3-A5531E510DB2}">
       <thm15:themeFamily xmlns:thm15="http://schemas.microsoft.com/office/thememl/2012/main" name="Office Theme" id="{62F939B6-93AF-4DB8-9C6B-D6C7DFDC589F}" vid="{4A3C46E8-61CC-4603-A589-7422A47A8E4A}"/>
@@ -14131,8 +15956,6 @@
       </a:bgFillStyleLst>
     </a:fmtScheme>
   </a:themeElements>
-  <a:objectDefaults/>
-  <a:extraClrSchemeLst/>
   <a:extLst>
     <a:ext uri="{05A4C25C-085E-4340-85A3-A5531E510DB2}">
       <thm15:themeFamily xmlns:thm15="http://schemas.microsoft.com/office/thememl/2012/main" name="Office Theme" id="{62F939B6-93AF-4DB8-9C6B-D6C7DFDC589F}" vid="{4A3C46E8-61CC-4603-A589-7422A47A8E4A}"/>

</xml_diff>